<commit_message>
adding new facial measurements
update to include palpebral fissure height as part of the automatic measures provided by Emotrics
</commit_message>
<xml_diff>
--- a/include/measures/dummies.pptx
+++ b/include/measures/dummies.pptx
@@ -24,6 +24,8 @@
     <p:sldId id="274" r:id="rId18"/>
     <p:sldId id="266" r:id="rId19"/>
     <p:sldId id="275" r:id="rId20"/>
+    <p:sldId id="277" r:id="rId21"/>
+    <p:sldId id="278" r:id="rId22"/>
   </p:sldIdLst>
   <p:sldSz cx="12192000" cy="6858000"/>
   <p:notesSz cx="6858000" cy="9144000"/>
@@ -907,7 +909,7 @@
           <p:cNvPr id="2" name="Title 1">
             <a:extLst>
               <a:ext uri="{FF2B5EF4-FFF2-40B4-BE49-F238E27FC236}">
-                <a16:creationId xmlns="" xmlns:a16="http://schemas.microsoft.com/office/drawing/2014/main" id="{AC7202E6-2CDF-402E-9F75-06FED90295FE}"/>
+                <a16:creationId xmlns:a16="http://schemas.microsoft.com/office/drawing/2014/main" xmlns="" id="{AC7202E6-2CDF-402E-9F75-06FED90295FE}"/>
               </a:ext>
             </a:extLst>
           </p:cNvPr>
@@ -944,7 +946,7 @@
           <p:cNvPr id="3" name="Subtitle 2">
             <a:extLst>
               <a:ext uri="{FF2B5EF4-FFF2-40B4-BE49-F238E27FC236}">
-                <a16:creationId xmlns="" xmlns:a16="http://schemas.microsoft.com/office/drawing/2014/main" id="{937BD269-FBB1-4E9D-B272-4E3973A98F60}"/>
+                <a16:creationId xmlns:a16="http://schemas.microsoft.com/office/drawing/2014/main" xmlns="" id="{937BD269-FBB1-4E9D-B272-4E3973A98F60}"/>
               </a:ext>
             </a:extLst>
           </p:cNvPr>
@@ -1014,7 +1016,7 @@
           <p:cNvPr id="4" name="Date Placeholder 3">
             <a:extLst>
               <a:ext uri="{FF2B5EF4-FFF2-40B4-BE49-F238E27FC236}">
-                <a16:creationId xmlns="" xmlns:a16="http://schemas.microsoft.com/office/drawing/2014/main" id="{89CD2E81-B624-47C5-8348-F2D89D630395}"/>
+                <a16:creationId xmlns:a16="http://schemas.microsoft.com/office/drawing/2014/main" xmlns="" id="{89CD2E81-B624-47C5-8348-F2D89D630395}"/>
               </a:ext>
             </a:extLst>
           </p:cNvPr>
@@ -1032,7 +1034,7 @@
           <a:p>
             <a:fld id="{FA15CCB3-3DAF-464C-ACDB-4AF7D4EFBAB3}" type="datetimeFigureOut">
               <a:rPr lang="en-US" smtClean="0"/>
-              <a:t>9/29/2017</a:t>
+              <a:t>8/10/2018</a:t>
             </a:fld>
             <a:endParaRPr lang="en-US"/>
           </a:p>
@@ -1043,7 +1045,7 @@
           <p:cNvPr id="5" name="Footer Placeholder 4">
             <a:extLst>
               <a:ext uri="{FF2B5EF4-FFF2-40B4-BE49-F238E27FC236}">
-                <a16:creationId xmlns="" xmlns:a16="http://schemas.microsoft.com/office/drawing/2014/main" id="{7432A9AA-5F7D-4FD3-B858-90291D52FCB2}"/>
+                <a16:creationId xmlns:a16="http://schemas.microsoft.com/office/drawing/2014/main" xmlns="" id="{7432A9AA-5F7D-4FD3-B858-90291D52FCB2}"/>
               </a:ext>
             </a:extLst>
           </p:cNvPr>
@@ -1068,7 +1070,7 @@
           <p:cNvPr id="6" name="Slide Number Placeholder 5">
             <a:extLst>
               <a:ext uri="{FF2B5EF4-FFF2-40B4-BE49-F238E27FC236}">
-                <a16:creationId xmlns="" xmlns:a16="http://schemas.microsoft.com/office/drawing/2014/main" id="{FB12C1C0-88A0-433B-A494-5A955D93F914}"/>
+                <a16:creationId xmlns:a16="http://schemas.microsoft.com/office/drawing/2014/main" xmlns="" id="{FB12C1C0-88A0-433B-A494-5A955D93F914}"/>
               </a:ext>
             </a:extLst>
           </p:cNvPr>
@@ -1127,7 +1129,7 @@
           <p:cNvPr id="2" name="Title 1">
             <a:extLst>
               <a:ext uri="{FF2B5EF4-FFF2-40B4-BE49-F238E27FC236}">
-                <a16:creationId xmlns="" xmlns:a16="http://schemas.microsoft.com/office/drawing/2014/main" id="{A6C8905D-37A9-443B-8902-E17E80E63548}"/>
+                <a16:creationId xmlns:a16="http://schemas.microsoft.com/office/drawing/2014/main" xmlns="" id="{A6C8905D-37A9-443B-8902-E17E80E63548}"/>
               </a:ext>
             </a:extLst>
           </p:cNvPr>
@@ -1155,7 +1157,7 @@
           <p:cNvPr id="3" name="Vertical Text Placeholder 2">
             <a:extLst>
               <a:ext uri="{FF2B5EF4-FFF2-40B4-BE49-F238E27FC236}">
-                <a16:creationId xmlns="" xmlns:a16="http://schemas.microsoft.com/office/drawing/2014/main" id="{0E4701C9-C27B-40A3-A29B-DCF6D4A35919}"/>
+                <a16:creationId xmlns:a16="http://schemas.microsoft.com/office/drawing/2014/main" xmlns="" id="{0E4701C9-C27B-40A3-A29B-DCF6D4A35919}"/>
               </a:ext>
             </a:extLst>
           </p:cNvPr>
@@ -1212,7 +1214,7 @@
           <p:cNvPr id="4" name="Date Placeholder 3">
             <a:extLst>
               <a:ext uri="{FF2B5EF4-FFF2-40B4-BE49-F238E27FC236}">
-                <a16:creationId xmlns="" xmlns:a16="http://schemas.microsoft.com/office/drawing/2014/main" id="{D845F2C3-5CA7-4CAD-9FFF-A1AEE18E83CB}"/>
+                <a16:creationId xmlns:a16="http://schemas.microsoft.com/office/drawing/2014/main" xmlns="" id="{D845F2C3-5CA7-4CAD-9FFF-A1AEE18E83CB}"/>
               </a:ext>
             </a:extLst>
           </p:cNvPr>
@@ -1230,7 +1232,7 @@
           <a:p>
             <a:fld id="{FA15CCB3-3DAF-464C-ACDB-4AF7D4EFBAB3}" type="datetimeFigureOut">
               <a:rPr lang="en-US" smtClean="0"/>
-              <a:t>9/29/2017</a:t>
+              <a:t>8/10/2018</a:t>
             </a:fld>
             <a:endParaRPr lang="en-US"/>
           </a:p>
@@ -1241,7 +1243,7 @@
           <p:cNvPr id="5" name="Footer Placeholder 4">
             <a:extLst>
               <a:ext uri="{FF2B5EF4-FFF2-40B4-BE49-F238E27FC236}">
-                <a16:creationId xmlns="" xmlns:a16="http://schemas.microsoft.com/office/drawing/2014/main" id="{21A899AE-0B63-4DC1-94B9-391A28681A8B}"/>
+                <a16:creationId xmlns:a16="http://schemas.microsoft.com/office/drawing/2014/main" xmlns="" id="{21A899AE-0B63-4DC1-94B9-391A28681A8B}"/>
               </a:ext>
             </a:extLst>
           </p:cNvPr>
@@ -1266,7 +1268,7 @@
           <p:cNvPr id="6" name="Slide Number Placeholder 5">
             <a:extLst>
               <a:ext uri="{FF2B5EF4-FFF2-40B4-BE49-F238E27FC236}">
-                <a16:creationId xmlns="" xmlns:a16="http://schemas.microsoft.com/office/drawing/2014/main" id="{1D344BEC-3519-44F7-85F8-E78DC4FC15C2}"/>
+                <a16:creationId xmlns:a16="http://schemas.microsoft.com/office/drawing/2014/main" xmlns="" id="{1D344BEC-3519-44F7-85F8-E78DC4FC15C2}"/>
               </a:ext>
             </a:extLst>
           </p:cNvPr>
@@ -1325,7 +1327,7 @@
           <p:cNvPr id="2" name="Vertical Title 1">
             <a:extLst>
               <a:ext uri="{FF2B5EF4-FFF2-40B4-BE49-F238E27FC236}">
-                <a16:creationId xmlns="" xmlns:a16="http://schemas.microsoft.com/office/drawing/2014/main" id="{A7CD7DCC-9396-49FA-B574-522A8DB53293}"/>
+                <a16:creationId xmlns:a16="http://schemas.microsoft.com/office/drawing/2014/main" xmlns="" id="{A7CD7DCC-9396-49FA-B574-522A8DB53293}"/>
               </a:ext>
             </a:extLst>
           </p:cNvPr>
@@ -1358,7 +1360,7 @@
           <p:cNvPr id="3" name="Vertical Text Placeholder 2">
             <a:extLst>
               <a:ext uri="{FF2B5EF4-FFF2-40B4-BE49-F238E27FC236}">
-                <a16:creationId xmlns="" xmlns:a16="http://schemas.microsoft.com/office/drawing/2014/main" id="{8C2FDCFD-CB98-4BB1-A0C8-6620E05B859D}"/>
+                <a16:creationId xmlns:a16="http://schemas.microsoft.com/office/drawing/2014/main" xmlns="" id="{8C2FDCFD-CB98-4BB1-A0C8-6620E05B859D}"/>
               </a:ext>
             </a:extLst>
           </p:cNvPr>
@@ -1420,7 +1422,7 @@
           <p:cNvPr id="4" name="Date Placeholder 3">
             <a:extLst>
               <a:ext uri="{FF2B5EF4-FFF2-40B4-BE49-F238E27FC236}">
-                <a16:creationId xmlns="" xmlns:a16="http://schemas.microsoft.com/office/drawing/2014/main" id="{F0BD5763-3CF5-4D8D-94A6-4A90290C39FA}"/>
+                <a16:creationId xmlns:a16="http://schemas.microsoft.com/office/drawing/2014/main" xmlns="" id="{F0BD5763-3CF5-4D8D-94A6-4A90290C39FA}"/>
               </a:ext>
             </a:extLst>
           </p:cNvPr>
@@ -1438,7 +1440,7 @@
           <a:p>
             <a:fld id="{FA15CCB3-3DAF-464C-ACDB-4AF7D4EFBAB3}" type="datetimeFigureOut">
               <a:rPr lang="en-US" smtClean="0"/>
-              <a:t>9/29/2017</a:t>
+              <a:t>8/10/2018</a:t>
             </a:fld>
             <a:endParaRPr lang="en-US"/>
           </a:p>
@@ -1449,7 +1451,7 @@
           <p:cNvPr id="5" name="Footer Placeholder 4">
             <a:extLst>
               <a:ext uri="{FF2B5EF4-FFF2-40B4-BE49-F238E27FC236}">
-                <a16:creationId xmlns="" xmlns:a16="http://schemas.microsoft.com/office/drawing/2014/main" id="{CE1AF0F2-B766-47B3-83F9-DF2F336B32FE}"/>
+                <a16:creationId xmlns:a16="http://schemas.microsoft.com/office/drawing/2014/main" xmlns="" id="{CE1AF0F2-B766-47B3-83F9-DF2F336B32FE}"/>
               </a:ext>
             </a:extLst>
           </p:cNvPr>
@@ -1474,7 +1476,7 @@
           <p:cNvPr id="6" name="Slide Number Placeholder 5">
             <a:extLst>
               <a:ext uri="{FF2B5EF4-FFF2-40B4-BE49-F238E27FC236}">
-                <a16:creationId xmlns="" xmlns:a16="http://schemas.microsoft.com/office/drawing/2014/main" id="{72C94A9C-B701-48C9-A3C6-EE36F31B05AA}"/>
+                <a16:creationId xmlns:a16="http://schemas.microsoft.com/office/drawing/2014/main" xmlns="" id="{72C94A9C-B701-48C9-A3C6-EE36F31B05AA}"/>
               </a:ext>
             </a:extLst>
           </p:cNvPr>
@@ -1533,7 +1535,7 @@
           <p:cNvPr id="2" name="Title 1">
             <a:extLst>
               <a:ext uri="{FF2B5EF4-FFF2-40B4-BE49-F238E27FC236}">
-                <a16:creationId xmlns="" xmlns:a16="http://schemas.microsoft.com/office/drawing/2014/main" id="{C8FDA735-9AA8-44E8-9DE1-12ABDD0623BA}"/>
+                <a16:creationId xmlns:a16="http://schemas.microsoft.com/office/drawing/2014/main" xmlns="" id="{C8FDA735-9AA8-44E8-9DE1-12ABDD0623BA}"/>
               </a:ext>
             </a:extLst>
           </p:cNvPr>
@@ -1561,7 +1563,7 @@
           <p:cNvPr id="3" name="Content Placeholder 2">
             <a:extLst>
               <a:ext uri="{FF2B5EF4-FFF2-40B4-BE49-F238E27FC236}">
-                <a16:creationId xmlns="" xmlns:a16="http://schemas.microsoft.com/office/drawing/2014/main" id="{330ACDCF-3648-4794-A8D0-A10BC228414F}"/>
+                <a16:creationId xmlns:a16="http://schemas.microsoft.com/office/drawing/2014/main" xmlns="" id="{330ACDCF-3648-4794-A8D0-A10BC228414F}"/>
               </a:ext>
             </a:extLst>
           </p:cNvPr>
@@ -1618,7 +1620,7 @@
           <p:cNvPr id="4" name="Date Placeholder 3">
             <a:extLst>
               <a:ext uri="{FF2B5EF4-FFF2-40B4-BE49-F238E27FC236}">
-                <a16:creationId xmlns="" xmlns:a16="http://schemas.microsoft.com/office/drawing/2014/main" id="{70A692D9-957A-4AEE-9BA2-CED919CBBB1F}"/>
+                <a16:creationId xmlns:a16="http://schemas.microsoft.com/office/drawing/2014/main" xmlns="" id="{70A692D9-957A-4AEE-9BA2-CED919CBBB1F}"/>
               </a:ext>
             </a:extLst>
           </p:cNvPr>
@@ -1636,7 +1638,7 @@
           <a:p>
             <a:fld id="{FA15CCB3-3DAF-464C-ACDB-4AF7D4EFBAB3}" type="datetimeFigureOut">
               <a:rPr lang="en-US" smtClean="0"/>
-              <a:t>9/29/2017</a:t>
+              <a:t>8/10/2018</a:t>
             </a:fld>
             <a:endParaRPr lang="en-US"/>
           </a:p>
@@ -1647,7 +1649,7 @@
           <p:cNvPr id="5" name="Footer Placeholder 4">
             <a:extLst>
               <a:ext uri="{FF2B5EF4-FFF2-40B4-BE49-F238E27FC236}">
-                <a16:creationId xmlns="" xmlns:a16="http://schemas.microsoft.com/office/drawing/2014/main" id="{19C0995A-1822-4236-A004-5FE707796259}"/>
+                <a16:creationId xmlns:a16="http://schemas.microsoft.com/office/drawing/2014/main" xmlns="" id="{19C0995A-1822-4236-A004-5FE707796259}"/>
               </a:ext>
             </a:extLst>
           </p:cNvPr>
@@ -1672,7 +1674,7 @@
           <p:cNvPr id="6" name="Slide Number Placeholder 5">
             <a:extLst>
               <a:ext uri="{FF2B5EF4-FFF2-40B4-BE49-F238E27FC236}">
-                <a16:creationId xmlns="" xmlns:a16="http://schemas.microsoft.com/office/drawing/2014/main" id="{EA5DC944-6BFE-4200-B40A-8983C94A5C2D}"/>
+                <a16:creationId xmlns:a16="http://schemas.microsoft.com/office/drawing/2014/main" xmlns="" id="{EA5DC944-6BFE-4200-B40A-8983C94A5C2D}"/>
               </a:ext>
             </a:extLst>
           </p:cNvPr>
@@ -1731,7 +1733,7 @@
           <p:cNvPr id="2" name="Title 1">
             <a:extLst>
               <a:ext uri="{FF2B5EF4-FFF2-40B4-BE49-F238E27FC236}">
-                <a16:creationId xmlns="" xmlns:a16="http://schemas.microsoft.com/office/drawing/2014/main" id="{D0CD05C1-F81A-4EB4-B91E-D755AB08193E}"/>
+                <a16:creationId xmlns:a16="http://schemas.microsoft.com/office/drawing/2014/main" xmlns="" id="{D0CD05C1-F81A-4EB4-B91E-D755AB08193E}"/>
               </a:ext>
             </a:extLst>
           </p:cNvPr>
@@ -1768,7 +1770,7 @@
           <p:cNvPr id="3" name="Text Placeholder 2">
             <a:extLst>
               <a:ext uri="{FF2B5EF4-FFF2-40B4-BE49-F238E27FC236}">
-                <a16:creationId xmlns="" xmlns:a16="http://schemas.microsoft.com/office/drawing/2014/main" id="{6DEFF1AF-CB87-45C2-A56B-EB1BFC2FE9DE}"/>
+                <a16:creationId xmlns:a16="http://schemas.microsoft.com/office/drawing/2014/main" xmlns="" id="{6DEFF1AF-CB87-45C2-A56B-EB1BFC2FE9DE}"/>
               </a:ext>
             </a:extLst>
           </p:cNvPr>
@@ -1893,7 +1895,7 @@
           <p:cNvPr id="4" name="Date Placeholder 3">
             <a:extLst>
               <a:ext uri="{FF2B5EF4-FFF2-40B4-BE49-F238E27FC236}">
-                <a16:creationId xmlns="" xmlns:a16="http://schemas.microsoft.com/office/drawing/2014/main" id="{F7597721-3F04-4305-BF74-746074270702}"/>
+                <a16:creationId xmlns:a16="http://schemas.microsoft.com/office/drawing/2014/main" xmlns="" id="{F7597721-3F04-4305-BF74-746074270702}"/>
               </a:ext>
             </a:extLst>
           </p:cNvPr>
@@ -1911,7 +1913,7 @@
           <a:p>
             <a:fld id="{FA15CCB3-3DAF-464C-ACDB-4AF7D4EFBAB3}" type="datetimeFigureOut">
               <a:rPr lang="en-US" smtClean="0"/>
-              <a:t>9/29/2017</a:t>
+              <a:t>8/10/2018</a:t>
             </a:fld>
             <a:endParaRPr lang="en-US"/>
           </a:p>
@@ -1922,7 +1924,7 @@
           <p:cNvPr id="5" name="Footer Placeholder 4">
             <a:extLst>
               <a:ext uri="{FF2B5EF4-FFF2-40B4-BE49-F238E27FC236}">
-                <a16:creationId xmlns="" xmlns:a16="http://schemas.microsoft.com/office/drawing/2014/main" id="{FACB293D-DB86-4872-9F38-0DA73CAA493E}"/>
+                <a16:creationId xmlns:a16="http://schemas.microsoft.com/office/drawing/2014/main" xmlns="" id="{FACB293D-DB86-4872-9F38-0DA73CAA493E}"/>
               </a:ext>
             </a:extLst>
           </p:cNvPr>
@@ -1947,7 +1949,7 @@
           <p:cNvPr id="6" name="Slide Number Placeholder 5">
             <a:extLst>
               <a:ext uri="{FF2B5EF4-FFF2-40B4-BE49-F238E27FC236}">
-                <a16:creationId xmlns="" xmlns:a16="http://schemas.microsoft.com/office/drawing/2014/main" id="{67621236-E223-418C-85D7-8C5213E86531}"/>
+                <a16:creationId xmlns:a16="http://schemas.microsoft.com/office/drawing/2014/main" xmlns="" id="{67621236-E223-418C-85D7-8C5213E86531}"/>
               </a:ext>
             </a:extLst>
           </p:cNvPr>
@@ -2006,7 +2008,7 @@
           <p:cNvPr id="2" name="Title 1">
             <a:extLst>
               <a:ext uri="{FF2B5EF4-FFF2-40B4-BE49-F238E27FC236}">
-                <a16:creationId xmlns="" xmlns:a16="http://schemas.microsoft.com/office/drawing/2014/main" id="{BDF2621B-6464-4EF3-B40B-2F24E8974264}"/>
+                <a16:creationId xmlns:a16="http://schemas.microsoft.com/office/drawing/2014/main" xmlns="" id="{BDF2621B-6464-4EF3-B40B-2F24E8974264}"/>
               </a:ext>
             </a:extLst>
           </p:cNvPr>
@@ -2034,7 +2036,7 @@
           <p:cNvPr id="3" name="Content Placeholder 2">
             <a:extLst>
               <a:ext uri="{FF2B5EF4-FFF2-40B4-BE49-F238E27FC236}">
-                <a16:creationId xmlns="" xmlns:a16="http://schemas.microsoft.com/office/drawing/2014/main" id="{6E8D4243-C480-4682-969C-F67386639CCD}"/>
+                <a16:creationId xmlns:a16="http://schemas.microsoft.com/office/drawing/2014/main" xmlns="" id="{6E8D4243-C480-4682-969C-F67386639CCD}"/>
               </a:ext>
             </a:extLst>
           </p:cNvPr>
@@ -2096,7 +2098,7 @@
           <p:cNvPr id="4" name="Content Placeholder 3">
             <a:extLst>
               <a:ext uri="{FF2B5EF4-FFF2-40B4-BE49-F238E27FC236}">
-                <a16:creationId xmlns="" xmlns:a16="http://schemas.microsoft.com/office/drawing/2014/main" id="{09D28EE5-B92E-4AAB-82BC-0E8B55380A01}"/>
+                <a16:creationId xmlns:a16="http://schemas.microsoft.com/office/drawing/2014/main" xmlns="" id="{09D28EE5-B92E-4AAB-82BC-0E8B55380A01}"/>
               </a:ext>
             </a:extLst>
           </p:cNvPr>
@@ -2158,7 +2160,7 @@
           <p:cNvPr id="5" name="Date Placeholder 4">
             <a:extLst>
               <a:ext uri="{FF2B5EF4-FFF2-40B4-BE49-F238E27FC236}">
-                <a16:creationId xmlns="" xmlns:a16="http://schemas.microsoft.com/office/drawing/2014/main" id="{050068FD-C364-4715-803A-5A4F4AA0D19E}"/>
+                <a16:creationId xmlns:a16="http://schemas.microsoft.com/office/drawing/2014/main" xmlns="" id="{050068FD-C364-4715-803A-5A4F4AA0D19E}"/>
               </a:ext>
             </a:extLst>
           </p:cNvPr>
@@ -2176,7 +2178,7 @@
           <a:p>
             <a:fld id="{FA15CCB3-3DAF-464C-ACDB-4AF7D4EFBAB3}" type="datetimeFigureOut">
               <a:rPr lang="en-US" smtClean="0"/>
-              <a:t>9/29/2017</a:t>
+              <a:t>8/10/2018</a:t>
             </a:fld>
             <a:endParaRPr lang="en-US"/>
           </a:p>
@@ -2187,7 +2189,7 @@
           <p:cNvPr id="6" name="Footer Placeholder 5">
             <a:extLst>
               <a:ext uri="{FF2B5EF4-FFF2-40B4-BE49-F238E27FC236}">
-                <a16:creationId xmlns="" xmlns:a16="http://schemas.microsoft.com/office/drawing/2014/main" id="{B9FBFFC1-3E74-4D79-80A9-C3F377912049}"/>
+                <a16:creationId xmlns:a16="http://schemas.microsoft.com/office/drawing/2014/main" xmlns="" id="{B9FBFFC1-3E74-4D79-80A9-C3F377912049}"/>
               </a:ext>
             </a:extLst>
           </p:cNvPr>
@@ -2212,7 +2214,7 @@
           <p:cNvPr id="7" name="Slide Number Placeholder 6">
             <a:extLst>
               <a:ext uri="{FF2B5EF4-FFF2-40B4-BE49-F238E27FC236}">
-                <a16:creationId xmlns="" xmlns:a16="http://schemas.microsoft.com/office/drawing/2014/main" id="{D86C7B0C-3D78-4CEE-B1D7-6A640087A8E5}"/>
+                <a16:creationId xmlns:a16="http://schemas.microsoft.com/office/drawing/2014/main" xmlns="" id="{D86C7B0C-3D78-4CEE-B1D7-6A640087A8E5}"/>
               </a:ext>
             </a:extLst>
           </p:cNvPr>
@@ -2271,7 +2273,7 @@
           <p:cNvPr id="2" name="Title 1">
             <a:extLst>
               <a:ext uri="{FF2B5EF4-FFF2-40B4-BE49-F238E27FC236}">
-                <a16:creationId xmlns="" xmlns:a16="http://schemas.microsoft.com/office/drawing/2014/main" id="{39382673-3A9D-4356-877D-6F2F852EAB22}"/>
+                <a16:creationId xmlns:a16="http://schemas.microsoft.com/office/drawing/2014/main" xmlns="" id="{39382673-3A9D-4356-877D-6F2F852EAB22}"/>
               </a:ext>
             </a:extLst>
           </p:cNvPr>
@@ -2304,7 +2306,7 @@
           <p:cNvPr id="3" name="Text Placeholder 2">
             <a:extLst>
               <a:ext uri="{FF2B5EF4-FFF2-40B4-BE49-F238E27FC236}">
-                <a16:creationId xmlns="" xmlns:a16="http://schemas.microsoft.com/office/drawing/2014/main" id="{B1A2A804-1CE8-4725-A9E3-DDB7D674675A}"/>
+                <a16:creationId xmlns:a16="http://schemas.microsoft.com/office/drawing/2014/main" xmlns="" id="{B1A2A804-1CE8-4725-A9E3-DDB7D674675A}"/>
               </a:ext>
             </a:extLst>
           </p:cNvPr>
@@ -2375,7 +2377,7 @@
           <p:cNvPr id="4" name="Content Placeholder 3">
             <a:extLst>
               <a:ext uri="{FF2B5EF4-FFF2-40B4-BE49-F238E27FC236}">
-                <a16:creationId xmlns="" xmlns:a16="http://schemas.microsoft.com/office/drawing/2014/main" id="{DD6FFD7B-661D-4310-9075-84138E212A6E}"/>
+                <a16:creationId xmlns:a16="http://schemas.microsoft.com/office/drawing/2014/main" xmlns="" id="{DD6FFD7B-661D-4310-9075-84138E212A6E}"/>
               </a:ext>
             </a:extLst>
           </p:cNvPr>
@@ -2437,7 +2439,7 @@
           <p:cNvPr id="5" name="Text Placeholder 4">
             <a:extLst>
               <a:ext uri="{FF2B5EF4-FFF2-40B4-BE49-F238E27FC236}">
-                <a16:creationId xmlns="" xmlns:a16="http://schemas.microsoft.com/office/drawing/2014/main" id="{14CB0131-CD5B-499F-B659-79002046A43C}"/>
+                <a16:creationId xmlns:a16="http://schemas.microsoft.com/office/drawing/2014/main" xmlns="" id="{14CB0131-CD5B-499F-B659-79002046A43C}"/>
               </a:ext>
             </a:extLst>
           </p:cNvPr>
@@ -2508,7 +2510,7 @@
           <p:cNvPr id="6" name="Content Placeholder 5">
             <a:extLst>
               <a:ext uri="{FF2B5EF4-FFF2-40B4-BE49-F238E27FC236}">
-                <a16:creationId xmlns="" xmlns:a16="http://schemas.microsoft.com/office/drawing/2014/main" id="{654C4B79-1738-4951-98FD-06671FF9A92C}"/>
+                <a16:creationId xmlns:a16="http://schemas.microsoft.com/office/drawing/2014/main" xmlns="" id="{654C4B79-1738-4951-98FD-06671FF9A92C}"/>
               </a:ext>
             </a:extLst>
           </p:cNvPr>
@@ -2570,7 +2572,7 @@
           <p:cNvPr id="7" name="Date Placeholder 6">
             <a:extLst>
               <a:ext uri="{FF2B5EF4-FFF2-40B4-BE49-F238E27FC236}">
-                <a16:creationId xmlns="" xmlns:a16="http://schemas.microsoft.com/office/drawing/2014/main" id="{7ADE6916-80AE-4DB1-96C5-2AEE376BD842}"/>
+                <a16:creationId xmlns:a16="http://schemas.microsoft.com/office/drawing/2014/main" xmlns="" id="{7ADE6916-80AE-4DB1-96C5-2AEE376BD842}"/>
               </a:ext>
             </a:extLst>
           </p:cNvPr>
@@ -2588,7 +2590,7 @@
           <a:p>
             <a:fld id="{FA15CCB3-3DAF-464C-ACDB-4AF7D4EFBAB3}" type="datetimeFigureOut">
               <a:rPr lang="en-US" smtClean="0"/>
-              <a:t>9/29/2017</a:t>
+              <a:t>8/10/2018</a:t>
             </a:fld>
             <a:endParaRPr lang="en-US"/>
           </a:p>
@@ -2599,7 +2601,7 @@
           <p:cNvPr id="8" name="Footer Placeholder 7">
             <a:extLst>
               <a:ext uri="{FF2B5EF4-FFF2-40B4-BE49-F238E27FC236}">
-                <a16:creationId xmlns="" xmlns:a16="http://schemas.microsoft.com/office/drawing/2014/main" id="{7CC0B991-A3DE-4AD8-88E9-591965AAE29F}"/>
+                <a16:creationId xmlns:a16="http://schemas.microsoft.com/office/drawing/2014/main" xmlns="" id="{7CC0B991-A3DE-4AD8-88E9-591965AAE29F}"/>
               </a:ext>
             </a:extLst>
           </p:cNvPr>
@@ -2624,7 +2626,7 @@
           <p:cNvPr id="9" name="Slide Number Placeholder 8">
             <a:extLst>
               <a:ext uri="{FF2B5EF4-FFF2-40B4-BE49-F238E27FC236}">
-                <a16:creationId xmlns="" xmlns:a16="http://schemas.microsoft.com/office/drawing/2014/main" id="{43799288-9C0E-4C6B-9822-58796141F287}"/>
+                <a16:creationId xmlns:a16="http://schemas.microsoft.com/office/drawing/2014/main" xmlns="" id="{43799288-9C0E-4C6B-9822-58796141F287}"/>
               </a:ext>
             </a:extLst>
           </p:cNvPr>
@@ -2683,7 +2685,7 @@
           <p:cNvPr id="2" name="Title 1">
             <a:extLst>
               <a:ext uri="{FF2B5EF4-FFF2-40B4-BE49-F238E27FC236}">
-                <a16:creationId xmlns="" xmlns:a16="http://schemas.microsoft.com/office/drawing/2014/main" id="{0E60B812-9C43-41E4-AB34-1EAC1D6F2A60}"/>
+                <a16:creationId xmlns:a16="http://schemas.microsoft.com/office/drawing/2014/main" xmlns="" id="{0E60B812-9C43-41E4-AB34-1EAC1D6F2A60}"/>
               </a:ext>
             </a:extLst>
           </p:cNvPr>
@@ -2711,7 +2713,7 @@
           <p:cNvPr id="3" name="Date Placeholder 2">
             <a:extLst>
               <a:ext uri="{FF2B5EF4-FFF2-40B4-BE49-F238E27FC236}">
-                <a16:creationId xmlns="" xmlns:a16="http://schemas.microsoft.com/office/drawing/2014/main" id="{6E7B00D4-D76D-4691-B55B-CAD60A7571B9}"/>
+                <a16:creationId xmlns:a16="http://schemas.microsoft.com/office/drawing/2014/main" xmlns="" id="{6E7B00D4-D76D-4691-B55B-CAD60A7571B9}"/>
               </a:ext>
             </a:extLst>
           </p:cNvPr>
@@ -2729,7 +2731,7 @@
           <a:p>
             <a:fld id="{FA15CCB3-3DAF-464C-ACDB-4AF7D4EFBAB3}" type="datetimeFigureOut">
               <a:rPr lang="en-US" smtClean="0"/>
-              <a:t>9/29/2017</a:t>
+              <a:t>8/10/2018</a:t>
             </a:fld>
             <a:endParaRPr lang="en-US"/>
           </a:p>
@@ -2740,7 +2742,7 @@
           <p:cNvPr id="4" name="Footer Placeholder 3">
             <a:extLst>
               <a:ext uri="{FF2B5EF4-FFF2-40B4-BE49-F238E27FC236}">
-                <a16:creationId xmlns="" xmlns:a16="http://schemas.microsoft.com/office/drawing/2014/main" id="{0C32E748-2EAF-499B-B8B6-2E6142951150}"/>
+                <a16:creationId xmlns:a16="http://schemas.microsoft.com/office/drawing/2014/main" xmlns="" id="{0C32E748-2EAF-499B-B8B6-2E6142951150}"/>
               </a:ext>
             </a:extLst>
           </p:cNvPr>
@@ -2765,7 +2767,7 @@
           <p:cNvPr id="5" name="Slide Number Placeholder 4">
             <a:extLst>
               <a:ext uri="{FF2B5EF4-FFF2-40B4-BE49-F238E27FC236}">
-                <a16:creationId xmlns="" xmlns:a16="http://schemas.microsoft.com/office/drawing/2014/main" id="{0A23E6DC-0322-495D-B181-8873E175EBB0}"/>
+                <a16:creationId xmlns:a16="http://schemas.microsoft.com/office/drawing/2014/main" xmlns="" id="{0A23E6DC-0322-495D-B181-8873E175EBB0}"/>
               </a:ext>
             </a:extLst>
           </p:cNvPr>
@@ -2824,7 +2826,7 @@
           <p:cNvPr id="2" name="Date Placeholder 1">
             <a:extLst>
               <a:ext uri="{FF2B5EF4-FFF2-40B4-BE49-F238E27FC236}">
-                <a16:creationId xmlns="" xmlns:a16="http://schemas.microsoft.com/office/drawing/2014/main" id="{B59CC34F-847C-4A00-BAA4-93546204A9DD}"/>
+                <a16:creationId xmlns:a16="http://schemas.microsoft.com/office/drawing/2014/main" xmlns="" id="{B59CC34F-847C-4A00-BAA4-93546204A9DD}"/>
               </a:ext>
             </a:extLst>
           </p:cNvPr>
@@ -2842,7 +2844,7 @@
           <a:p>
             <a:fld id="{FA15CCB3-3DAF-464C-ACDB-4AF7D4EFBAB3}" type="datetimeFigureOut">
               <a:rPr lang="en-US" smtClean="0"/>
-              <a:t>9/29/2017</a:t>
+              <a:t>8/10/2018</a:t>
             </a:fld>
             <a:endParaRPr lang="en-US"/>
           </a:p>
@@ -2853,7 +2855,7 @@
           <p:cNvPr id="3" name="Footer Placeholder 2">
             <a:extLst>
               <a:ext uri="{FF2B5EF4-FFF2-40B4-BE49-F238E27FC236}">
-                <a16:creationId xmlns="" xmlns:a16="http://schemas.microsoft.com/office/drawing/2014/main" id="{D3E56FF1-D026-4F5A-A313-9EF283C92AF8}"/>
+                <a16:creationId xmlns:a16="http://schemas.microsoft.com/office/drawing/2014/main" xmlns="" id="{D3E56FF1-D026-4F5A-A313-9EF283C92AF8}"/>
               </a:ext>
             </a:extLst>
           </p:cNvPr>
@@ -2878,7 +2880,7 @@
           <p:cNvPr id="4" name="Slide Number Placeholder 3">
             <a:extLst>
               <a:ext uri="{FF2B5EF4-FFF2-40B4-BE49-F238E27FC236}">
-                <a16:creationId xmlns="" xmlns:a16="http://schemas.microsoft.com/office/drawing/2014/main" id="{B875FE69-C13D-4702-8DEA-A6E26C8CCEB8}"/>
+                <a16:creationId xmlns:a16="http://schemas.microsoft.com/office/drawing/2014/main" xmlns="" id="{B875FE69-C13D-4702-8DEA-A6E26C8CCEB8}"/>
               </a:ext>
             </a:extLst>
           </p:cNvPr>
@@ -2937,7 +2939,7 @@
           <p:cNvPr id="2" name="Title 1">
             <a:extLst>
               <a:ext uri="{FF2B5EF4-FFF2-40B4-BE49-F238E27FC236}">
-                <a16:creationId xmlns="" xmlns:a16="http://schemas.microsoft.com/office/drawing/2014/main" id="{14C5BB89-822E-4D71-970C-A2FEE194E054}"/>
+                <a16:creationId xmlns:a16="http://schemas.microsoft.com/office/drawing/2014/main" xmlns="" id="{14C5BB89-822E-4D71-970C-A2FEE194E054}"/>
               </a:ext>
             </a:extLst>
           </p:cNvPr>
@@ -2974,7 +2976,7 @@
           <p:cNvPr id="3" name="Content Placeholder 2">
             <a:extLst>
               <a:ext uri="{FF2B5EF4-FFF2-40B4-BE49-F238E27FC236}">
-                <a16:creationId xmlns="" xmlns:a16="http://schemas.microsoft.com/office/drawing/2014/main" id="{E2FE48A9-C661-4340-8938-F75FEBFCF761}"/>
+                <a16:creationId xmlns:a16="http://schemas.microsoft.com/office/drawing/2014/main" xmlns="" id="{E2FE48A9-C661-4340-8938-F75FEBFCF761}"/>
               </a:ext>
             </a:extLst>
           </p:cNvPr>
@@ -3064,7 +3066,7 @@
           <p:cNvPr id="4" name="Text Placeholder 3">
             <a:extLst>
               <a:ext uri="{FF2B5EF4-FFF2-40B4-BE49-F238E27FC236}">
-                <a16:creationId xmlns="" xmlns:a16="http://schemas.microsoft.com/office/drawing/2014/main" id="{A4967911-CDE7-4A2B-B874-E53989CD7005}"/>
+                <a16:creationId xmlns:a16="http://schemas.microsoft.com/office/drawing/2014/main" xmlns="" id="{A4967911-CDE7-4A2B-B874-E53989CD7005}"/>
               </a:ext>
             </a:extLst>
           </p:cNvPr>
@@ -3135,7 +3137,7 @@
           <p:cNvPr id="5" name="Date Placeholder 4">
             <a:extLst>
               <a:ext uri="{FF2B5EF4-FFF2-40B4-BE49-F238E27FC236}">
-                <a16:creationId xmlns="" xmlns:a16="http://schemas.microsoft.com/office/drawing/2014/main" id="{411E5EC7-8B42-4231-8142-4BFE8C4C3460}"/>
+                <a16:creationId xmlns:a16="http://schemas.microsoft.com/office/drawing/2014/main" xmlns="" id="{411E5EC7-8B42-4231-8142-4BFE8C4C3460}"/>
               </a:ext>
             </a:extLst>
           </p:cNvPr>
@@ -3153,7 +3155,7 @@
           <a:p>
             <a:fld id="{FA15CCB3-3DAF-464C-ACDB-4AF7D4EFBAB3}" type="datetimeFigureOut">
               <a:rPr lang="en-US" smtClean="0"/>
-              <a:t>9/29/2017</a:t>
+              <a:t>8/10/2018</a:t>
             </a:fld>
             <a:endParaRPr lang="en-US"/>
           </a:p>
@@ -3164,7 +3166,7 @@
           <p:cNvPr id="6" name="Footer Placeholder 5">
             <a:extLst>
               <a:ext uri="{FF2B5EF4-FFF2-40B4-BE49-F238E27FC236}">
-                <a16:creationId xmlns="" xmlns:a16="http://schemas.microsoft.com/office/drawing/2014/main" id="{9595EF0E-C161-4F8D-B72C-E71F75EB232A}"/>
+                <a16:creationId xmlns:a16="http://schemas.microsoft.com/office/drawing/2014/main" xmlns="" id="{9595EF0E-C161-4F8D-B72C-E71F75EB232A}"/>
               </a:ext>
             </a:extLst>
           </p:cNvPr>
@@ -3189,7 +3191,7 @@
           <p:cNvPr id="7" name="Slide Number Placeholder 6">
             <a:extLst>
               <a:ext uri="{FF2B5EF4-FFF2-40B4-BE49-F238E27FC236}">
-                <a16:creationId xmlns="" xmlns:a16="http://schemas.microsoft.com/office/drawing/2014/main" id="{0665CA5A-7004-4F51-93C5-DDB5EB93087E}"/>
+                <a16:creationId xmlns:a16="http://schemas.microsoft.com/office/drawing/2014/main" xmlns="" id="{0665CA5A-7004-4F51-93C5-DDB5EB93087E}"/>
               </a:ext>
             </a:extLst>
           </p:cNvPr>
@@ -3248,7 +3250,7 @@
           <p:cNvPr id="2" name="Title 1">
             <a:extLst>
               <a:ext uri="{FF2B5EF4-FFF2-40B4-BE49-F238E27FC236}">
-                <a16:creationId xmlns="" xmlns:a16="http://schemas.microsoft.com/office/drawing/2014/main" id="{850E32BE-8A3F-4E75-A40E-06B30ED1D3A9}"/>
+                <a16:creationId xmlns:a16="http://schemas.microsoft.com/office/drawing/2014/main" xmlns="" id="{850E32BE-8A3F-4E75-A40E-06B30ED1D3A9}"/>
               </a:ext>
             </a:extLst>
           </p:cNvPr>
@@ -3285,7 +3287,7 @@
           <p:cNvPr id="3" name="Picture Placeholder 2">
             <a:extLst>
               <a:ext uri="{FF2B5EF4-FFF2-40B4-BE49-F238E27FC236}">
-                <a16:creationId xmlns="" xmlns:a16="http://schemas.microsoft.com/office/drawing/2014/main" id="{38441FE6-AB94-4767-8188-F11A51C3C515}"/>
+                <a16:creationId xmlns:a16="http://schemas.microsoft.com/office/drawing/2014/main" xmlns="" id="{38441FE6-AB94-4767-8188-F11A51C3C515}"/>
               </a:ext>
             </a:extLst>
           </p:cNvPr>
@@ -3352,7 +3354,7 @@
           <p:cNvPr id="4" name="Text Placeholder 3">
             <a:extLst>
               <a:ext uri="{FF2B5EF4-FFF2-40B4-BE49-F238E27FC236}">
-                <a16:creationId xmlns="" xmlns:a16="http://schemas.microsoft.com/office/drawing/2014/main" id="{1FE8B6C7-C436-4C55-994C-2FF1B5C78AB8}"/>
+                <a16:creationId xmlns:a16="http://schemas.microsoft.com/office/drawing/2014/main" xmlns="" id="{1FE8B6C7-C436-4C55-994C-2FF1B5C78AB8}"/>
               </a:ext>
             </a:extLst>
           </p:cNvPr>
@@ -3423,7 +3425,7 @@
           <p:cNvPr id="5" name="Date Placeholder 4">
             <a:extLst>
               <a:ext uri="{FF2B5EF4-FFF2-40B4-BE49-F238E27FC236}">
-                <a16:creationId xmlns="" xmlns:a16="http://schemas.microsoft.com/office/drawing/2014/main" id="{73B4C40D-0BE0-4970-8736-82CB419B5362}"/>
+                <a16:creationId xmlns:a16="http://schemas.microsoft.com/office/drawing/2014/main" xmlns="" id="{73B4C40D-0BE0-4970-8736-82CB419B5362}"/>
               </a:ext>
             </a:extLst>
           </p:cNvPr>
@@ -3441,7 +3443,7 @@
           <a:p>
             <a:fld id="{FA15CCB3-3DAF-464C-ACDB-4AF7D4EFBAB3}" type="datetimeFigureOut">
               <a:rPr lang="en-US" smtClean="0"/>
-              <a:t>9/29/2017</a:t>
+              <a:t>8/10/2018</a:t>
             </a:fld>
             <a:endParaRPr lang="en-US"/>
           </a:p>
@@ -3452,7 +3454,7 @@
           <p:cNvPr id="6" name="Footer Placeholder 5">
             <a:extLst>
               <a:ext uri="{FF2B5EF4-FFF2-40B4-BE49-F238E27FC236}">
-                <a16:creationId xmlns="" xmlns:a16="http://schemas.microsoft.com/office/drawing/2014/main" id="{BCAD826D-CAD6-4CF3-A5D6-041A935D82C4}"/>
+                <a16:creationId xmlns:a16="http://schemas.microsoft.com/office/drawing/2014/main" xmlns="" id="{BCAD826D-CAD6-4CF3-A5D6-041A935D82C4}"/>
               </a:ext>
             </a:extLst>
           </p:cNvPr>
@@ -3477,7 +3479,7 @@
           <p:cNvPr id="7" name="Slide Number Placeholder 6">
             <a:extLst>
               <a:ext uri="{FF2B5EF4-FFF2-40B4-BE49-F238E27FC236}">
-                <a16:creationId xmlns="" xmlns:a16="http://schemas.microsoft.com/office/drawing/2014/main" id="{AA9E36FA-D214-4EB0-96FF-09543F4A0929}"/>
+                <a16:creationId xmlns:a16="http://schemas.microsoft.com/office/drawing/2014/main" xmlns="" id="{AA9E36FA-D214-4EB0-96FF-09543F4A0929}"/>
               </a:ext>
             </a:extLst>
           </p:cNvPr>
@@ -3541,7 +3543,7 @@
           <p:cNvPr id="2" name="Title Placeholder 1">
             <a:extLst>
               <a:ext uri="{FF2B5EF4-FFF2-40B4-BE49-F238E27FC236}">
-                <a16:creationId xmlns="" xmlns:a16="http://schemas.microsoft.com/office/drawing/2014/main" id="{E765FBB0-9472-4547-B21C-F7EFBB692F9B}"/>
+                <a16:creationId xmlns:a16="http://schemas.microsoft.com/office/drawing/2014/main" xmlns="" id="{E765FBB0-9472-4547-B21C-F7EFBB692F9B}"/>
               </a:ext>
             </a:extLst>
           </p:cNvPr>
@@ -3579,7 +3581,7 @@
           <p:cNvPr id="3" name="Text Placeholder 2">
             <a:extLst>
               <a:ext uri="{FF2B5EF4-FFF2-40B4-BE49-F238E27FC236}">
-                <a16:creationId xmlns="" xmlns:a16="http://schemas.microsoft.com/office/drawing/2014/main" id="{04ABDCD7-ADC2-47AA-A61C-0055F6D184F1}"/>
+                <a16:creationId xmlns:a16="http://schemas.microsoft.com/office/drawing/2014/main" xmlns="" id="{04ABDCD7-ADC2-47AA-A61C-0055F6D184F1}"/>
               </a:ext>
             </a:extLst>
           </p:cNvPr>
@@ -3646,7 +3648,7 @@
           <p:cNvPr id="4" name="Date Placeholder 3">
             <a:extLst>
               <a:ext uri="{FF2B5EF4-FFF2-40B4-BE49-F238E27FC236}">
-                <a16:creationId xmlns="" xmlns:a16="http://schemas.microsoft.com/office/drawing/2014/main" id="{EDCA4191-D4FB-4135-B478-F17CE46A4EBB}"/>
+                <a16:creationId xmlns:a16="http://schemas.microsoft.com/office/drawing/2014/main" xmlns="" id="{EDCA4191-D4FB-4135-B478-F17CE46A4EBB}"/>
               </a:ext>
             </a:extLst>
           </p:cNvPr>
@@ -3682,7 +3684,7 @@
           <a:p>
             <a:fld id="{FA15CCB3-3DAF-464C-ACDB-4AF7D4EFBAB3}" type="datetimeFigureOut">
               <a:rPr lang="en-US" smtClean="0"/>
-              <a:t>9/29/2017</a:t>
+              <a:t>8/10/2018</a:t>
             </a:fld>
             <a:endParaRPr lang="en-US"/>
           </a:p>
@@ -3693,7 +3695,7 @@
           <p:cNvPr id="5" name="Footer Placeholder 4">
             <a:extLst>
               <a:ext uri="{FF2B5EF4-FFF2-40B4-BE49-F238E27FC236}">
-                <a16:creationId xmlns="" xmlns:a16="http://schemas.microsoft.com/office/drawing/2014/main" id="{01D44996-E737-400D-AA77-EF529D759F59}"/>
+                <a16:creationId xmlns:a16="http://schemas.microsoft.com/office/drawing/2014/main" xmlns="" id="{01D44996-E737-400D-AA77-EF529D759F59}"/>
               </a:ext>
             </a:extLst>
           </p:cNvPr>
@@ -3736,7 +3738,7 @@
           <p:cNvPr id="6" name="Slide Number Placeholder 5">
             <a:extLst>
               <a:ext uri="{FF2B5EF4-FFF2-40B4-BE49-F238E27FC236}">
-                <a16:creationId xmlns="" xmlns:a16="http://schemas.microsoft.com/office/drawing/2014/main" id="{60B18521-BB6D-42B7-86B9-561788C0FC08}"/>
+                <a16:creationId xmlns:a16="http://schemas.microsoft.com/office/drawing/2014/main" xmlns="" id="{60B18521-BB6D-42B7-86B9-561788C0FC08}"/>
               </a:ext>
             </a:extLst>
           </p:cNvPr>
@@ -4104,7 +4106,7 @@
           <p:cNvPr id="60" name="Group 59">
             <a:extLst>
               <a:ext uri="{FF2B5EF4-FFF2-40B4-BE49-F238E27FC236}">
-                <a16:creationId xmlns="" xmlns:a16="http://schemas.microsoft.com/office/drawing/2014/main" id="{49DDB6D7-D67C-4795-BC2B-F36D181B40FD}"/>
+                <a16:creationId xmlns:a16="http://schemas.microsoft.com/office/drawing/2014/main" xmlns="" id="{49DDB6D7-D67C-4795-BC2B-F36D181B40FD}"/>
               </a:ext>
             </a:extLst>
           </p:cNvPr>
@@ -4124,7 +4126,7 @@
             <p:cNvPr id="48" name="Group 47">
               <a:extLst>
                 <a:ext uri="{FF2B5EF4-FFF2-40B4-BE49-F238E27FC236}">
-                  <a16:creationId xmlns="" xmlns:a16="http://schemas.microsoft.com/office/drawing/2014/main" id="{9DCB9AA3-F151-4C06-BDF2-772192554CB8}"/>
+                  <a16:creationId xmlns:a16="http://schemas.microsoft.com/office/drawing/2014/main" xmlns="" id="{9DCB9AA3-F151-4C06-BDF2-772192554CB8}"/>
                 </a:ext>
               </a:extLst>
             </p:cNvPr>
@@ -4151,7 +4153,7 @@
               <p:cNvPr id="5" name="Picture 4">
                 <a:extLst>
                   <a:ext uri="{FF2B5EF4-FFF2-40B4-BE49-F238E27FC236}">
-                    <a16:creationId xmlns="" xmlns:a16="http://schemas.microsoft.com/office/drawing/2014/main" id="{7CAB2C9B-AE1C-4912-97CF-C20C3E33C55A}"/>
+                    <a16:creationId xmlns:a16="http://schemas.microsoft.com/office/drawing/2014/main" xmlns="" id="{7CAB2C9B-AE1C-4912-97CF-C20C3E33C55A}"/>
                   </a:ext>
                 </a:extLst>
               </p:cNvPr>
@@ -4205,7 +4207,7 @@
                   <p14:cNvPr id="22" name="Ink 21">
                     <a:extLst>
                       <a:ext uri="{FF2B5EF4-FFF2-40B4-BE49-F238E27FC236}">
-                        <a16:creationId xmlns="" xmlns:a16="http://schemas.microsoft.com/office/drawing/2014/main" id="{6205DD0C-C8AF-4BD3-AABD-F90EEFD7682B}"/>
+                        <a16:creationId xmlns:a16="http://schemas.microsoft.com/office/drawing/2014/main" xmlns="" id="{6205DD0C-C8AF-4BD3-AABD-F90EEFD7682B}"/>
                       </a:ext>
                     </a:extLst>
                   </p14:cNvPr>
@@ -4255,7 +4257,7 @@
             <p:cNvPr id="49" name="Oval 48">
               <a:extLst>
                 <a:ext uri="{FF2B5EF4-FFF2-40B4-BE49-F238E27FC236}">
-                  <a16:creationId xmlns="" xmlns:a16="http://schemas.microsoft.com/office/drawing/2014/main" id="{2F810603-F2BA-4678-835C-1CEE13D71312}"/>
+                  <a16:creationId xmlns:a16="http://schemas.microsoft.com/office/drawing/2014/main" xmlns="" id="{2F810603-F2BA-4678-835C-1CEE13D71312}"/>
                 </a:ext>
               </a:extLst>
             </p:cNvPr>
@@ -4307,7 +4309,7 @@
             <p:cNvPr id="50" name="Oval 49">
               <a:extLst>
                 <a:ext uri="{FF2B5EF4-FFF2-40B4-BE49-F238E27FC236}">
-                  <a16:creationId xmlns="" xmlns:a16="http://schemas.microsoft.com/office/drawing/2014/main" id="{858F4A02-171E-4043-8210-CC65AE0C4C0E}"/>
+                  <a16:creationId xmlns:a16="http://schemas.microsoft.com/office/drawing/2014/main" xmlns="" id="{858F4A02-171E-4043-8210-CC65AE0C4C0E}"/>
                 </a:ext>
               </a:extLst>
             </p:cNvPr>
@@ -4359,7 +4361,7 @@
             <p:cNvPr id="51" name="Oval 50">
               <a:extLst>
                 <a:ext uri="{FF2B5EF4-FFF2-40B4-BE49-F238E27FC236}">
-                  <a16:creationId xmlns="" xmlns:a16="http://schemas.microsoft.com/office/drawing/2014/main" id="{13548D78-DF90-4713-ADC1-EB50E3FDEB32}"/>
+                  <a16:creationId xmlns:a16="http://schemas.microsoft.com/office/drawing/2014/main" xmlns="" id="{13548D78-DF90-4713-ADC1-EB50E3FDEB32}"/>
                 </a:ext>
               </a:extLst>
             </p:cNvPr>
@@ -4413,7 +4415,7 @@
             <p:cNvPr id="52" name="Oval 51">
               <a:extLst>
                 <a:ext uri="{FF2B5EF4-FFF2-40B4-BE49-F238E27FC236}">
-                  <a16:creationId xmlns="" xmlns:a16="http://schemas.microsoft.com/office/drawing/2014/main" id="{BAAD5FAB-5347-4484-B55F-A813BF4CCD46}"/>
+                  <a16:creationId xmlns:a16="http://schemas.microsoft.com/office/drawing/2014/main" xmlns="" id="{BAAD5FAB-5347-4484-B55F-A813BF4CCD46}"/>
                 </a:ext>
               </a:extLst>
             </p:cNvPr>
@@ -4467,7 +4469,7 @@
             <p:cNvPr id="54" name="Straight Connector 53">
               <a:extLst>
                 <a:ext uri="{FF2B5EF4-FFF2-40B4-BE49-F238E27FC236}">
-                  <a16:creationId xmlns="" xmlns:a16="http://schemas.microsoft.com/office/drawing/2014/main" id="{52AE0F85-D404-4572-99DE-871203465D72}"/>
+                  <a16:creationId xmlns:a16="http://schemas.microsoft.com/office/drawing/2014/main" xmlns="" id="{52AE0F85-D404-4572-99DE-871203465D72}"/>
                 </a:ext>
               </a:extLst>
             </p:cNvPr>
@@ -4510,7 +4512,7 @@
             <p:cNvPr id="58" name="Straight Connector 57">
               <a:extLst>
                 <a:ext uri="{FF2B5EF4-FFF2-40B4-BE49-F238E27FC236}">
-                  <a16:creationId xmlns="" xmlns:a16="http://schemas.microsoft.com/office/drawing/2014/main" id="{5AC8A0DA-CD7C-40F0-9944-C4662120BB38}"/>
+                  <a16:creationId xmlns:a16="http://schemas.microsoft.com/office/drawing/2014/main" xmlns="" id="{5AC8A0DA-CD7C-40F0-9944-C4662120BB38}"/>
                 </a:ext>
               </a:extLst>
             </p:cNvPr>
@@ -4624,7 +4626,7 @@
                 <p:cNvPr id="7" name="Group 6">
                   <a:extLst>
                     <a:ext uri="{FF2B5EF4-FFF2-40B4-BE49-F238E27FC236}">
-                      <a16:creationId xmlns="" xmlns:a16="http://schemas.microsoft.com/office/drawing/2014/main" id="{49DDB6D7-D67C-4795-BC2B-F36D181B40FD}"/>
+                      <a16:creationId xmlns:a16="http://schemas.microsoft.com/office/drawing/2014/main" xmlns="" id="{49DDB6D7-D67C-4795-BC2B-F36D181B40FD}"/>
                     </a:ext>
                   </a:extLst>
                 </p:cNvPr>
@@ -4644,7 +4646,7 @@
                   <p:cNvPr id="13" name="Group 12">
                     <a:extLst>
                       <a:ext uri="{FF2B5EF4-FFF2-40B4-BE49-F238E27FC236}">
-                        <a16:creationId xmlns="" xmlns:a16="http://schemas.microsoft.com/office/drawing/2014/main" id="{9DCB9AA3-F151-4C06-BDF2-772192554CB8}"/>
+                        <a16:creationId xmlns:a16="http://schemas.microsoft.com/office/drawing/2014/main" xmlns="" id="{9DCB9AA3-F151-4C06-BDF2-772192554CB8}"/>
                       </a:ext>
                     </a:extLst>
                   </p:cNvPr>
@@ -4671,7 +4673,7 @@
                     <p:cNvPr id="20" name="Picture 19">
                       <a:extLst>
                         <a:ext uri="{FF2B5EF4-FFF2-40B4-BE49-F238E27FC236}">
-                          <a16:creationId xmlns="" xmlns:a16="http://schemas.microsoft.com/office/drawing/2014/main" id="{7CAB2C9B-AE1C-4912-97CF-C20C3E33C55A}"/>
+                          <a16:creationId xmlns:a16="http://schemas.microsoft.com/office/drawing/2014/main" xmlns="" id="{7CAB2C9B-AE1C-4912-97CF-C20C3E33C55A}"/>
                         </a:ext>
                       </a:extLst>
                     </p:cNvPr>
@@ -4724,7 +4726,7 @@
                         <p14:cNvPr id="21" name="Ink 20">
                           <a:extLst>
                             <a:ext uri="{FF2B5EF4-FFF2-40B4-BE49-F238E27FC236}">
-                              <a16:creationId xmlns="" xmlns:a16="http://schemas.microsoft.com/office/drawing/2014/main" id="{6205DD0C-C8AF-4BD3-AABD-F90EEFD7682B}"/>
+                              <a16:creationId xmlns:a16="http://schemas.microsoft.com/office/drawing/2014/main" xmlns="" id="{6205DD0C-C8AF-4BD3-AABD-F90EEFD7682B}"/>
                             </a:ext>
                           </a:extLst>
                         </p14:cNvPr>
@@ -4774,7 +4776,7 @@
                   <p:cNvPr id="14" name="Oval 13">
                     <a:extLst>
                       <a:ext uri="{FF2B5EF4-FFF2-40B4-BE49-F238E27FC236}">
-                        <a16:creationId xmlns="" xmlns:a16="http://schemas.microsoft.com/office/drawing/2014/main" id="{2F810603-F2BA-4678-835C-1CEE13D71312}"/>
+                        <a16:creationId xmlns:a16="http://schemas.microsoft.com/office/drawing/2014/main" xmlns="" id="{2F810603-F2BA-4678-835C-1CEE13D71312}"/>
                       </a:ext>
                     </a:extLst>
                   </p:cNvPr>
@@ -4826,7 +4828,7 @@
                   <p:cNvPr id="15" name="Oval 14">
                     <a:extLst>
                       <a:ext uri="{FF2B5EF4-FFF2-40B4-BE49-F238E27FC236}">
-                        <a16:creationId xmlns="" xmlns:a16="http://schemas.microsoft.com/office/drawing/2014/main" id="{858F4A02-171E-4043-8210-CC65AE0C4C0E}"/>
+                        <a16:creationId xmlns:a16="http://schemas.microsoft.com/office/drawing/2014/main" xmlns="" id="{858F4A02-171E-4043-8210-CC65AE0C4C0E}"/>
                       </a:ext>
                     </a:extLst>
                   </p:cNvPr>
@@ -4878,7 +4880,7 @@
                   <p:cNvPr id="16" name="Oval 15">
                     <a:extLst>
                       <a:ext uri="{FF2B5EF4-FFF2-40B4-BE49-F238E27FC236}">
-                        <a16:creationId xmlns="" xmlns:a16="http://schemas.microsoft.com/office/drawing/2014/main" id="{13548D78-DF90-4713-ADC1-EB50E3FDEB32}"/>
+                        <a16:creationId xmlns:a16="http://schemas.microsoft.com/office/drawing/2014/main" xmlns="" id="{13548D78-DF90-4713-ADC1-EB50E3FDEB32}"/>
                       </a:ext>
                     </a:extLst>
                   </p:cNvPr>
@@ -4932,7 +4934,7 @@
                   <p:cNvPr id="17" name="Oval 16">
                     <a:extLst>
                       <a:ext uri="{FF2B5EF4-FFF2-40B4-BE49-F238E27FC236}">
-                        <a16:creationId xmlns="" xmlns:a16="http://schemas.microsoft.com/office/drawing/2014/main" id="{BAAD5FAB-5347-4484-B55F-A813BF4CCD46}"/>
+                        <a16:creationId xmlns:a16="http://schemas.microsoft.com/office/drawing/2014/main" xmlns="" id="{BAAD5FAB-5347-4484-B55F-A813BF4CCD46}"/>
                       </a:ext>
                     </a:extLst>
                   </p:cNvPr>
@@ -4986,7 +4988,7 @@
                   <p:cNvPr id="18" name="Straight Connector 17">
                     <a:extLst>
                       <a:ext uri="{FF2B5EF4-FFF2-40B4-BE49-F238E27FC236}">
-                        <a16:creationId xmlns="" xmlns:a16="http://schemas.microsoft.com/office/drawing/2014/main" id="{52AE0F85-D404-4572-99DE-871203465D72}"/>
+                        <a16:creationId xmlns:a16="http://schemas.microsoft.com/office/drawing/2014/main" xmlns="" id="{52AE0F85-D404-4572-99DE-871203465D72}"/>
                       </a:ext>
                     </a:extLst>
                   </p:cNvPr>
@@ -5029,7 +5031,7 @@
                   <p:cNvPr id="19" name="Straight Connector 18">
                     <a:extLst>
                       <a:ext uri="{FF2B5EF4-FFF2-40B4-BE49-F238E27FC236}">
-                        <a16:creationId xmlns="" xmlns:a16="http://schemas.microsoft.com/office/drawing/2014/main" id="{5AC8A0DA-CD7C-40F0-9944-C4662120BB38}"/>
+                        <a16:creationId xmlns:a16="http://schemas.microsoft.com/office/drawing/2014/main" xmlns="" id="{5AC8A0DA-CD7C-40F0-9944-C4662120BB38}"/>
                       </a:ext>
                     </a:extLst>
                   </p:cNvPr>
@@ -5071,7 +5073,7 @@
                 <p:cNvPr id="8" name="Straight Connector 7">
                   <a:extLst>
                     <a:ext uri="{FF2B5EF4-FFF2-40B4-BE49-F238E27FC236}">
-                      <a16:creationId xmlns="" xmlns:a16="http://schemas.microsoft.com/office/drawing/2014/main" id="{52AE0F85-D404-4572-99DE-871203465D72}"/>
+                      <a16:creationId xmlns:a16="http://schemas.microsoft.com/office/drawing/2014/main" xmlns="" id="{52AE0F85-D404-4572-99DE-871203465D72}"/>
                     </a:ext>
                   </a:extLst>
                 </p:cNvPr>
@@ -5114,7 +5116,7 @@
                 <p:cNvPr id="9" name="Straight Connector 8">
                   <a:extLst>
                     <a:ext uri="{FF2B5EF4-FFF2-40B4-BE49-F238E27FC236}">
-                      <a16:creationId xmlns="" xmlns:a16="http://schemas.microsoft.com/office/drawing/2014/main" id="{5AC8A0DA-CD7C-40F0-9944-C4662120BB38}"/>
+                      <a16:creationId xmlns:a16="http://schemas.microsoft.com/office/drawing/2014/main" xmlns="" id="{5AC8A0DA-CD7C-40F0-9944-C4662120BB38}"/>
                     </a:ext>
                   </a:extLst>
                 </p:cNvPr>
@@ -5209,11 +5211,7 @@
                 <a:p>
                   <a:r>
                     <a:rPr lang="en-US" sz="1600" dirty="0" smtClean="0"/>
-                    <a:t>Smile </a:t>
-                  </a:r>
-                  <a:r>
-                    <a:rPr lang="en-US" sz="1600" dirty="0" smtClean="0"/>
-                    <a:t>angle</a:t>
+                    <a:t>Smile angle</a:t>
                   </a:r>
                 </a:p>
                 <a:p>
@@ -5422,7 +5420,7 @@
               <p:cNvPr id="7" name="Group 6">
                 <a:extLst>
                   <a:ext uri="{FF2B5EF4-FFF2-40B4-BE49-F238E27FC236}">
-                    <a16:creationId xmlns="" xmlns:a16="http://schemas.microsoft.com/office/drawing/2014/main" id="{49DDB6D7-D67C-4795-BC2B-F36D181B40FD}"/>
+                    <a16:creationId xmlns:a16="http://schemas.microsoft.com/office/drawing/2014/main" xmlns="" id="{49DDB6D7-D67C-4795-BC2B-F36D181B40FD}"/>
                   </a:ext>
                 </a:extLst>
               </p:cNvPr>
@@ -5442,7 +5440,7 @@
                 <p:cNvPr id="13" name="Group 12">
                   <a:extLst>
                     <a:ext uri="{FF2B5EF4-FFF2-40B4-BE49-F238E27FC236}">
-                      <a16:creationId xmlns="" xmlns:a16="http://schemas.microsoft.com/office/drawing/2014/main" id="{9DCB9AA3-F151-4C06-BDF2-772192554CB8}"/>
+                      <a16:creationId xmlns:a16="http://schemas.microsoft.com/office/drawing/2014/main" xmlns="" id="{9DCB9AA3-F151-4C06-BDF2-772192554CB8}"/>
                     </a:ext>
                   </a:extLst>
                 </p:cNvPr>
@@ -5469,7 +5467,7 @@
                   <p:cNvPr id="20" name="Picture 19">
                     <a:extLst>
                       <a:ext uri="{FF2B5EF4-FFF2-40B4-BE49-F238E27FC236}">
-                        <a16:creationId xmlns="" xmlns:a16="http://schemas.microsoft.com/office/drawing/2014/main" id="{7CAB2C9B-AE1C-4912-97CF-C20C3E33C55A}"/>
+                        <a16:creationId xmlns:a16="http://schemas.microsoft.com/office/drawing/2014/main" xmlns="" id="{7CAB2C9B-AE1C-4912-97CF-C20C3E33C55A}"/>
                       </a:ext>
                     </a:extLst>
                   </p:cNvPr>
@@ -5522,7 +5520,7 @@
                       <p14:cNvPr id="21" name="Ink 20">
                         <a:extLst>
                           <a:ext uri="{FF2B5EF4-FFF2-40B4-BE49-F238E27FC236}">
-                            <a16:creationId xmlns="" xmlns:a16="http://schemas.microsoft.com/office/drawing/2014/main" id="{6205DD0C-C8AF-4BD3-AABD-F90EEFD7682B}"/>
+                            <a16:creationId xmlns:a16="http://schemas.microsoft.com/office/drawing/2014/main" xmlns="" id="{6205DD0C-C8AF-4BD3-AABD-F90EEFD7682B}"/>
                           </a:ext>
                         </a:extLst>
                       </p14:cNvPr>
@@ -5572,7 +5570,7 @@
                 <p:cNvPr id="14" name="Oval 13">
                   <a:extLst>
                     <a:ext uri="{FF2B5EF4-FFF2-40B4-BE49-F238E27FC236}">
-                      <a16:creationId xmlns="" xmlns:a16="http://schemas.microsoft.com/office/drawing/2014/main" id="{2F810603-F2BA-4678-835C-1CEE13D71312}"/>
+                      <a16:creationId xmlns:a16="http://schemas.microsoft.com/office/drawing/2014/main" xmlns="" id="{2F810603-F2BA-4678-835C-1CEE13D71312}"/>
                     </a:ext>
                   </a:extLst>
                 </p:cNvPr>
@@ -5624,7 +5622,7 @@
                 <p:cNvPr id="15" name="Oval 14">
                   <a:extLst>
                     <a:ext uri="{FF2B5EF4-FFF2-40B4-BE49-F238E27FC236}">
-                      <a16:creationId xmlns="" xmlns:a16="http://schemas.microsoft.com/office/drawing/2014/main" id="{858F4A02-171E-4043-8210-CC65AE0C4C0E}"/>
+                      <a16:creationId xmlns:a16="http://schemas.microsoft.com/office/drawing/2014/main" xmlns="" id="{858F4A02-171E-4043-8210-CC65AE0C4C0E}"/>
                     </a:ext>
                   </a:extLst>
                 </p:cNvPr>
@@ -5676,7 +5674,7 @@
                 <p:cNvPr id="16" name="Oval 15">
                   <a:extLst>
                     <a:ext uri="{FF2B5EF4-FFF2-40B4-BE49-F238E27FC236}">
-                      <a16:creationId xmlns="" xmlns:a16="http://schemas.microsoft.com/office/drawing/2014/main" id="{13548D78-DF90-4713-ADC1-EB50E3FDEB32}"/>
+                      <a16:creationId xmlns:a16="http://schemas.microsoft.com/office/drawing/2014/main" xmlns="" id="{13548D78-DF90-4713-ADC1-EB50E3FDEB32}"/>
                     </a:ext>
                   </a:extLst>
                 </p:cNvPr>
@@ -5730,7 +5728,7 @@
                 <p:cNvPr id="17" name="Oval 16">
                   <a:extLst>
                     <a:ext uri="{FF2B5EF4-FFF2-40B4-BE49-F238E27FC236}">
-                      <a16:creationId xmlns="" xmlns:a16="http://schemas.microsoft.com/office/drawing/2014/main" id="{BAAD5FAB-5347-4484-B55F-A813BF4CCD46}"/>
+                      <a16:creationId xmlns:a16="http://schemas.microsoft.com/office/drawing/2014/main" xmlns="" id="{BAAD5FAB-5347-4484-B55F-A813BF4CCD46}"/>
                     </a:ext>
                   </a:extLst>
                 </p:cNvPr>
@@ -5784,7 +5782,7 @@
                 <p:cNvPr id="18" name="Straight Connector 17">
                   <a:extLst>
                     <a:ext uri="{FF2B5EF4-FFF2-40B4-BE49-F238E27FC236}">
-                      <a16:creationId xmlns="" xmlns:a16="http://schemas.microsoft.com/office/drawing/2014/main" id="{52AE0F85-D404-4572-99DE-871203465D72}"/>
+                      <a16:creationId xmlns:a16="http://schemas.microsoft.com/office/drawing/2014/main" xmlns="" id="{52AE0F85-D404-4572-99DE-871203465D72}"/>
                     </a:ext>
                   </a:extLst>
                 </p:cNvPr>
@@ -5827,7 +5825,7 @@
                 <p:cNvPr id="19" name="Straight Connector 18">
                   <a:extLst>
                     <a:ext uri="{FF2B5EF4-FFF2-40B4-BE49-F238E27FC236}">
-                      <a16:creationId xmlns="" xmlns:a16="http://schemas.microsoft.com/office/drawing/2014/main" id="{5AC8A0DA-CD7C-40F0-9944-C4662120BB38}"/>
+                      <a16:creationId xmlns:a16="http://schemas.microsoft.com/office/drawing/2014/main" xmlns="" id="{5AC8A0DA-CD7C-40F0-9944-C4662120BB38}"/>
                     </a:ext>
                   </a:extLst>
                 </p:cNvPr>
@@ -5869,7 +5867,7 @@
               <p:cNvPr id="8" name="Straight Connector 7">
                 <a:extLst>
                   <a:ext uri="{FF2B5EF4-FFF2-40B4-BE49-F238E27FC236}">
-                    <a16:creationId xmlns="" xmlns:a16="http://schemas.microsoft.com/office/drawing/2014/main" id="{52AE0F85-D404-4572-99DE-871203465D72}"/>
+                    <a16:creationId xmlns:a16="http://schemas.microsoft.com/office/drawing/2014/main" xmlns="" id="{52AE0F85-D404-4572-99DE-871203465D72}"/>
                   </a:ext>
                 </a:extLst>
               </p:cNvPr>
@@ -5912,7 +5910,7 @@
               <p:cNvPr id="9" name="Straight Connector 8">
                 <a:extLst>
                   <a:ext uri="{FF2B5EF4-FFF2-40B4-BE49-F238E27FC236}">
-                    <a16:creationId xmlns="" xmlns:a16="http://schemas.microsoft.com/office/drawing/2014/main" id="{5AC8A0DA-CD7C-40F0-9944-C4662120BB38}"/>
+                    <a16:creationId xmlns:a16="http://schemas.microsoft.com/office/drawing/2014/main" xmlns="" id="{5AC8A0DA-CD7C-40F0-9944-C4662120BB38}"/>
                   </a:ext>
                 </a:extLst>
               </p:cNvPr>
@@ -6007,11 +6005,7 @@
               <a:p>
                 <a:r>
                   <a:rPr lang="en-US" sz="1600" dirty="0" smtClean="0"/>
-                  <a:t>Smile </a:t>
-                </a:r>
-                <a:r>
-                  <a:rPr lang="en-US" sz="1600" dirty="0" smtClean="0"/>
-                  <a:t>angle</a:t>
+                  <a:t>Smile angle</a:t>
                 </a:r>
               </a:p>
               <a:p>
@@ -6155,7 +6149,7 @@
             <p:cNvPr id="4" name="Group 3">
               <a:extLst>
                 <a:ext uri="{FF2B5EF4-FFF2-40B4-BE49-F238E27FC236}">
-                  <a16:creationId xmlns="" xmlns:a16="http://schemas.microsoft.com/office/drawing/2014/main" id="{49DDB6D7-D67C-4795-BC2B-F36D181B40FD}"/>
+                  <a16:creationId xmlns:a16="http://schemas.microsoft.com/office/drawing/2014/main" xmlns="" id="{49DDB6D7-D67C-4795-BC2B-F36D181B40FD}"/>
                 </a:ext>
               </a:extLst>
             </p:cNvPr>
@@ -6175,7 +6169,7 @@
               <p:cNvPr id="5" name="Group 4">
                 <a:extLst>
                   <a:ext uri="{FF2B5EF4-FFF2-40B4-BE49-F238E27FC236}">
-                    <a16:creationId xmlns="" xmlns:a16="http://schemas.microsoft.com/office/drawing/2014/main" id="{9DCB9AA3-F151-4C06-BDF2-772192554CB8}"/>
+                    <a16:creationId xmlns:a16="http://schemas.microsoft.com/office/drawing/2014/main" xmlns="" id="{9DCB9AA3-F151-4C06-BDF2-772192554CB8}"/>
                   </a:ext>
                 </a:extLst>
               </p:cNvPr>
@@ -6202,7 +6196,7 @@
                 <p:cNvPr id="12" name="Picture 11">
                   <a:extLst>
                     <a:ext uri="{FF2B5EF4-FFF2-40B4-BE49-F238E27FC236}">
-                      <a16:creationId xmlns="" xmlns:a16="http://schemas.microsoft.com/office/drawing/2014/main" id="{7CAB2C9B-AE1C-4912-97CF-C20C3E33C55A}"/>
+                      <a16:creationId xmlns:a16="http://schemas.microsoft.com/office/drawing/2014/main" xmlns="" id="{7CAB2C9B-AE1C-4912-97CF-C20C3E33C55A}"/>
                     </a:ext>
                   </a:extLst>
                 </p:cNvPr>
@@ -6255,7 +6249,7 @@
                     <p14:cNvPr id="13" name="Ink 12">
                       <a:extLst>
                         <a:ext uri="{FF2B5EF4-FFF2-40B4-BE49-F238E27FC236}">
-                          <a16:creationId xmlns="" xmlns:a16="http://schemas.microsoft.com/office/drawing/2014/main" id="{6205DD0C-C8AF-4BD3-AABD-F90EEFD7682B}"/>
+                          <a16:creationId xmlns:a16="http://schemas.microsoft.com/office/drawing/2014/main" xmlns="" id="{6205DD0C-C8AF-4BD3-AABD-F90EEFD7682B}"/>
                         </a:ext>
                       </a:extLst>
                     </p14:cNvPr>
@@ -6305,7 +6299,7 @@
               <p:cNvPr id="11" name="Straight Connector 10">
                 <a:extLst>
                   <a:ext uri="{FF2B5EF4-FFF2-40B4-BE49-F238E27FC236}">
-                    <a16:creationId xmlns="" xmlns:a16="http://schemas.microsoft.com/office/drawing/2014/main" id="{5AC8A0DA-CD7C-40F0-9944-C4662120BB38}"/>
+                    <a16:creationId xmlns:a16="http://schemas.microsoft.com/office/drawing/2014/main" xmlns="" id="{5AC8A0DA-CD7C-40F0-9944-C4662120BB38}"/>
                   </a:ext>
                 </a:extLst>
               </p:cNvPr>
@@ -6347,7 +6341,7 @@
             <p:cNvPr id="14" name="Straight Connector 13">
               <a:extLst>
                 <a:ext uri="{FF2B5EF4-FFF2-40B4-BE49-F238E27FC236}">
-                  <a16:creationId xmlns="" xmlns:a16="http://schemas.microsoft.com/office/drawing/2014/main" id="{52AE0F85-D404-4572-99DE-871203465D72}"/>
+                  <a16:creationId xmlns:a16="http://schemas.microsoft.com/office/drawing/2014/main" xmlns="" id="{52AE0F85-D404-4572-99DE-871203465D72}"/>
                 </a:ext>
               </a:extLst>
             </p:cNvPr>
@@ -6390,7 +6384,7 @@
             <p:cNvPr id="15" name="Straight Connector 14">
               <a:extLst>
                 <a:ext uri="{FF2B5EF4-FFF2-40B4-BE49-F238E27FC236}">
-                  <a16:creationId xmlns="" xmlns:a16="http://schemas.microsoft.com/office/drawing/2014/main" id="{52AE0F85-D404-4572-99DE-871203465D72}"/>
+                  <a16:creationId xmlns:a16="http://schemas.microsoft.com/office/drawing/2014/main" xmlns="" id="{52AE0F85-D404-4572-99DE-871203465D72}"/>
                 </a:ext>
               </a:extLst>
             </p:cNvPr>
@@ -6433,7 +6427,7 @@
             <p:cNvPr id="16" name="Straight Connector 15">
               <a:extLst>
                 <a:ext uri="{FF2B5EF4-FFF2-40B4-BE49-F238E27FC236}">
-                  <a16:creationId xmlns="" xmlns:a16="http://schemas.microsoft.com/office/drawing/2014/main" id="{5AC8A0DA-CD7C-40F0-9944-C4662120BB38}"/>
+                  <a16:creationId xmlns:a16="http://schemas.microsoft.com/office/drawing/2014/main" xmlns="" id="{5AC8A0DA-CD7C-40F0-9944-C4662120BB38}"/>
                 </a:ext>
               </a:extLst>
             </p:cNvPr>
@@ -6631,7 +6625,7 @@
             <p:cNvPr id="4" name="Group 3">
               <a:extLst>
                 <a:ext uri="{FF2B5EF4-FFF2-40B4-BE49-F238E27FC236}">
-                  <a16:creationId xmlns="" xmlns:a16="http://schemas.microsoft.com/office/drawing/2014/main" id="{49DDB6D7-D67C-4795-BC2B-F36D181B40FD}"/>
+                  <a16:creationId xmlns:a16="http://schemas.microsoft.com/office/drawing/2014/main" xmlns="" id="{49DDB6D7-D67C-4795-BC2B-F36D181B40FD}"/>
                 </a:ext>
               </a:extLst>
             </p:cNvPr>
@@ -6651,7 +6645,7 @@
               <p:cNvPr id="5" name="Group 4">
                 <a:extLst>
                   <a:ext uri="{FF2B5EF4-FFF2-40B4-BE49-F238E27FC236}">
-                    <a16:creationId xmlns="" xmlns:a16="http://schemas.microsoft.com/office/drawing/2014/main" id="{9DCB9AA3-F151-4C06-BDF2-772192554CB8}"/>
+                    <a16:creationId xmlns:a16="http://schemas.microsoft.com/office/drawing/2014/main" xmlns="" id="{9DCB9AA3-F151-4C06-BDF2-772192554CB8}"/>
                   </a:ext>
                 </a:extLst>
               </p:cNvPr>
@@ -6678,7 +6672,7 @@
                 <p:cNvPr id="12" name="Picture 11">
                   <a:extLst>
                     <a:ext uri="{FF2B5EF4-FFF2-40B4-BE49-F238E27FC236}">
-                      <a16:creationId xmlns="" xmlns:a16="http://schemas.microsoft.com/office/drawing/2014/main" id="{7CAB2C9B-AE1C-4912-97CF-C20C3E33C55A}"/>
+                      <a16:creationId xmlns:a16="http://schemas.microsoft.com/office/drawing/2014/main" xmlns="" id="{7CAB2C9B-AE1C-4912-97CF-C20C3E33C55A}"/>
                     </a:ext>
                   </a:extLst>
                 </p:cNvPr>
@@ -6731,7 +6725,7 @@
                     <p14:cNvPr id="13" name="Ink 12">
                       <a:extLst>
                         <a:ext uri="{FF2B5EF4-FFF2-40B4-BE49-F238E27FC236}">
-                          <a16:creationId xmlns="" xmlns:a16="http://schemas.microsoft.com/office/drawing/2014/main" id="{6205DD0C-C8AF-4BD3-AABD-F90EEFD7682B}"/>
+                          <a16:creationId xmlns:a16="http://schemas.microsoft.com/office/drawing/2014/main" xmlns="" id="{6205DD0C-C8AF-4BD3-AABD-F90EEFD7682B}"/>
                         </a:ext>
                       </a:extLst>
                     </p14:cNvPr>
@@ -6781,7 +6775,7 @@
               <p:cNvPr id="11" name="Straight Connector 10">
                 <a:extLst>
                   <a:ext uri="{FF2B5EF4-FFF2-40B4-BE49-F238E27FC236}">
-                    <a16:creationId xmlns="" xmlns:a16="http://schemas.microsoft.com/office/drawing/2014/main" id="{5AC8A0DA-CD7C-40F0-9944-C4662120BB38}"/>
+                    <a16:creationId xmlns:a16="http://schemas.microsoft.com/office/drawing/2014/main" xmlns="" id="{5AC8A0DA-CD7C-40F0-9944-C4662120BB38}"/>
                   </a:ext>
                 </a:extLst>
               </p:cNvPr>
@@ -6823,7 +6817,7 @@
             <p:cNvPr id="14" name="Straight Connector 13">
               <a:extLst>
                 <a:ext uri="{FF2B5EF4-FFF2-40B4-BE49-F238E27FC236}">
-                  <a16:creationId xmlns="" xmlns:a16="http://schemas.microsoft.com/office/drawing/2014/main" id="{52AE0F85-D404-4572-99DE-871203465D72}"/>
+                  <a16:creationId xmlns:a16="http://schemas.microsoft.com/office/drawing/2014/main" xmlns="" id="{52AE0F85-D404-4572-99DE-871203465D72}"/>
                 </a:ext>
               </a:extLst>
             </p:cNvPr>
@@ -6866,7 +6860,7 @@
             <p:cNvPr id="15" name="Straight Connector 14">
               <a:extLst>
                 <a:ext uri="{FF2B5EF4-FFF2-40B4-BE49-F238E27FC236}">
-                  <a16:creationId xmlns="" xmlns:a16="http://schemas.microsoft.com/office/drawing/2014/main" id="{52AE0F85-D404-4572-99DE-871203465D72}"/>
+                  <a16:creationId xmlns:a16="http://schemas.microsoft.com/office/drawing/2014/main" xmlns="" id="{52AE0F85-D404-4572-99DE-871203465D72}"/>
                 </a:ext>
               </a:extLst>
             </p:cNvPr>
@@ -6909,7 +6903,7 @@
             <p:cNvPr id="16" name="Straight Connector 15">
               <a:extLst>
                 <a:ext uri="{FF2B5EF4-FFF2-40B4-BE49-F238E27FC236}">
-                  <a16:creationId xmlns="" xmlns:a16="http://schemas.microsoft.com/office/drawing/2014/main" id="{5AC8A0DA-CD7C-40F0-9944-C4662120BB38}"/>
+                  <a16:creationId xmlns:a16="http://schemas.microsoft.com/office/drawing/2014/main" xmlns="" id="{5AC8A0DA-CD7C-40F0-9944-C4662120BB38}"/>
                 </a:ext>
               </a:extLst>
             </p:cNvPr>
@@ -7078,7 +7072,7 @@
               <p:cNvPr id="5" name="Group 4">
                 <a:extLst>
                   <a:ext uri="{FF2B5EF4-FFF2-40B4-BE49-F238E27FC236}">
-                    <a16:creationId xmlns="" xmlns:a16="http://schemas.microsoft.com/office/drawing/2014/main" id="{49DDB6D7-D67C-4795-BC2B-F36D181B40FD}"/>
+                    <a16:creationId xmlns:a16="http://schemas.microsoft.com/office/drawing/2014/main" xmlns="" id="{49DDB6D7-D67C-4795-BC2B-F36D181B40FD}"/>
                   </a:ext>
                 </a:extLst>
               </p:cNvPr>
@@ -7098,7 +7092,7 @@
                 <p:cNvPr id="12" name="Group 11">
                   <a:extLst>
                     <a:ext uri="{FF2B5EF4-FFF2-40B4-BE49-F238E27FC236}">
-                      <a16:creationId xmlns="" xmlns:a16="http://schemas.microsoft.com/office/drawing/2014/main" id="{9DCB9AA3-F151-4C06-BDF2-772192554CB8}"/>
+                      <a16:creationId xmlns:a16="http://schemas.microsoft.com/office/drawing/2014/main" xmlns="" id="{9DCB9AA3-F151-4C06-BDF2-772192554CB8}"/>
                     </a:ext>
                   </a:extLst>
                 </p:cNvPr>
@@ -7125,7 +7119,7 @@
                   <p:cNvPr id="14" name="Picture 13">
                     <a:extLst>
                       <a:ext uri="{FF2B5EF4-FFF2-40B4-BE49-F238E27FC236}">
-                        <a16:creationId xmlns="" xmlns:a16="http://schemas.microsoft.com/office/drawing/2014/main" id="{7CAB2C9B-AE1C-4912-97CF-C20C3E33C55A}"/>
+                        <a16:creationId xmlns:a16="http://schemas.microsoft.com/office/drawing/2014/main" xmlns="" id="{7CAB2C9B-AE1C-4912-97CF-C20C3E33C55A}"/>
                       </a:ext>
                     </a:extLst>
                   </p:cNvPr>
@@ -7178,7 +7172,7 @@
                       <p14:cNvPr id="15" name="Ink 14">
                         <a:extLst>
                           <a:ext uri="{FF2B5EF4-FFF2-40B4-BE49-F238E27FC236}">
-                            <a16:creationId xmlns="" xmlns:a16="http://schemas.microsoft.com/office/drawing/2014/main" id="{6205DD0C-C8AF-4BD3-AABD-F90EEFD7682B}"/>
+                            <a16:creationId xmlns:a16="http://schemas.microsoft.com/office/drawing/2014/main" xmlns="" id="{6205DD0C-C8AF-4BD3-AABD-F90EEFD7682B}"/>
                           </a:ext>
                         </a:extLst>
                       </p14:cNvPr>
@@ -7228,7 +7222,7 @@
                 <p:cNvPr id="13" name="Straight Connector 12">
                   <a:extLst>
                     <a:ext uri="{FF2B5EF4-FFF2-40B4-BE49-F238E27FC236}">
-                      <a16:creationId xmlns="" xmlns:a16="http://schemas.microsoft.com/office/drawing/2014/main" id="{5AC8A0DA-CD7C-40F0-9944-C4662120BB38}"/>
+                      <a16:creationId xmlns:a16="http://schemas.microsoft.com/office/drawing/2014/main" xmlns="" id="{5AC8A0DA-CD7C-40F0-9944-C4662120BB38}"/>
                     </a:ext>
                   </a:extLst>
                 </p:cNvPr>
@@ -7270,7 +7264,7 @@
               <p:cNvPr id="6" name="Straight Connector 5">
                 <a:extLst>
                   <a:ext uri="{FF2B5EF4-FFF2-40B4-BE49-F238E27FC236}">
-                    <a16:creationId xmlns="" xmlns:a16="http://schemas.microsoft.com/office/drawing/2014/main" id="{52AE0F85-D404-4572-99DE-871203465D72}"/>
+                    <a16:creationId xmlns:a16="http://schemas.microsoft.com/office/drawing/2014/main" xmlns="" id="{52AE0F85-D404-4572-99DE-871203465D72}"/>
                   </a:ext>
                 </a:extLst>
               </p:cNvPr>
@@ -7313,7 +7307,7 @@
               <p:cNvPr id="7" name="Straight Connector 6">
                 <a:extLst>
                   <a:ext uri="{FF2B5EF4-FFF2-40B4-BE49-F238E27FC236}">
-                    <a16:creationId xmlns="" xmlns:a16="http://schemas.microsoft.com/office/drawing/2014/main" id="{52AE0F85-D404-4572-99DE-871203465D72}"/>
+                    <a16:creationId xmlns:a16="http://schemas.microsoft.com/office/drawing/2014/main" xmlns="" id="{52AE0F85-D404-4572-99DE-871203465D72}"/>
                   </a:ext>
                 </a:extLst>
               </p:cNvPr>
@@ -7356,7 +7350,7 @@
               <p:cNvPr id="8" name="Straight Connector 7">
                 <a:extLst>
                   <a:ext uri="{FF2B5EF4-FFF2-40B4-BE49-F238E27FC236}">
-                    <a16:creationId xmlns="" xmlns:a16="http://schemas.microsoft.com/office/drawing/2014/main" id="{5AC8A0DA-CD7C-40F0-9944-C4662120BB38}"/>
+                    <a16:creationId xmlns:a16="http://schemas.microsoft.com/office/drawing/2014/main" xmlns="" id="{5AC8A0DA-CD7C-40F0-9944-C4662120BB38}"/>
                   </a:ext>
                 </a:extLst>
               </p:cNvPr>
@@ -7448,7 +7442,7 @@
             <p:cNvPr id="17" name="Straight Connector 16">
               <a:extLst>
                 <a:ext uri="{FF2B5EF4-FFF2-40B4-BE49-F238E27FC236}">
-                  <a16:creationId xmlns="" xmlns:a16="http://schemas.microsoft.com/office/drawing/2014/main" id="{5AC8A0DA-CD7C-40F0-9944-C4662120BB38}"/>
+                  <a16:creationId xmlns:a16="http://schemas.microsoft.com/office/drawing/2014/main" xmlns="" id="{5AC8A0DA-CD7C-40F0-9944-C4662120BB38}"/>
                 </a:ext>
               </a:extLst>
             </p:cNvPr>
@@ -7490,7 +7484,7 @@
             <p:cNvPr id="20" name="Straight Connector 19">
               <a:extLst>
                 <a:ext uri="{FF2B5EF4-FFF2-40B4-BE49-F238E27FC236}">
-                  <a16:creationId xmlns="" xmlns:a16="http://schemas.microsoft.com/office/drawing/2014/main" id="{5AC8A0DA-CD7C-40F0-9944-C4662120BB38}"/>
+                  <a16:creationId xmlns:a16="http://schemas.microsoft.com/office/drawing/2014/main" xmlns="" id="{5AC8A0DA-CD7C-40F0-9944-C4662120BB38}"/>
                 </a:ext>
               </a:extLst>
             </p:cNvPr>
@@ -7756,7 +7750,7 @@
               <p:cNvPr id="5" name="Group 4">
                 <a:extLst>
                   <a:ext uri="{FF2B5EF4-FFF2-40B4-BE49-F238E27FC236}">
-                    <a16:creationId xmlns="" xmlns:a16="http://schemas.microsoft.com/office/drawing/2014/main" id="{49DDB6D7-D67C-4795-BC2B-F36D181B40FD}"/>
+                    <a16:creationId xmlns:a16="http://schemas.microsoft.com/office/drawing/2014/main" xmlns="" id="{49DDB6D7-D67C-4795-BC2B-F36D181B40FD}"/>
                   </a:ext>
                 </a:extLst>
               </p:cNvPr>
@@ -7776,7 +7770,7 @@
                 <p:cNvPr id="12" name="Group 11">
                   <a:extLst>
                     <a:ext uri="{FF2B5EF4-FFF2-40B4-BE49-F238E27FC236}">
-                      <a16:creationId xmlns="" xmlns:a16="http://schemas.microsoft.com/office/drawing/2014/main" id="{9DCB9AA3-F151-4C06-BDF2-772192554CB8}"/>
+                      <a16:creationId xmlns:a16="http://schemas.microsoft.com/office/drawing/2014/main" xmlns="" id="{9DCB9AA3-F151-4C06-BDF2-772192554CB8}"/>
                     </a:ext>
                   </a:extLst>
                 </p:cNvPr>
@@ -7803,7 +7797,7 @@
                   <p:cNvPr id="14" name="Picture 13">
                     <a:extLst>
                       <a:ext uri="{FF2B5EF4-FFF2-40B4-BE49-F238E27FC236}">
-                        <a16:creationId xmlns="" xmlns:a16="http://schemas.microsoft.com/office/drawing/2014/main" id="{7CAB2C9B-AE1C-4912-97CF-C20C3E33C55A}"/>
+                        <a16:creationId xmlns:a16="http://schemas.microsoft.com/office/drawing/2014/main" xmlns="" id="{7CAB2C9B-AE1C-4912-97CF-C20C3E33C55A}"/>
                       </a:ext>
                     </a:extLst>
                   </p:cNvPr>
@@ -7856,7 +7850,7 @@
                       <p14:cNvPr id="15" name="Ink 14">
                         <a:extLst>
                           <a:ext uri="{FF2B5EF4-FFF2-40B4-BE49-F238E27FC236}">
-                            <a16:creationId xmlns="" xmlns:a16="http://schemas.microsoft.com/office/drawing/2014/main" id="{6205DD0C-C8AF-4BD3-AABD-F90EEFD7682B}"/>
+                            <a16:creationId xmlns:a16="http://schemas.microsoft.com/office/drawing/2014/main" xmlns="" id="{6205DD0C-C8AF-4BD3-AABD-F90EEFD7682B}"/>
                           </a:ext>
                         </a:extLst>
                       </p14:cNvPr>
@@ -7906,7 +7900,7 @@
                 <p:cNvPr id="13" name="Straight Connector 12">
                   <a:extLst>
                     <a:ext uri="{FF2B5EF4-FFF2-40B4-BE49-F238E27FC236}">
-                      <a16:creationId xmlns="" xmlns:a16="http://schemas.microsoft.com/office/drawing/2014/main" id="{5AC8A0DA-CD7C-40F0-9944-C4662120BB38}"/>
+                      <a16:creationId xmlns:a16="http://schemas.microsoft.com/office/drawing/2014/main" xmlns="" id="{5AC8A0DA-CD7C-40F0-9944-C4662120BB38}"/>
                     </a:ext>
                   </a:extLst>
                 </p:cNvPr>
@@ -7948,7 +7942,7 @@
               <p:cNvPr id="6" name="Straight Connector 5">
                 <a:extLst>
                   <a:ext uri="{FF2B5EF4-FFF2-40B4-BE49-F238E27FC236}">
-                    <a16:creationId xmlns="" xmlns:a16="http://schemas.microsoft.com/office/drawing/2014/main" id="{52AE0F85-D404-4572-99DE-871203465D72}"/>
+                    <a16:creationId xmlns:a16="http://schemas.microsoft.com/office/drawing/2014/main" xmlns="" id="{52AE0F85-D404-4572-99DE-871203465D72}"/>
                   </a:ext>
                 </a:extLst>
               </p:cNvPr>
@@ -7991,7 +7985,7 @@
               <p:cNvPr id="7" name="Straight Connector 6">
                 <a:extLst>
                   <a:ext uri="{FF2B5EF4-FFF2-40B4-BE49-F238E27FC236}">
-                    <a16:creationId xmlns="" xmlns:a16="http://schemas.microsoft.com/office/drawing/2014/main" id="{52AE0F85-D404-4572-99DE-871203465D72}"/>
+                    <a16:creationId xmlns:a16="http://schemas.microsoft.com/office/drawing/2014/main" xmlns="" id="{52AE0F85-D404-4572-99DE-871203465D72}"/>
                   </a:ext>
                 </a:extLst>
               </p:cNvPr>
@@ -8034,7 +8028,7 @@
               <p:cNvPr id="8" name="Straight Connector 7">
                 <a:extLst>
                   <a:ext uri="{FF2B5EF4-FFF2-40B4-BE49-F238E27FC236}">
-                    <a16:creationId xmlns="" xmlns:a16="http://schemas.microsoft.com/office/drawing/2014/main" id="{5AC8A0DA-CD7C-40F0-9944-C4662120BB38}"/>
+                    <a16:creationId xmlns:a16="http://schemas.microsoft.com/office/drawing/2014/main" xmlns="" id="{5AC8A0DA-CD7C-40F0-9944-C4662120BB38}"/>
                   </a:ext>
                 </a:extLst>
               </p:cNvPr>
@@ -8076,7 +8070,7 @@
             <p:cNvPr id="17" name="Straight Connector 16">
               <a:extLst>
                 <a:ext uri="{FF2B5EF4-FFF2-40B4-BE49-F238E27FC236}">
-                  <a16:creationId xmlns="" xmlns:a16="http://schemas.microsoft.com/office/drawing/2014/main" id="{5AC8A0DA-CD7C-40F0-9944-C4662120BB38}"/>
+                  <a16:creationId xmlns:a16="http://schemas.microsoft.com/office/drawing/2014/main" xmlns="" id="{5AC8A0DA-CD7C-40F0-9944-C4662120BB38}"/>
                 </a:ext>
               </a:extLst>
             </p:cNvPr>
@@ -8118,7 +8112,7 @@
             <p:cNvPr id="20" name="Straight Connector 19">
               <a:extLst>
                 <a:ext uri="{FF2B5EF4-FFF2-40B4-BE49-F238E27FC236}">
-                  <a16:creationId xmlns="" xmlns:a16="http://schemas.microsoft.com/office/drawing/2014/main" id="{5AC8A0DA-CD7C-40F0-9944-C4662120BB38}"/>
+                  <a16:creationId xmlns:a16="http://schemas.microsoft.com/office/drawing/2014/main" xmlns="" id="{5AC8A0DA-CD7C-40F0-9944-C4662120BB38}"/>
                 </a:ext>
               </a:extLst>
             </p:cNvPr>
@@ -8384,7 +8378,7 @@
               <p:cNvPr id="22" name="Group 21">
                 <a:extLst>
                   <a:ext uri="{FF2B5EF4-FFF2-40B4-BE49-F238E27FC236}">
-                    <a16:creationId xmlns="" xmlns:a16="http://schemas.microsoft.com/office/drawing/2014/main" id="{49DDB6D7-D67C-4795-BC2B-F36D181B40FD}"/>
+                    <a16:creationId xmlns:a16="http://schemas.microsoft.com/office/drawing/2014/main" xmlns="" id="{49DDB6D7-D67C-4795-BC2B-F36D181B40FD}"/>
                   </a:ext>
                 </a:extLst>
               </p:cNvPr>
@@ -8404,7 +8398,7 @@
                 <p:cNvPr id="27" name="Group 26">
                   <a:extLst>
                     <a:ext uri="{FF2B5EF4-FFF2-40B4-BE49-F238E27FC236}">
-                      <a16:creationId xmlns="" xmlns:a16="http://schemas.microsoft.com/office/drawing/2014/main" id="{9DCB9AA3-F151-4C06-BDF2-772192554CB8}"/>
+                      <a16:creationId xmlns:a16="http://schemas.microsoft.com/office/drawing/2014/main" xmlns="" id="{9DCB9AA3-F151-4C06-BDF2-772192554CB8}"/>
                     </a:ext>
                   </a:extLst>
                 </p:cNvPr>
@@ -8431,7 +8425,7 @@
                   <p:cNvPr id="29" name="Picture 28">
                     <a:extLst>
                       <a:ext uri="{FF2B5EF4-FFF2-40B4-BE49-F238E27FC236}">
-                        <a16:creationId xmlns="" xmlns:a16="http://schemas.microsoft.com/office/drawing/2014/main" id="{7CAB2C9B-AE1C-4912-97CF-C20C3E33C55A}"/>
+                        <a16:creationId xmlns:a16="http://schemas.microsoft.com/office/drawing/2014/main" xmlns="" id="{7CAB2C9B-AE1C-4912-97CF-C20C3E33C55A}"/>
                       </a:ext>
                     </a:extLst>
                   </p:cNvPr>
@@ -8484,7 +8478,7 @@
                       <p14:cNvPr id="30" name="Ink 29">
                         <a:extLst>
                           <a:ext uri="{FF2B5EF4-FFF2-40B4-BE49-F238E27FC236}">
-                            <a16:creationId xmlns="" xmlns:a16="http://schemas.microsoft.com/office/drawing/2014/main" id="{6205DD0C-C8AF-4BD3-AABD-F90EEFD7682B}"/>
+                            <a16:creationId xmlns:a16="http://schemas.microsoft.com/office/drawing/2014/main" xmlns="" id="{6205DD0C-C8AF-4BD3-AABD-F90EEFD7682B}"/>
                           </a:ext>
                         </a:extLst>
                       </p14:cNvPr>
@@ -8534,7 +8528,7 @@
                 <p:cNvPr id="28" name="Straight Connector 27">
                   <a:extLst>
                     <a:ext uri="{FF2B5EF4-FFF2-40B4-BE49-F238E27FC236}">
-                      <a16:creationId xmlns="" xmlns:a16="http://schemas.microsoft.com/office/drawing/2014/main" id="{5AC8A0DA-CD7C-40F0-9944-C4662120BB38}"/>
+                      <a16:creationId xmlns:a16="http://schemas.microsoft.com/office/drawing/2014/main" xmlns="" id="{5AC8A0DA-CD7C-40F0-9944-C4662120BB38}"/>
                     </a:ext>
                   </a:extLst>
                 </p:cNvPr>
@@ -8576,7 +8570,7 @@
               <p:cNvPr id="23" name="Straight Connector 22">
                 <a:extLst>
                   <a:ext uri="{FF2B5EF4-FFF2-40B4-BE49-F238E27FC236}">
-                    <a16:creationId xmlns="" xmlns:a16="http://schemas.microsoft.com/office/drawing/2014/main" id="{52AE0F85-D404-4572-99DE-871203465D72}"/>
+                    <a16:creationId xmlns:a16="http://schemas.microsoft.com/office/drawing/2014/main" xmlns="" id="{52AE0F85-D404-4572-99DE-871203465D72}"/>
                   </a:ext>
                 </a:extLst>
               </p:cNvPr>
@@ -8619,7 +8613,7 @@
               <p:cNvPr id="24" name="Straight Connector 23">
                 <a:extLst>
                   <a:ext uri="{FF2B5EF4-FFF2-40B4-BE49-F238E27FC236}">
-                    <a16:creationId xmlns="" xmlns:a16="http://schemas.microsoft.com/office/drawing/2014/main" id="{52AE0F85-D404-4572-99DE-871203465D72}"/>
+                    <a16:creationId xmlns:a16="http://schemas.microsoft.com/office/drawing/2014/main" xmlns="" id="{52AE0F85-D404-4572-99DE-871203465D72}"/>
                   </a:ext>
                 </a:extLst>
               </p:cNvPr>
@@ -8662,7 +8656,7 @@
               <p:cNvPr id="25" name="Straight Connector 24">
                 <a:extLst>
                   <a:ext uri="{FF2B5EF4-FFF2-40B4-BE49-F238E27FC236}">
-                    <a16:creationId xmlns="" xmlns:a16="http://schemas.microsoft.com/office/drawing/2014/main" id="{5AC8A0DA-CD7C-40F0-9944-C4662120BB38}"/>
+                    <a16:creationId xmlns:a16="http://schemas.microsoft.com/office/drawing/2014/main" xmlns="" id="{5AC8A0DA-CD7C-40F0-9944-C4662120BB38}"/>
                   </a:ext>
                 </a:extLst>
               </p:cNvPr>
@@ -8754,7 +8748,7 @@
             <p:cNvPr id="16" name="Straight Connector 15">
               <a:extLst>
                 <a:ext uri="{FF2B5EF4-FFF2-40B4-BE49-F238E27FC236}">
-                  <a16:creationId xmlns="" xmlns:a16="http://schemas.microsoft.com/office/drawing/2014/main" id="{5AC8A0DA-CD7C-40F0-9944-C4662120BB38}"/>
+                  <a16:creationId xmlns:a16="http://schemas.microsoft.com/office/drawing/2014/main" xmlns="" id="{5AC8A0DA-CD7C-40F0-9944-C4662120BB38}"/>
                 </a:ext>
               </a:extLst>
             </p:cNvPr>
@@ -8796,7 +8790,7 @@
             <p:cNvPr id="17" name="Straight Connector 16">
               <a:extLst>
                 <a:ext uri="{FF2B5EF4-FFF2-40B4-BE49-F238E27FC236}">
-                  <a16:creationId xmlns="" xmlns:a16="http://schemas.microsoft.com/office/drawing/2014/main" id="{5AC8A0DA-CD7C-40F0-9944-C4662120BB38}"/>
+                  <a16:creationId xmlns:a16="http://schemas.microsoft.com/office/drawing/2014/main" xmlns="" id="{5AC8A0DA-CD7C-40F0-9944-C4662120BB38}"/>
                 </a:ext>
               </a:extLst>
             </p:cNvPr>
@@ -9064,7 +9058,7 @@
               <p:cNvPr id="22" name="Group 21">
                 <a:extLst>
                   <a:ext uri="{FF2B5EF4-FFF2-40B4-BE49-F238E27FC236}">
-                    <a16:creationId xmlns="" xmlns:a16="http://schemas.microsoft.com/office/drawing/2014/main" id="{49DDB6D7-D67C-4795-BC2B-F36D181B40FD}"/>
+                    <a16:creationId xmlns:a16="http://schemas.microsoft.com/office/drawing/2014/main" xmlns="" id="{49DDB6D7-D67C-4795-BC2B-F36D181B40FD}"/>
                   </a:ext>
                 </a:extLst>
               </p:cNvPr>
@@ -9084,7 +9078,7 @@
                 <p:cNvPr id="27" name="Group 26">
                   <a:extLst>
                     <a:ext uri="{FF2B5EF4-FFF2-40B4-BE49-F238E27FC236}">
-                      <a16:creationId xmlns="" xmlns:a16="http://schemas.microsoft.com/office/drawing/2014/main" id="{9DCB9AA3-F151-4C06-BDF2-772192554CB8}"/>
+                      <a16:creationId xmlns:a16="http://schemas.microsoft.com/office/drawing/2014/main" xmlns="" id="{9DCB9AA3-F151-4C06-BDF2-772192554CB8}"/>
                     </a:ext>
                   </a:extLst>
                 </p:cNvPr>
@@ -9111,7 +9105,7 @@
                   <p:cNvPr id="29" name="Picture 28">
                     <a:extLst>
                       <a:ext uri="{FF2B5EF4-FFF2-40B4-BE49-F238E27FC236}">
-                        <a16:creationId xmlns="" xmlns:a16="http://schemas.microsoft.com/office/drawing/2014/main" id="{7CAB2C9B-AE1C-4912-97CF-C20C3E33C55A}"/>
+                        <a16:creationId xmlns:a16="http://schemas.microsoft.com/office/drawing/2014/main" xmlns="" id="{7CAB2C9B-AE1C-4912-97CF-C20C3E33C55A}"/>
                       </a:ext>
                     </a:extLst>
                   </p:cNvPr>
@@ -9164,7 +9158,7 @@
                       <p14:cNvPr id="30" name="Ink 29">
                         <a:extLst>
                           <a:ext uri="{FF2B5EF4-FFF2-40B4-BE49-F238E27FC236}">
-                            <a16:creationId xmlns="" xmlns:a16="http://schemas.microsoft.com/office/drawing/2014/main" id="{6205DD0C-C8AF-4BD3-AABD-F90EEFD7682B}"/>
+                            <a16:creationId xmlns:a16="http://schemas.microsoft.com/office/drawing/2014/main" xmlns="" id="{6205DD0C-C8AF-4BD3-AABD-F90EEFD7682B}"/>
                           </a:ext>
                         </a:extLst>
                       </p14:cNvPr>
@@ -9214,7 +9208,7 @@
                 <p:cNvPr id="28" name="Straight Connector 27">
                   <a:extLst>
                     <a:ext uri="{FF2B5EF4-FFF2-40B4-BE49-F238E27FC236}">
-                      <a16:creationId xmlns="" xmlns:a16="http://schemas.microsoft.com/office/drawing/2014/main" id="{5AC8A0DA-CD7C-40F0-9944-C4662120BB38}"/>
+                      <a16:creationId xmlns:a16="http://schemas.microsoft.com/office/drawing/2014/main" xmlns="" id="{5AC8A0DA-CD7C-40F0-9944-C4662120BB38}"/>
                     </a:ext>
                   </a:extLst>
                 </p:cNvPr>
@@ -9256,7 +9250,7 @@
               <p:cNvPr id="23" name="Straight Connector 22">
                 <a:extLst>
                   <a:ext uri="{FF2B5EF4-FFF2-40B4-BE49-F238E27FC236}">
-                    <a16:creationId xmlns="" xmlns:a16="http://schemas.microsoft.com/office/drawing/2014/main" id="{52AE0F85-D404-4572-99DE-871203465D72}"/>
+                    <a16:creationId xmlns:a16="http://schemas.microsoft.com/office/drawing/2014/main" xmlns="" id="{52AE0F85-D404-4572-99DE-871203465D72}"/>
                   </a:ext>
                 </a:extLst>
               </p:cNvPr>
@@ -9299,7 +9293,7 @@
               <p:cNvPr id="24" name="Straight Connector 23">
                 <a:extLst>
                   <a:ext uri="{FF2B5EF4-FFF2-40B4-BE49-F238E27FC236}">
-                    <a16:creationId xmlns="" xmlns:a16="http://schemas.microsoft.com/office/drawing/2014/main" id="{52AE0F85-D404-4572-99DE-871203465D72}"/>
+                    <a16:creationId xmlns:a16="http://schemas.microsoft.com/office/drawing/2014/main" xmlns="" id="{52AE0F85-D404-4572-99DE-871203465D72}"/>
                   </a:ext>
                 </a:extLst>
               </p:cNvPr>
@@ -9342,7 +9336,7 @@
               <p:cNvPr id="25" name="Straight Connector 24">
                 <a:extLst>
                   <a:ext uri="{FF2B5EF4-FFF2-40B4-BE49-F238E27FC236}">
-                    <a16:creationId xmlns="" xmlns:a16="http://schemas.microsoft.com/office/drawing/2014/main" id="{5AC8A0DA-CD7C-40F0-9944-C4662120BB38}"/>
+                    <a16:creationId xmlns:a16="http://schemas.microsoft.com/office/drawing/2014/main" xmlns="" id="{5AC8A0DA-CD7C-40F0-9944-C4662120BB38}"/>
                   </a:ext>
                 </a:extLst>
               </p:cNvPr>
@@ -9384,7 +9378,7 @@
             <p:cNvPr id="16" name="Straight Connector 15">
               <a:extLst>
                 <a:ext uri="{FF2B5EF4-FFF2-40B4-BE49-F238E27FC236}">
-                  <a16:creationId xmlns="" xmlns:a16="http://schemas.microsoft.com/office/drawing/2014/main" id="{5AC8A0DA-CD7C-40F0-9944-C4662120BB38}"/>
+                  <a16:creationId xmlns:a16="http://schemas.microsoft.com/office/drawing/2014/main" xmlns="" id="{5AC8A0DA-CD7C-40F0-9944-C4662120BB38}"/>
                 </a:ext>
               </a:extLst>
             </p:cNvPr>
@@ -9426,7 +9420,7 @@
             <p:cNvPr id="17" name="Straight Connector 16">
               <a:extLst>
                 <a:ext uri="{FF2B5EF4-FFF2-40B4-BE49-F238E27FC236}">
-                  <a16:creationId xmlns="" xmlns:a16="http://schemas.microsoft.com/office/drawing/2014/main" id="{5AC8A0DA-CD7C-40F0-9944-C4662120BB38}"/>
+                  <a16:creationId xmlns:a16="http://schemas.microsoft.com/office/drawing/2014/main" xmlns="" id="{5AC8A0DA-CD7C-40F0-9944-C4662120BB38}"/>
                 </a:ext>
               </a:extLst>
             </p:cNvPr>
@@ -9708,7 +9702,7 @@
                 <p:cNvPr id="12" name="Group 11">
                   <a:extLst>
                     <a:ext uri="{FF2B5EF4-FFF2-40B4-BE49-F238E27FC236}">
-                      <a16:creationId xmlns="" xmlns:a16="http://schemas.microsoft.com/office/drawing/2014/main" id="{49DDB6D7-D67C-4795-BC2B-F36D181B40FD}"/>
+                      <a16:creationId xmlns:a16="http://schemas.microsoft.com/office/drawing/2014/main" xmlns="" id="{49DDB6D7-D67C-4795-BC2B-F36D181B40FD}"/>
                     </a:ext>
                   </a:extLst>
                 </p:cNvPr>
@@ -9728,7 +9722,7 @@
                   <p:cNvPr id="17" name="Group 16">
                     <a:extLst>
                       <a:ext uri="{FF2B5EF4-FFF2-40B4-BE49-F238E27FC236}">
-                        <a16:creationId xmlns="" xmlns:a16="http://schemas.microsoft.com/office/drawing/2014/main" id="{9DCB9AA3-F151-4C06-BDF2-772192554CB8}"/>
+                        <a16:creationId xmlns:a16="http://schemas.microsoft.com/office/drawing/2014/main" xmlns="" id="{9DCB9AA3-F151-4C06-BDF2-772192554CB8}"/>
                       </a:ext>
                     </a:extLst>
                   </p:cNvPr>
@@ -9755,7 +9749,7 @@
                     <p:cNvPr id="19" name="Picture 18">
                       <a:extLst>
                         <a:ext uri="{FF2B5EF4-FFF2-40B4-BE49-F238E27FC236}">
-                          <a16:creationId xmlns="" xmlns:a16="http://schemas.microsoft.com/office/drawing/2014/main" id="{7CAB2C9B-AE1C-4912-97CF-C20C3E33C55A}"/>
+                          <a16:creationId xmlns:a16="http://schemas.microsoft.com/office/drawing/2014/main" xmlns="" id="{7CAB2C9B-AE1C-4912-97CF-C20C3E33C55A}"/>
                         </a:ext>
                       </a:extLst>
                     </p:cNvPr>
@@ -9808,7 +9802,7 @@
                         <p14:cNvPr id="20" name="Ink 19">
                           <a:extLst>
                             <a:ext uri="{FF2B5EF4-FFF2-40B4-BE49-F238E27FC236}">
-                              <a16:creationId xmlns="" xmlns:a16="http://schemas.microsoft.com/office/drawing/2014/main" id="{6205DD0C-C8AF-4BD3-AABD-F90EEFD7682B}"/>
+                              <a16:creationId xmlns:a16="http://schemas.microsoft.com/office/drawing/2014/main" xmlns="" id="{6205DD0C-C8AF-4BD3-AABD-F90EEFD7682B}"/>
                             </a:ext>
                           </a:extLst>
                         </p14:cNvPr>
@@ -9858,7 +9852,7 @@
                   <p:cNvPr id="18" name="Straight Connector 17">
                     <a:extLst>
                       <a:ext uri="{FF2B5EF4-FFF2-40B4-BE49-F238E27FC236}">
-                        <a16:creationId xmlns="" xmlns:a16="http://schemas.microsoft.com/office/drawing/2014/main" id="{5AC8A0DA-CD7C-40F0-9944-C4662120BB38}"/>
+                        <a16:creationId xmlns:a16="http://schemas.microsoft.com/office/drawing/2014/main" xmlns="" id="{5AC8A0DA-CD7C-40F0-9944-C4662120BB38}"/>
                       </a:ext>
                     </a:extLst>
                   </p:cNvPr>
@@ -9959,7 +9953,7 @@
               <p:cNvPr id="6" name="Straight Connector 5">
                 <a:extLst>
                   <a:ext uri="{FF2B5EF4-FFF2-40B4-BE49-F238E27FC236}">
-                    <a16:creationId xmlns="" xmlns:a16="http://schemas.microsoft.com/office/drawing/2014/main" id="{5AC8A0DA-CD7C-40F0-9944-C4662120BB38}"/>
+                    <a16:creationId xmlns:a16="http://schemas.microsoft.com/office/drawing/2014/main" xmlns="" id="{5AC8A0DA-CD7C-40F0-9944-C4662120BB38}"/>
                   </a:ext>
                 </a:extLst>
               </p:cNvPr>
@@ -10001,7 +9995,7 @@
               <p:cNvPr id="7" name="Straight Connector 6">
                 <a:extLst>
                   <a:ext uri="{FF2B5EF4-FFF2-40B4-BE49-F238E27FC236}">
-                    <a16:creationId xmlns="" xmlns:a16="http://schemas.microsoft.com/office/drawing/2014/main" id="{5AC8A0DA-CD7C-40F0-9944-C4662120BB38}"/>
+                    <a16:creationId xmlns:a16="http://schemas.microsoft.com/office/drawing/2014/main" xmlns="" id="{5AC8A0DA-CD7C-40F0-9944-C4662120BB38}"/>
                   </a:ext>
                 </a:extLst>
               </p:cNvPr>
@@ -10115,7 +10109,7 @@
             <p:cNvPr id="23" name="Straight Connector 22">
               <a:extLst>
                 <a:ext uri="{FF2B5EF4-FFF2-40B4-BE49-F238E27FC236}">
-                  <a16:creationId xmlns="" xmlns:a16="http://schemas.microsoft.com/office/drawing/2014/main" id="{5AC8A0DA-CD7C-40F0-9944-C4662120BB38}"/>
+                  <a16:creationId xmlns:a16="http://schemas.microsoft.com/office/drawing/2014/main" xmlns="" id="{5AC8A0DA-CD7C-40F0-9944-C4662120BB38}"/>
                 </a:ext>
               </a:extLst>
             </p:cNvPr>
@@ -10156,7 +10150,7 @@
             <p:cNvPr id="24" name="Straight Connector 23">
               <a:extLst>
                 <a:ext uri="{FF2B5EF4-FFF2-40B4-BE49-F238E27FC236}">
-                  <a16:creationId xmlns="" xmlns:a16="http://schemas.microsoft.com/office/drawing/2014/main" id="{5AC8A0DA-CD7C-40F0-9944-C4662120BB38}"/>
+                  <a16:creationId xmlns:a16="http://schemas.microsoft.com/office/drawing/2014/main" xmlns="" id="{5AC8A0DA-CD7C-40F0-9944-C4662120BB38}"/>
                 </a:ext>
               </a:extLst>
             </p:cNvPr>
@@ -10325,7 +10319,7 @@
               <p:cNvPr id="12" name="Group 11">
                 <a:extLst>
                   <a:ext uri="{FF2B5EF4-FFF2-40B4-BE49-F238E27FC236}">
-                    <a16:creationId xmlns="" xmlns:a16="http://schemas.microsoft.com/office/drawing/2014/main" id="{49DDB6D7-D67C-4795-BC2B-F36D181B40FD}"/>
+                    <a16:creationId xmlns:a16="http://schemas.microsoft.com/office/drawing/2014/main" xmlns="" id="{49DDB6D7-D67C-4795-BC2B-F36D181B40FD}"/>
                   </a:ext>
                 </a:extLst>
               </p:cNvPr>
@@ -10345,7 +10339,7 @@
                 <p:cNvPr id="17" name="Group 16">
                   <a:extLst>
                     <a:ext uri="{FF2B5EF4-FFF2-40B4-BE49-F238E27FC236}">
-                      <a16:creationId xmlns="" xmlns:a16="http://schemas.microsoft.com/office/drawing/2014/main" id="{9DCB9AA3-F151-4C06-BDF2-772192554CB8}"/>
+                      <a16:creationId xmlns:a16="http://schemas.microsoft.com/office/drawing/2014/main" xmlns="" id="{9DCB9AA3-F151-4C06-BDF2-772192554CB8}"/>
                     </a:ext>
                   </a:extLst>
                 </p:cNvPr>
@@ -10372,7 +10366,7 @@
                   <p:cNvPr id="19" name="Picture 18">
                     <a:extLst>
                       <a:ext uri="{FF2B5EF4-FFF2-40B4-BE49-F238E27FC236}">
-                        <a16:creationId xmlns="" xmlns:a16="http://schemas.microsoft.com/office/drawing/2014/main" id="{7CAB2C9B-AE1C-4912-97CF-C20C3E33C55A}"/>
+                        <a16:creationId xmlns:a16="http://schemas.microsoft.com/office/drawing/2014/main" xmlns="" id="{7CAB2C9B-AE1C-4912-97CF-C20C3E33C55A}"/>
                       </a:ext>
                     </a:extLst>
                   </p:cNvPr>
@@ -10425,7 +10419,7 @@
                       <p14:cNvPr id="20" name="Ink 19">
                         <a:extLst>
                           <a:ext uri="{FF2B5EF4-FFF2-40B4-BE49-F238E27FC236}">
-                            <a16:creationId xmlns="" xmlns:a16="http://schemas.microsoft.com/office/drawing/2014/main" id="{6205DD0C-C8AF-4BD3-AABD-F90EEFD7682B}"/>
+                            <a16:creationId xmlns:a16="http://schemas.microsoft.com/office/drawing/2014/main" xmlns="" id="{6205DD0C-C8AF-4BD3-AABD-F90EEFD7682B}"/>
                           </a:ext>
                         </a:extLst>
                       </p14:cNvPr>
@@ -10475,7 +10469,7 @@
                 <p:cNvPr id="18" name="Straight Connector 17">
                   <a:extLst>
                     <a:ext uri="{FF2B5EF4-FFF2-40B4-BE49-F238E27FC236}">
-                      <a16:creationId xmlns="" xmlns:a16="http://schemas.microsoft.com/office/drawing/2014/main" id="{5AC8A0DA-CD7C-40F0-9944-C4662120BB38}"/>
+                      <a16:creationId xmlns:a16="http://schemas.microsoft.com/office/drawing/2014/main" xmlns="" id="{5AC8A0DA-CD7C-40F0-9944-C4662120BB38}"/>
                     </a:ext>
                   </a:extLst>
                 </p:cNvPr>
@@ -10517,7 +10511,7 @@
               <p:cNvPr id="6" name="Straight Connector 5">
                 <a:extLst>
                   <a:ext uri="{FF2B5EF4-FFF2-40B4-BE49-F238E27FC236}">
-                    <a16:creationId xmlns="" xmlns:a16="http://schemas.microsoft.com/office/drawing/2014/main" id="{5AC8A0DA-CD7C-40F0-9944-C4662120BB38}"/>
+                    <a16:creationId xmlns:a16="http://schemas.microsoft.com/office/drawing/2014/main" xmlns="" id="{5AC8A0DA-CD7C-40F0-9944-C4662120BB38}"/>
                   </a:ext>
                 </a:extLst>
               </p:cNvPr>
@@ -10559,7 +10553,7 @@
               <p:cNvPr id="7" name="Straight Connector 6">
                 <a:extLst>
                   <a:ext uri="{FF2B5EF4-FFF2-40B4-BE49-F238E27FC236}">
-                    <a16:creationId xmlns="" xmlns:a16="http://schemas.microsoft.com/office/drawing/2014/main" id="{5AC8A0DA-CD7C-40F0-9944-C4662120BB38}"/>
+                    <a16:creationId xmlns:a16="http://schemas.microsoft.com/office/drawing/2014/main" xmlns="" id="{5AC8A0DA-CD7C-40F0-9944-C4662120BB38}"/>
                   </a:ext>
                 </a:extLst>
               </p:cNvPr>
@@ -10673,7 +10667,7 @@
             <p:cNvPr id="23" name="Straight Connector 22">
               <a:extLst>
                 <a:ext uri="{FF2B5EF4-FFF2-40B4-BE49-F238E27FC236}">
-                  <a16:creationId xmlns="" xmlns:a16="http://schemas.microsoft.com/office/drawing/2014/main" id="{5AC8A0DA-CD7C-40F0-9944-C4662120BB38}"/>
+                  <a16:creationId xmlns:a16="http://schemas.microsoft.com/office/drawing/2014/main" xmlns="" id="{5AC8A0DA-CD7C-40F0-9944-C4662120BB38}"/>
                 </a:ext>
               </a:extLst>
             </p:cNvPr>
@@ -10714,7 +10708,7 @@
             <p:cNvPr id="24" name="Straight Connector 23">
               <a:extLst>
                 <a:ext uri="{FF2B5EF4-FFF2-40B4-BE49-F238E27FC236}">
-                  <a16:creationId xmlns="" xmlns:a16="http://schemas.microsoft.com/office/drawing/2014/main" id="{5AC8A0DA-CD7C-40F0-9944-C4662120BB38}"/>
+                  <a16:creationId xmlns:a16="http://schemas.microsoft.com/office/drawing/2014/main" xmlns="" id="{5AC8A0DA-CD7C-40F0-9944-C4662120BB38}"/>
                 </a:ext>
               </a:extLst>
             </p:cNvPr>
@@ -10871,7 +10865,7 @@
             <p:cNvPr id="12" name="Picture 11">
               <a:extLst>
                 <a:ext uri="{FF2B5EF4-FFF2-40B4-BE49-F238E27FC236}">
-                  <a16:creationId xmlns="" xmlns:a16="http://schemas.microsoft.com/office/drawing/2014/main" id="{7CAB2C9B-AE1C-4912-97CF-C20C3E33C55A}"/>
+                  <a16:creationId xmlns:a16="http://schemas.microsoft.com/office/drawing/2014/main" xmlns="" id="{7CAB2C9B-AE1C-4912-97CF-C20C3E33C55A}"/>
                 </a:ext>
               </a:extLst>
             </p:cNvPr>
@@ -10926,7 +10920,7 @@
             <p:cNvPr id="6" name="Oval 5">
               <a:extLst>
                 <a:ext uri="{FF2B5EF4-FFF2-40B4-BE49-F238E27FC236}">
-                  <a16:creationId xmlns="" xmlns:a16="http://schemas.microsoft.com/office/drawing/2014/main" id="{2F810603-F2BA-4678-835C-1CEE13D71312}"/>
+                  <a16:creationId xmlns:a16="http://schemas.microsoft.com/office/drawing/2014/main" xmlns="" id="{2F810603-F2BA-4678-835C-1CEE13D71312}"/>
                 </a:ext>
               </a:extLst>
             </p:cNvPr>
@@ -10978,7 +10972,7 @@
             <p:cNvPr id="7" name="Oval 6">
               <a:extLst>
                 <a:ext uri="{FF2B5EF4-FFF2-40B4-BE49-F238E27FC236}">
-                  <a16:creationId xmlns="" xmlns:a16="http://schemas.microsoft.com/office/drawing/2014/main" id="{858F4A02-171E-4043-8210-CC65AE0C4C0E}"/>
+                  <a16:creationId xmlns:a16="http://schemas.microsoft.com/office/drawing/2014/main" xmlns="" id="{858F4A02-171E-4043-8210-CC65AE0C4C0E}"/>
                 </a:ext>
               </a:extLst>
             </p:cNvPr>
@@ -11030,7 +11024,7 @@
             <p:cNvPr id="8" name="Oval 7">
               <a:extLst>
                 <a:ext uri="{FF2B5EF4-FFF2-40B4-BE49-F238E27FC236}">
-                  <a16:creationId xmlns="" xmlns:a16="http://schemas.microsoft.com/office/drawing/2014/main" id="{13548D78-DF90-4713-ADC1-EB50E3FDEB32}"/>
+                  <a16:creationId xmlns:a16="http://schemas.microsoft.com/office/drawing/2014/main" xmlns="" id="{13548D78-DF90-4713-ADC1-EB50E3FDEB32}"/>
                 </a:ext>
               </a:extLst>
             </p:cNvPr>
@@ -11084,7 +11078,7 @@
             <p:cNvPr id="9" name="Oval 8">
               <a:extLst>
                 <a:ext uri="{FF2B5EF4-FFF2-40B4-BE49-F238E27FC236}">
-                  <a16:creationId xmlns="" xmlns:a16="http://schemas.microsoft.com/office/drawing/2014/main" id="{BAAD5FAB-5347-4484-B55F-A813BF4CCD46}"/>
+                  <a16:creationId xmlns:a16="http://schemas.microsoft.com/office/drawing/2014/main" xmlns="" id="{BAAD5FAB-5347-4484-B55F-A813BF4CCD46}"/>
                 </a:ext>
               </a:extLst>
             </p:cNvPr>
@@ -11138,7 +11132,7 @@
             <p:cNvPr id="10" name="Straight Connector 9">
               <a:extLst>
                 <a:ext uri="{FF2B5EF4-FFF2-40B4-BE49-F238E27FC236}">
-                  <a16:creationId xmlns="" xmlns:a16="http://schemas.microsoft.com/office/drawing/2014/main" id="{52AE0F85-D404-4572-99DE-871203465D72}"/>
+                  <a16:creationId xmlns:a16="http://schemas.microsoft.com/office/drawing/2014/main" xmlns="" id="{52AE0F85-D404-4572-99DE-871203465D72}"/>
                 </a:ext>
               </a:extLst>
             </p:cNvPr>
@@ -11181,7 +11175,7 @@
             <p:cNvPr id="11" name="Straight Connector 10">
               <a:extLst>
                 <a:ext uri="{FF2B5EF4-FFF2-40B4-BE49-F238E27FC236}">
-                  <a16:creationId xmlns="" xmlns:a16="http://schemas.microsoft.com/office/drawing/2014/main" id="{5AC8A0DA-CD7C-40F0-9944-C4662120BB38}"/>
+                  <a16:creationId xmlns:a16="http://schemas.microsoft.com/office/drawing/2014/main" xmlns="" id="{5AC8A0DA-CD7C-40F0-9944-C4662120BB38}"/>
                 </a:ext>
               </a:extLst>
             </p:cNvPr>
@@ -11472,6 +11466,1286 @@
     <p:extLst>
       <p:ext uri="{BB962C8B-B14F-4D97-AF65-F5344CB8AC3E}">
         <p14:creationId xmlns:p14="http://schemas.microsoft.com/office/powerpoint/2010/main" val="1453602"/>
+      </p:ext>
+    </p:extLst>
+  </p:cSld>
+  <p:clrMapOvr>
+    <a:masterClrMapping/>
+  </p:clrMapOvr>
+</p:sld>
+</file>
+
+<file path=ppt/slides/slide20.xml><?xml version="1.0" encoding="utf-8"?>
+<p:sld xmlns:a="http://schemas.openxmlformats.org/drawingml/2006/main" xmlns:r="http://schemas.openxmlformats.org/officeDocument/2006/relationships" xmlns:p="http://schemas.openxmlformats.org/presentationml/2006/main">
+  <p:cSld>
+    <p:spTree>
+      <p:nvGrpSpPr>
+        <p:cNvPr id="1" name=""/>
+        <p:cNvGrpSpPr/>
+        <p:nvPr/>
+      </p:nvGrpSpPr>
+      <p:grpSpPr>
+        <a:xfrm>
+          <a:off x="0" y="0"/>
+          <a:ext cx="0" cy="0"/>
+          <a:chOff x="0" y="0"/>
+          <a:chExt cx="0" cy="0"/>
+        </a:xfrm>
+      </p:grpSpPr>
+      <p:grpSp>
+        <p:nvGrpSpPr>
+          <p:cNvPr id="27" name="Group 26"/>
+          <p:cNvGrpSpPr>
+            <a:grpSpLocks noChangeAspect="1"/>
+          </p:cNvGrpSpPr>
+          <p:nvPr/>
+        </p:nvGrpSpPr>
+        <p:grpSpPr>
+          <a:xfrm>
+            <a:off x="2487995" y="1132114"/>
+            <a:ext cx="7734372" cy="2869134"/>
+            <a:chOff x="2647652" y="1761067"/>
+            <a:chExt cx="6667500" cy="2473368"/>
+          </a:xfrm>
+        </p:grpSpPr>
+        <p:pic>
+          <p:nvPicPr>
+            <p:cNvPr id="12" name="Picture 11">
+              <a:extLst>
+                <a:ext uri="{FF2B5EF4-FFF2-40B4-BE49-F238E27FC236}">
+                  <a16:creationId xmlns:a16="http://schemas.microsoft.com/office/drawing/2014/main" xmlns="" id="{7CAB2C9B-AE1C-4912-97CF-C20C3E33C55A}"/>
+                </a:ext>
+              </a:extLst>
+            </p:cNvPr>
+            <p:cNvPicPr>
+              <a:picLocks noChangeAspect="1"/>
+            </p:cNvPicPr>
+            <p:nvPr/>
+          </p:nvPicPr>
+          <p:blipFill rotWithShape="1">
+            <a:blip r:embed="rId2">
+              <a:clrChange>
+                <a:clrFrom>
+                  <a:srgbClr val="000000"/>
+                </a:clrFrom>
+                <a:clrTo>
+                  <a:srgbClr val="000000">
+                    <a:alpha val="0"/>
+                  </a:srgbClr>
+                </a:clrTo>
+              </a:clrChange>
+              <a:extLst>
+                <a:ext uri="{28A0092B-C50C-407E-A947-70E740481C1C}">
+                  <a14:useLocalDpi xmlns:a14="http://schemas.microsoft.com/office/drawing/2010/main" val="0"/>
+                </a:ext>
+              </a:extLst>
+            </a:blip>
+            <a:srcRect t="25079" b="39492"/>
+            <a:stretch/>
+          </p:blipFill>
+          <p:spPr>
+            <a:xfrm>
+              <a:off x="2647652" y="1761067"/>
+              <a:ext cx="6667500" cy="2362200"/>
+            </a:xfrm>
+            <a:prstGeom prst="rect">
+              <a:avLst/>
+            </a:prstGeom>
+            <a:solidFill>
+              <a:schemeClr val="bg2">
+                <a:lumMod val="90000"/>
+              </a:schemeClr>
+            </a:solidFill>
+            <a:ln>
+              <a:solidFill>
+                <a:srgbClr val="220101"/>
+              </a:solidFill>
+            </a:ln>
+          </p:spPr>
+        </p:pic>
+        <p:sp>
+          <p:nvSpPr>
+            <p:cNvPr id="6" name="Oval 5">
+              <a:extLst>
+                <a:ext uri="{FF2B5EF4-FFF2-40B4-BE49-F238E27FC236}">
+                  <a16:creationId xmlns:a16="http://schemas.microsoft.com/office/drawing/2014/main" xmlns="" id="{2F810603-F2BA-4678-835C-1CEE13D71312}"/>
+                </a:ext>
+              </a:extLst>
+            </p:cNvPr>
+            <p:cNvSpPr/>
+            <p:nvPr/>
+          </p:nvSpPr>
+          <p:spPr>
+            <a:xfrm>
+              <a:off x="5026448" y="2707448"/>
+              <a:ext cx="292239" cy="292608"/>
+            </a:xfrm>
+            <a:prstGeom prst="ellipse">
+              <a:avLst/>
+            </a:prstGeom>
+            <a:noFill/>
+            <a:ln w="15875">
+              <a:solidFill>
+                <a:srgbClr val="92D050"/>
+              </a:solidFill>
+            </a:ln>
+          </p:spPr>
+          <p:style>
+            <a:lnRef idx="2">
+              <a:schemeClr val="accent1">
+                <a:shade val="50000"/>
+              </a:schemeClr>
+            </a:lnRef>
+            <a:fillRef idx="1">
+              <a:schemeClr val="accent1"/>
+            </a:fillRef>
+            <a:effectRef idx="0">
+              <a:schemeClr val="accent1"/>
+            </a:effectRef>
+            <a:fontRef idx="minor">
+              <a:schemeClr val="lt1"/>
+            </a:fontRef>
+          </p:style>
+          <p:txBody>
+            <a:bodyPr rtlCol="0" anchor="ctr"/>
+            <a:lstStyle/>
+            <a:p>
+              <a:pPr algn="ctr"/>
+              <a:endParaRPr lang="en-US"/>
+            </a:p>
+          </p:txBody>
+        </p:sp>
+        <p:sp>
+          <p:nvSpPr>
+            <p:cNvPr id="7" name="Oval 6">
+              <a:extLst>
+                <a:ext uri="{FF2B5EF4-FFF2-40B4-BE49-F238E27FC236}">
+                  <a16:creationId xmlns:a16="http://schemas.microsoft.com/office/drawing/2014/main" xmlns="" id="{858F4A02-171E-4043-8210-CC65AE0C4C0E}"/>
+                </a:ext>
+              </a:extLst>
+            </p:cNvPr>
+            <p:cNvSpPr/>
+            <p:nvPr/>
+          </p:nvSpPr>
+          <p:spPr>
+            <a:xfrm>
+              <a:off x="6677966" y="2707448"/>
+              <a:ext cx="292239" cy="292608"/>
+            </a:xfrm>
+            <a:prstGeom prst="ellipse">
+              <a:avLst/>
+            </a:prstGeom>
+            <a:noFill/>
+            <a:ln w="15875">
+              <a:solidFill>
+                <a:srgbClr val="92D050"/>
+              </a:solidFill>
+            </a:ln>
+          </p:spPr>
+          <p:style>
+            <a:lnRef idx="2">
+              <a:schemeClr val="accent1">
+                <a:shade val="50000"/>
+              </a:schemeClr>
+            </a:lnRef>
+            <a:fillRef idx="1">
+              <a:schemeClr val="accent1"/>
+            </a:fillRef>
+            <a:effectRef idx="0">
+              <a:schemeClr val="accent1"/>
+            </a:effectRef>
+            <a:fontRef idx="minor">
+              <a:schemeClr val="lt1"/>
+            </a:fontRef>
+          </p:style>
+          <p:txBody>
+            <a:bodyPr rtlCol="0" anchor="ctr"/>
+            <a:lstStyle/>
+            <a:p>
+              <a:pPr algn="ctr"/>
+              <a:endParaRPr lang="en-US"/>
+            </a:p>
+          </p:txBody>
+        </p:sp>
+        <p:sp>
+          <p:nvSpPr>
+            <p:cNvPr id="8" name="Oval 7">
+              <a:extLst>
+                <a:ext uri="{FF2B5EF4-FFF2-40B4-BE49-F238E27FC236}">
+                  <a16:creationId xmlns:a16="http://schemas.microsoft.com/office/drawing/2014/main" xmlns="" id="{13548D78-DF90-4713-ADC1-EB50E3FDEB32}"/>
+                </a:ext>
+              </a:extLst>
+            </p:cNvPr>
+            <p:cNvSpPr/>
+            <p:nvPr/>
+          </p:nvSpPr>
+          <p:spPr>
+            <a:xfrm>
+              <a:off x="5135244" y="2817176"/>
+              <a:ext cx="74645" cy="73152"/>
+            </a:xfrm>
+            <a:prstGeom prst="ellipse">
+              <a:avLst/>
+            </a:prstGeom>
+            <a:solidFill>
+              <a:srgbClr val="92D050"/>
+            </a:solidFill>
+            <a:ln>
+              <a:solidFill>
+                <a:srgbClr val="92D050"/>
+              </a:solidFill>
+            </a:ln>
+          </p:spPr>
+          <p:style>
+            <a:lnRef idx="2">
+              <a:schemeClr val="accent1">
+                <a:shade val="50000"/>
+              </a:schemeClr>
+            </a:lnRef>
+            <a:fillRef idx="1">
+              <a:schemeClr val="accent1"/>
+            </a:fillRef>
+            <a:effectRef idx="0">
+              <a:schemeClr val="accent1"/>
+            </a:effectRef>
+            <a:fontRef idx="minor">
+              <a:schemeClr val="lt1"/>
+            </a:fontRef>
+          </p:style>
+          <p:txBody>
+            <a:bodyPr rtlCol="0" anchor="ctr"/>
+            <a:lstStyle/>
+            <a:p>
+              <a:pPr algn="ctr"/>
+              <a:endParaRPr lang="en-US"/>
+            </a:p>
+          </p:txBody>
+        </p:sp>
+        <p:sp>
+          <p:nvSpPr>
+            <p:cNvPr id="9" name="Oval 8">
+              <a:extLst>
+                <a:ext uri="{FF2B5EF4-FFF2-40B4-BE49-F238E27FC236}">
+                  <a16:creationId xmlns:a16="http://schemas.microsoft.com/office/drawing/2014/main" xmlns="" id="{BAAD5FAB-5347-4484-B55F-A813BF4CCD46}"/>
+                </a:ext>
+              </a:extLst>
+            </p:cNvPr>
+            <p:cNvSpPr/>
+            <p:nvPr/>
+          </p:nvSpPr>
+          <p:spPr>
+            <a:xfrm>
+              <a:off x="6786762" y="2811205"/>
+              <a:ext cx="74645" cy="73152"/>
+            </a:xfrm>
+            <a:prstGeom prst="ellipse">
+              <a:avLst/>
+            </a:prstGeom>
+            <a:solidFill>
+              <a:srgbClr val="92D050"/>
+            </a:solidFill>
+            <a:ln>
+              <a:solidFill>
+                <a:srgbClr val="92D050"/>
+              </a:solidFill>
+            </a:ln>
+          </p:spPr>
+          <p:style>
+            <a:lnRef idx="2">
+              <a:schemeClr val="accent1">
+                <a:shade val="50000"/>
+              </a:schemeClr>
+            </a:lnRef>
+            <a:fillRef idx="1">
+              <a:schemeClr val="accent1"/>
+            </a:fillRef>
+            <a:effectRef idx="0">
+              <a:schemeClr val="accent1"/>
+            </a:effectRef>
+            <a:fontRef idx="minor">
+              <a:schemeClr val="lt1"/>
+            </a:fontRef>
+          </p:style>
+          <p:txBody>
+            <a:bodyPr rtlCol="0" anchor="ctr"/>
+            <a:lstStyle/>
+            <a:p>
+              <a:pPr algn="ctr"/>
+              <a:endParaRPr lang="en-US"/>
+            </a:p>
+          </p:txBody>
+        </p:sp>
+        <p:cxnSp>
+          <p:nvCxnSpPr>
+            <p:cNvPr id="10" name="Straight Connector 9">
+              <a:extLst>
+                <a:ext uri="{FF2B5EF4-FFF2-40B4-BE49-F238E27FC236}">
+                  <a16:creationId xmlns:a16="http://schemas.microsoft.com/office/drawing/2014/main" xmlns="" id="{52AE0F85-D404-4572-99DE-871203465D72}"/>
+                </a:ext>
+              </a:extLst>
+            </p:cNvPr>
+            <p:cNvCxnSpPr>
+              <a:cxnSpLocks/>
+            </p:cNvCxnSpPr>
+            <p:nvPr/>
+          </p:nvCxnSpPr>
+          <p:spPr>
+            <a:xfrm flipV="1">
+              <a:off x="5172567" y="2854001"/>
+              <a:ext cx="1688840" cy="496"/>
+            </a:xfrm>
+            <a:prstGeom prst="line">
+              <a:avLst/>
+            </a:prstGeom>
+            <a:ln w="38100">
+              <a:solidFill>
+                <a:srgbClr val="92D050"/>
+              </a:solidFill>
+            </a:ln>
+          </p:spPr>
+          <p:style>
+            <a:lnRef idx="1">
+              <a:schemeClr val="accent1"/>
+            </a:lnRef>
+            <a:fillRef idx="0">
+              <a:schemeClr val="accent1"/>
+            </a:fillRef>
+            <a:effectRef idx="0">
+              <a:schemeClr val="accent1"/>
+            </a:effectRef>
+            <a:fontRef idx="minor">
+              <a:schemeClr val="tx1"/>
+            </a:fontRef>
+          </p:style>
+        </p:cxnSp>
+        <p:cxnSp>
+          <p:nvCxnSpPr>
+            <p:cNvPr id="11" name="Straight Connector 10">
+              <a:extLst>
+                <a:ext uri="{FF2B5EF4-FFF2-40B4-BE49-F238E27FC236}">
+                  <a16:creationId xmlns:a16="http://schemas.microsoft.com/office/drawing/2014/main" xmlns="" id="{5AC8A0DA-CD7C-40F0-9944-C4662120BB38}"/>
+                </a:ext>
+              </a:extLst>
+            </p:cNvPr>
+            <p:cNvCxnSpPr/>
+            <p:nvPr/>
+          </p:nvCxnSpPr>
+          <p:spPr>
+            <a:xfrm>
+              <a:off x="6009151" y="2405635"/>
+              <a:ext cx="0" cy="1828800"/>
+            </a:xfrm>
+            <a:prstGeom prst="line">
+              <a:avLst/>
+            </a:prstGeom>
+            <a:ln w="38100">
+              <a:solidFill>
+                <a:srgbClr val="92D050"/>
+              </a:solidFill>
+            </a:ln>
+          </p:spPr>
+          <p:style>
+            <a:lnRef idx="1">
+              <a:schemeClr val="accent1"/>
+            </a:lnRef>
+            <a:fillRef idx="0">
+              <a:schemeClr val="accent1"/>
+            </a:fillRef>
+            <a:effectRef idx="0">
+              <a:schemeClr val="accent1"/>
+            </a:effectRef>
+            <a:fontRef idx="minor">
+              <a:schemeClr val="tx1"/>
+            </a:fontRef>
+          </p:style>
+        </p:cxnSp>
+        <p:cxnSp>
+          <p:nvCxnSpPr>
+            <p:cNvPr id="16" name="Straight Connector 15"/>
+            <p:cNvCxnSpPr/>
+            <p:nvPr/>
+          </p:nvCxnSpPr>
+          <p:spPr>
+            <a:xfrm flipH="1">
+              <a:off x="5169089" y="2703342"/>
+              <a:ext cx="1" cy="299542"/>
+            </a:xfrm>
+            <a:prstGeom prst="line">
+              <a:avLst/>
+            </a:prstGeom>
+            <a:ln w="38100">
+              <a:solidFill>
+                <a:srgbClr val="FF0000"/>
+              </a:solidFill>
+            </a:ln>
+          </p:spPr>
+          <p:style>
+            <a:lnRef idx="1">
+              <a:schemeClr val="accent1"/>
+            </a:lnRef>
+            <a:fillRef idx="0">
+              <a:schemeClr val="accent1"/>
+            </a:fillRef>
+            <a:effectRef idx="0">
+              <a:schemeClr val="accent1"/>
+            </a:effectRef>
+            <a:fontRef idx="minor">
+              <a:schemeClr val="tx1"/>
+            </a:fontRef>
+          </p:style>
+        </p:cxnSp>
+        <p:sp>
+          <p:nvSpPr>
+            <p:cNvPr id="18" name="TextBox 17"/>
+            <p:cNvSpPr txBox="1"/>
+            <p:nvPr/>
+          </p:nvSpPr>
+          <p:spPr>
+            <a:xfrm>
+              <a:off x="3905011" y="2125706"/>
+              <a:ext cx="1340596" cy="504112"/>
+            </a:xfrm>
+            <a:prstGeom prst="rect">
+              <a:avLst/>
+            </a:prstGeom>
+            <a:noFill/>
+          </p:spPr>
+          <p:txBody>
+            <a:bodyPr wrap="none" rtlCol="0">
+              <a:spAutoFit/>
+            </a:bodyPr>
+            <a:lstStyle/>
+            <a:p>
+              <a:r>
+                <a:rPr lang="en-US" sz="1600" dirty="0" smtClean="0"/>
+                <a:t>Palpebral fissure</a:t>
+              </a:r>
+            </a:p>
+            <a:p>
+              <a:r>
+                <a:rPr lang="en-US" sz="1600" dirty="0" smtClean="0"/>
+                <a:t>height right </a:t>
+              </a:r>
+              <a:endParaRPr lang="en-US" sz="1600" dirty="0"/>
+            </a:p>
+          </p:txBody>
+        </p:sp>
+        <p:cxnSp>
+          <p:nvCxnSpPr>
+            <p:cNvPr id="19" name="Straight Connector 18"/>
+            <p:cNvCxnSpPr/>
+            <p:nvPr/>
+          </p:nvCxnSpPr>
+          <p:spPr>
+            <a:xfrm flipH="1">
+              <a:off x="6824737" y="2791211"/>
+              <a:ext cx="1" cy="118240"/>
+            </a:xfrm>
+            <a:prstGeom prst="line">
+              <a:avLst/>
+            </a:prstGeom>
+            <a:ln w="38100">
+              <a:solidFill>
+                <a:srgbClr val="FF0000"/>
+              </a:solidFill>
+            </a:ln>
+          </p:spPr>
+          <p:style>
+            <a:lnRef idx="1">
+              <a:schemeClr val="accent1"/>
+            </a:lnRef>
+            <a:fillRef idx="0">
+              <a:schemeClr val="accent1"/>
+            </a:fillRef>
+            <a:effectRef idx="0">
+              <a:schemeClr val="accent1"/>
+            </a:effectRef>
+            <a:fontRef idx="minor">
+              <a:schemeClr val="tx1"/>
+            </a:fontRef>
+          </p:style>
+        </p:cxnSp>
+        <p:sp>
+          <p:nvSpPr>
+            <p:cNvPr id="21" name="TextBox 20"/>
+            <p:cNvSpPr txBox="1"/>
+            <p:nvPr/>
+          </p:nvSpPr>
+          <p:spPr>
+            <a:xfrm>
+              <a:off x="7047898" y="2248000"/>
+              <a:ext cx="1340596" cy="504112"/>
+            </a:xfrm>
+            <a:prstGeom prst="rect">
+              <a:avLst/>
+            </a:prstGeom>
+            <a:noFill/>
+          </p:spPr>
+          <p:txBody>
+            <a:bodyPr wrap="none" rtlCol="0">
+              <a:spAutoFit/>
+            </a:bodyPr>
+            <a:lstStyle/>
+            <a:p>
+              <a:r>
+                <a:rPr lang="en-US" sz="1600" dirty="0"/>
+                <a:t>Palpebral fissure</a:t>
+              </a:r>
+            </a:p>
+            <a:p>
+              <a:r>
+                <a:rPr lang="en-US" sz="1600" dirty="0"/>
+                <a:t>height </a:t>
+              </a:r>
+              <a:r>
+                <a:rPr lang="en-US" sz="1600" dirty="0" smtClean="0"/>
+                <a:t>left </a:t>
+              </a:r>
+              <a:endParaRPr lang="en-US" sz="1600" dirty="0"/>
+            </a:p>
+          </p:txBody>
+        </p:sp>
+        <p:cxnSp>
+          <p:nvCxnSpPr>
+            <p:cNvPr id="23" name="Straight Arrow Connector 22"/>
+            <p:cNvCxnSpPr/>
+            <p:nvPr/>
+          </p:nvCxnSpPr>
+          <p:spPr>
+            <a:xfrm>
+              <a:off x="4698076" y="2688199"/>
+              <a:ext cx="413741" cy="128977"/>
+            </a:xfrm>
+            <a:prstGeom prst="straightConnector1">
+              <a:avLst/>
+            </a:prstGeom>
+            <a:ln>
+              <a:tailEnd type="triangle"/>
+            </a:ln>
+          </p:spPr>
+          <p:style>
+            <a:lnRef idx="1">
+              <a:schemeClr val="dk1"/>
+            </a:lnRef>
+            <a:fillRef idx="0">
+              <a:schemeClr val="dk1"/>
+            </a:fillRef>
+            <a:effectRef idx="0">
+              <a:schemeClr val="dk1"/>
+            </a:effectRef>
+            <a:fontRef idx="minor">
+              <a:schemeClr val="tx1"/>
+            </a:fontRef>
+          </p:style>
+        </p:cxnSp>
+        <p:cxnSp>
+          <p:nvCxnSpPr>
+            <p:cNvPr id="25" name="Straight Arrow Connector 24"/>
+            <p:cNvCxnSpPr/>
+            <p:nvPr/>
+          </p:nvCxnSpPr>
+          <p:spPr>
+            <a:xfrm flipH="1">
+              <a:off x="6861407" y="2615012"/>
+              <a:ext cx="186491" cy="218159"/>
+            </a:xfrm>
+            <a:prstGeom prst="straightConnector1">
+              <a:avLst/>
+            </a:prstGeom>
+            <a:ln>
+              <a:tailEnd type="triangle"/>
+            </a:ln>
+          </p:spPr>
+          <p:style>
+            <a:lnRef idx="1">
+              <a:schemeClr val="dk1"/>
+            </a:lnRef>
+            <a:fillRef idx="0">
+              <a:schemeClr val="dk1"/>
+            </a:fillRef>
+            <a:effectRef idx="0">
+              <a:schemeClr val="dk1"/>
+            </a:effectRef>
+            <a:fontRef idx="minor">
+              <a:schemeClr val="tx1"/>
+            </a:fontRef>
+          </p:style>
+        </p:cxnSp>
+      </p:grpSp>
+    </p:spTree>
+    <p:extLst>
+      <p:ext uri="{BB962C8B-B14F-4D97-AF65-F5344CB8AC3E}">
+        <p14:creationId xmlns:p14="http://schemas.microsoft.com/office/powerpoint/2010/main" val="3853616689"/>
+      </p:ext>
+    </p:extLst>
+  </p:cSld>
+  <p:clrMapOvr>
+    <a:masterClrMapping/>
+  </p:clrMapOvr>
+</p:sld>
+</file>
+
+<file path=ppt/slides/slide21.xml><?xml version="1.0" encoding="utf-8"?>
+<p:sld xmlns:a="http://schemas.openxmlformats.org/drawingml/2006/main" xmlns:r="http://schemas.openxmlformats.org/officeDocument/2006/relationships" xmlns:p="http://schemas.openxmlformats.org/presentationml/2006/main">
+  <p:cSld>
+    <p:spTree>
+      <p:nvGrpSpPr>
+        <p:cNvPr id="1" name=""/>
+        <p:cNvGrpSpPr/>
+        <p:nvPr/>
+      </p:nvGrpSpPr>
+      <p:grpSpPr>
+        <a:xfrm>
+          <a:off x="0" y="0"/>
+          <a:ext cx="0" cy="0"/>
+          <a:chOff x="0" y="0"/>
+          <a:chExt cx="0" cy="0"/>
+        </a:xfrm>
+      </p:grpSpPr>
+      <p:grpSp>
+        <p:nvGrpSpPr>
+          <p:cNvPr id="27" name="Group 26"/>
+          <p:cNvGrpSpPr>
+            <a:grpSpLocks noChangeAspect="1"/>
+          </p:cNvGrpSpPr>
+          <p:nvPr/>
+        </p:nvGrpSpPr>
+        <p:grpSpPr>
+          <a:xfrm>
+            <a:off x="2487995" y="1132114"/>
+            <a:ext cx="7734373" cy="3503559"/>
+            <a:chOff x="2647652" y="1761067"/>
+            <a:chExt cx="6667501" cy="3020281"/>
+          </a:xfrm>
+        </p:grpSpPr>
+        <p:pic>
+          <p:nvPicPr>
+            <p:cNvPr id="12" name="Picture 11">
+              <a:extLst>
+                <a:ext uri="{FF2B5EF4-FFF2-40B4-BE49-F238E27FC236}">
+                  <a16:creationId xmlns:a16="http://schemas.microsoft.com/office/drawing/2014/main" xmlns="" id="{7CAB2C9B-AE1C-4912-97CF-C20C3E33C55A}"/>
+                </a:ext>
+              </a:extLst>
+            </p:cNvPr>
+            <p:cNvPicPr>
+              <a:picLocks noChangeAspect="1"/>
+            </p:cNvPicPr>
+            <p:nvPr/>
+          </p:nvPicPr>
+          <p:blipFill rotWithShape="1">
+            <a:blip r:embed="rId2">
+              <a:clrChange>
+                <a:clrFrom>
+                  <a:srgbClr val="000000"/>
+                </a:clrFrom>
+                <a:clrTo>
+                  <a:srgbClr val="000000">
+                    <a:alpha val="0"/>
+                  </a:srgbClr>
+                </a:clrTo>
+              </a:clrChange>
+              <a:extLst>
+                <a:ext uri="{28A0092B-C50C-407E-A947-70E740481C1C}">
+                  <a14:useLocalDpi xmlns:a14="http://schemas.microsoft.com/office/drawing/2010/main" val="0"/>
+                </a:ext>
+              </a:extLst>
+            </a:blip>
+            <a:srcRect t="25079" b="39492"/>
+            <a:stretch/>
+          </p:blipFill>
+          <p:spPr>
+            <a:xfrm>
+              <a:off x="2647652" y="1761067"/>
+              <a:ext cx="6667500" cy="2362200"/>
+            </a:xfrm>
+            <a:prstGeom prst="rect">
+              <a:avLst/>
+            </a:prstGeom>
+            <a:solidFill>
+              <a:schemeClr val="bg2">
+                <a:lumMod val="90000"/>
+              </a:schemeClr>
+            </a:solidFill>
+            <a:ln>
+              <a:solidFill>
+                <a:srgbClr val="220101"/>
+              </a:solidFill>
+            </a:ln>
+          </p:spPr>
+        </p:pic>
+        <p:sp>
+          <p:nvSpPr>
+            <p:cNvPr id="6" name="Oval 5">
+              <a:extLst>
+                <a:ext uri="{FF2B5EF4-FFF2-40B4-BE49-F238E27FC236}">
+                  <a16:creationId xmlns:a16="http://schemas.microsoft.com/office/drawing/2014/main" xmlns="" id="{2F810603-F2BA-4678-835C-1CEE13D71312}"/>
+                </a:ext>
+              </a:extLst>
+            </p:cNvPr>
+            <p:cNvSpPr/>
+            <p:nvPr/>
+          </p:nvSpPr>
+          <p:spPr>
+            <a:xfrm>
+              <a:off x="5026448" y="2707448"/>
+              <a:ext cx="292239" cy="292608"/>
+            </a:xfrm>
+            <a:prstGeom prst="ellipse">
+              <a:avLst/>
+            </a:prstGeom>
+            <a:noFill/>
+            <a:ln w="15875">
+              <a:solidFill>
+                <a:srgbClr val="92D050"/>
+              </a:solidFill>
+            </a:ln>
+          </p:spPr>
+          <p:style>
+            <a:lnRef idx="2">
+              <a:schemeClr val="accent1">
+                <a:shade val="50000"/>
+              </a:schemeClr>
+            </a:lnRef>
+            <a:fillRef idx="1">
+              <a:schemeClr val="accent1"/>
+            </a:fillRef>
+            <a:effectRef idx="0">
+              <a:schemeClr val="accent1"/>
+            </a:effectRef>
+            <a:fontRef idx="minor">
+              <a:schemeClr val="lt1"/>
+            </a:fontRef>
+          </p:style>
+          <p:txBody>
+            <a:bodyPr rtlCol="0" anchor="ctr"/>
+            <a:lstStyle/>
+            <a:p>
+              <a:pPr algn="ctr"/>
+              <a:endParaRPr lang="en-US"/>
+            </a:p>
+          </p:txBody>
+        </p:sp>
+        <p:sp>
+          <p:nvSpPr>
+            <p:cNvPr id="7" name="Oval 6">
+              <a:extLst>
+                <a:ext uri="{FF2B5EF4-FFF2-40B4-BE49-F238E27FC236}">
+                  <a16:creationId xmlns:a16="http://schemas.microsoft.com/office/drawing/2014/main" xmlns="" id="{858F4A02-171E-4043-8210-CC65AE0C4C0E}"/>
+                </a:ext>
+              </a:extLst>
+            </p:cNvPr>
+            <p:cNvSpPr/>
+            <p:nvPr/>
+          </p:nvSpPr>
+          <p:spPr>
+            <a:xfrm>
+              <a:off x="6677966" y="2707448"/>
+              <a:ext cx="292239" cy="292608"/>
+            </a:xfrm>
+            <a:prstGeom prst="ellipse">
+              <a:avLst/>
+            </a:prstGeom>
+            <a:noFill/>
+            <a:ln w="15875">
+              <a:solidFill>
+                <a:srgbClr val="92D050"/>
+              </a:solidFill>
+            </a:ln>
+          </p:spPr>
+          <p:style>
+            <a:lnRef idx="2">
+              <a:schemeClr val="accent1">
+                <a:shade val="50000"/>
+              </a:schemeClr>
+            </a:lnRef>
+            <a:fillRef idx="1">
+              <a:schemeClr val="accent1"/>
+            </a:fillRef>
+            <a:effectRef idx="0">
+              <a:schemeClr val="accent1"/>
+            </a:effectRef>
+            <a:fontRef idx="minor">
+              <a:schemeClr val="lt1"/>
+            </a:fontRef>
+          </p:style>
+          <p:txBody>
+            <a:bodyPr rtlCol="0" anchor="ctr"/>
+            <a:lstStyle/>
+            <a:p>
+              <a:pPr algn="ctr"/>
+              <a:endParaRPr lang="en-US"/>
+            </a:p>
+          </p:txBody>
+        </p:sp>
+        <p:sp>
+          <p:nvSpPr>
+            <p:cNvPr id="8" name="Oval 7">
+              <a:extLst>
+                <a:ext uri="{FF2B5EF4-FFF2-40B4-BE49-F238E27FC236}">
+                  <a16:creationId xmlns:a16="http://schemas.microsoft.com/office/drawing/2014/main" xmlns="" id="{13548D78-DF90-4713-ADC1-EB50E3FDEB32}"/>
+                </a:ext>
+              </a:extLst>
+            </p:cNvPr>
+            <p:cNvSpPr/>
+            <p:nvPr/>
+          </p:nvSpPr>
+          <p:spPr>
+            <a:xfrm>
+              <a:off x="5135244" y="2817176"/>
+              <a:ext cx="74645" cy="73152"/>
+            </a:xfrm>
+            <a:prstGeom prst="ellipse">
+              <a:avLst/>
+            </a:prstGeom>
+            <a:solidFill>
+              <a:srgbClr val="92D050"/>
+            </a:solidFill>
+            <a:ln>
+              <a:solidFill>
+                <a:srgbClr val="92D050"/>
+              </a:solidFill>
+            </a:ln>
+          </p:spPr>
+          <p:style>
+            <a:lnRef idx="2">
+              <a:schemeClr val="accent1">
+                <a:shade val="50000"/>
+              </a:schemeClr>
+            </a:lnRef>
+            <a:fillRef idx="1">
+              <a:schemeClr val="accent1"/>
+            </a:fillRef>
+            <a:effectRef idx="0">
+              <a:schemeClr val="accent1"/>
+            </a:effectRef>
+            <a:fontRef idx="minor">
+              <a:schemeClr val="lt1"/>
+            </a:fontRef>
+          </p:style>
+          <p:txBody>
+            <a:bodyPr rtlCol="0" anchor="ctr"/>
+            <a:lstStyle/>
+            <a:p>
+              <a:pPr algn="ctr"/>
+              <a:endParaRPr lang="en-US"/>
+            </a:p>
+          </p:txBody>
+        </p:sp>
+        <p:sp>
+          <p:nvSpPr>
+            <p:cNvPr id="9" name="Oval 8">
+              <a:extLst>
+                <a:ext uri="{FF2B5EF4-FFF2-40B4-BE49-F238E27FC236}">
+                  <a16:creationId xmlns:a16="http://schemas.microsoft.com/office/drawing/2014/main" xmlns="" id="{BAAD5FAB-5347-4484-B55F-A813BF4CCD46}"/>
+                </a:ext>
+              </a:extLst>
+            </p:cNvPr>
+            <p:cNvSpPr/>
+            <p:nvPr/>
+          </p:nvSpPr>
+          <p:spPr>
+            <a:xfrm>
+              <a:off x="6786762" y="2811205"/>
+              <a:ext cx="74645" cy="73152"/>
+            </a:xfrm>
+            <a:prstGeom prst="ellipse">
+              <a:avLst/>
+            </a:prstGeom>
+            <a:solidFill>
+              <a:srgbClr val="92D050"/>
+            </a:solidFill>
+            <a:ln>
+              <a:solidFill>
+                <a:srgbClr val="92D050"/>
+              </a:solidFill>
+            </a:ln>
+          </p:spPr>
+          <p:style>
+            <a:lnRef idx="2">
+              <a:schemeClr val="accent1">
+                <a:shade val="50000"/>
+              </a:schemeClr>
+            </a:lnRef>
+            <a:fillRef idx="1">
+              <a:schemeClr val="accent1"/>
+            </a:fillRef>
+            <a:effectRef idx="0">
+              <a:schemeClr val="accent1"/>
+            </a:effectRef>
+            <a:fontRef idx="minor">
+              <a:schemeClr val="lt1"/>
+            </a:fontRef>
+          </p:style>
+          <p:txBody>
+            <a:bodyPr rtlCol="0" anchor="ctr"/>
+            <a:lstStyle/>
+            <a:p>
+              <a:pPr algn="ctr"/>
+              <a:endParaRPr lang="en-US"/>
+            </a:p>
+          </p:txBody>
+        </p:sp>
+        <p:cxnSp>
+          <p:nvCxnSpPr>
+            <p:cNvPr id="10" name="Straight Connector 9">
+              <a:extLst>
+                <a:ext uri="{FF2B5EF4-FFF2-40B4-BE49-F238E27FC236}">
+                  <a16:creationId xmlns:a16="http://schemas.microsoft.com/office/drawing/2014/main" xmlns="" id="{52AE0F85-D404-4572-99DE-871203465D72}"/>
+                </a:ext>
+              </a:extLst>
+            </p:cNvPr>
+            <p:cNvCxnSpPr>
+              <a:cxnSpLocks/>
+            </p:cNvCxnSpPr>
+            <p:nvPr/>
+          </p:nvCxnSpPr>
+          <p:spPr>
+            <a:xfrm flipV="1">
+              <a:off x="5172567" y="2854001"/>
+              <a:ext cx="1688840" cy="496"/>
+            </a:xfrm>
+            <a:prstGeom prst="line">
+              <a:avLst/>
+            </a:prstGeom>
+            <a:ln w="38100">
+              <a:solidFill>
+                <a:srgbClr val="92D050"/>
+              </a:solidFill>
+            </a:ln>
+          </p:spPr>
+          <p:style>
+            <a:lnRef idx="1">
+              <a:schemeClr val="accent1"/>
+            </a:lnRef>
+            <a:fillRef idx="0">
+              <a:schemeClr val="accent1"/>
+            </a:fillRef>
+            <a:effectRef idx="0">
+              <a:schemeClr val="accent1"/>
+            </a:effectRef>
+            <a:fontRef idx="minor">
+              <a:schemeClr val="tx1"/>
+            </a:fontRef>
+          </p:style>
+        </p:cxnSp>
+        <p:cxnSp>
+          <p:nvCxnSpPr>
+            <p:cNvPr id="11" name="Straight Connector 10">
+              <a:extLst>
+                <a:ext uri="{FF2B5EF4-FFF2-40B4-BE49-F238E27FC236}">
+                  <a16:creationId xmlns:a16="http://schemas.microsoft.com/office/drawing/2014/main" xmlns="" id="{5AC8A0DA-CD7C-40F0-9944-C4662120BB38}"/>
+                </a:ext>
+              </a:extLst>
+            </p:cNvPr>
+            <p:cNvCxnSpPr/>
+            <p:nvPr/>
+          </p:nvCxnSpPr>
+          <p:spPr>
+            <a:xfrm>
+              <a:off x="6009151" y="2405635"/>
+              <a:ext cx="0" cy="1828800"/>
+            </a:xfrm>
+            <a:prstGeom prst="line">
+              <a:avLst/>
+            </a:prstGeom>
+            <a:ln w="38100">
+              <a:solidFill>
+                <a:srgbClr val="92D050"/>
+              </a:solidFill>
+            </a:ln>
+          </p:spPr>
+          <p:style>
+            <a:lnRef idx="1">
+              <a:schemeClr val="accent1"/>
+            </a:lnRef>
+            <a:fillRef idx="0">
+              <a:schemeClr val="accent1"/>
+            </a:fillRef>
+            <a:effectRef idx="0">
+              <a:schemeClr val="accent1"/>
+            </a:effectRef>
+            <a:fontRef idx="minor">
+              <a:schemeClr val="tx1"/>
+            </a:fontRef>
+          </p:style>
+        </p:cxnSp>
+        <p:cxnSp>
+          <p:nvCxnSpPr>
+            <p:cNvPr id="16" name="Straight Connector 15"/>
+            <p:cNvCxnSpPr/>
+            <p:nvPr/>
+          </p:nvCxnSpPr>
+          <p:spPr>
+            <a:xfrm flipH="1">
+              <a:off x="5169089" y="2703342"/>
+              <a:ext cx="1" cy="299542"/>
+            </a:xfrm>
+            <a:prstGeom prst="line">
+              <a:avLst/>
+            </a:prstGeom>
+            <a:ln w="38100">
+              <a:solidFill>
+                <a:srgbClr val="FF0000"/>
+              </a:solidFill>
+            </a:ln>
+          </p:spPr>
+          <p:style>
+            <a:lnRef idx="1">
+              <a:schemeClr val="accent1"/>
+            </a:lnRef>
+            <a:fillRef idx="0">
+              <a:schemeClr val="accent1"/>
+            </a:fillRef>
+            <a:effectRef idx="0">
+              <a:schemeClr val="accent1"/>
+            </a:effectRef>
+            <a:fontRef idx="minor">
+              <a:schemeClr val="tx1"/>
+            </a:fontRef>
+          </p:style>
+        </p:cxnSp>
+        <p:sp>
+          <p:nvSpPr>
+            <p:cNvPr id="18" name="TextBox 17"/>
+            <p:cNvSpPr txBox="1"/>
+            <p:nvPr/>
+          </p:nvSpPr>
+          <p:spPr>
+            <a:xfrm>
+              <a:off x="3905011" y="2125706"/>
+              <a:ext cx="1340596" cy="504112"/>
+            </a:xfrm>
+            <a:prstGeom prst="rect">
+              <a:avLst/>
+            </a:prstGeom>
+            <a:noFill/>
+          </p:spPr>
+          <p:txBody>
+            <a:bodyPr wrap="none" rtlCol="0">
+              <a:spAutoFit/>
+            </a:bodyPr>
+            <a:lstStyle/>
+            <a:p>
+              <a:r>
+                <a:rPr lang="en-US" sz="1600" dirty="0" smtClean="0"/>
+                <a:t>Palpebral fissure</a:t>
+              </a:r>
+            </a:p>
+            <a:p>
+              <a:r>
+                <a:rPr lang="en-US" sz="1600" dirty="0" smtClean="0"/>
+                <a:t>height right </a:t>
+              </a:r>
+              <a:endParaRPr lang="en-US" sz="1600" dirty="0"/>
+            </a:p>
+          </p:txBody>
+        </p:sp>
+        <p:cxnSp>
+          <p:nvCxnSpPr>
+            <p:cNvPr id="19" name="Straight Connector 18"/>
+            <p:cNvCxnSpPr/>
+            <p:nvPr/>
+          </p:nvCxnSpPr>
+          <p:spPr>
+            <a:xfrm flipH="1">
+              <a:off x="6824737" y="2791211"/>
+              <a:ext cx="1" cy="118240"/>
+            </a:xfrm>
+            <a:prstGeom prst="line">
+              <a:avLst/>
+            </a:prstGeom>
+            <a:ln w="38100">
+              <a:solidFill>
+                <a:srgbClr val="FF0000"/>
+              </a:solidFill>
+            </a:ln>
+          </p:spPr>
+          <p:style>
+            <a:lnRef idx="1">
+              <a:schemeClr val="accent1"/>
+            </a:lnRef>
+            <a:fillRef idx="0">
+              <a:schemeClr val="accent1"/>
+            </a:fillRef>
+            <a:effectRef idx="0">
+              <a:schemeClr val="accent1"/>
+            </a:effectRef>
+            <a:fontRef idx="minor">
+              <a:schemeClr val="tx1"/>
+            </a:fontRef>
+          </p:style>
+        </p:cxnSp>
+        <p:sp>
+          <p:nvSpPr>
+            <p:cNvPr id="21" name="TextBox 20"/>
+            <p:cNvSpPr txBox="1"/>
+            <p:nvPr/>
+          </p:nvSpPr>
+          <p:spPr>
+            <a:xfrm>
+              <a:off x="7047898" y="2248000"/>
+              <a:ext cx="1340596" cy="504112"/>
+            </a:xfrm>
+            <a:prstGeom prst="rect">
+              <a:avLst/>
+            </a:prstGeom>
+            <a:noFill/>
+          </p:spPr>
+          <p:txBody>
+            <a:bodyPr wrap="none" rtlCol="0">
+              <a:spAutoFit/>
+            </a:bodyPr>
+            <a:lstStyle/>
+            <a:p>
+              <a:r>
+                <a:rPr lang="en-US" sz="1600" dirty="0"/>
+                <a:t>Palpebral fissure</a:t>
+              </a:r>
+            </a:p>
+            <a:p>
+              <a:r>
+                <a:rPr lang="en-US" sz="1600" dirty="0"/>
+                <a:t>height </a:t>
+              </a:r>
+              <a:r>
+                <a:rPr lang="en-US" sz="1600" dirty="0" smtClean="0"/>
+                <a:t>left </a:t>
+              </a:r>
+              <a:endParaRPr lang="en-US" sz="1600" dirty="0"/>
+            </a:p>
+          </p:txBody>
+        </p:sp>
+        <p:cxnSp>
+          <p:nvCxnSpPr>
+            <p:cNvPr id="23" name="Straight Arrow Connector 22"/>
+            <p:cNvCxnSpPr/>
+            <p:nvPr/>
+          </p:nvCxnSpPr>
+          <p:spPr>
+            <a:xfrm>
+              <a:off x="4698076" y="2688199"/>
+              <a:ext cx="413741" cy="128977"/>
+            </a:xfrm>
+            <a:prstGeom prst="straightConnector1">
+              <a:avLst/>
+            </a:prstGeom>
+            <a:ln>
+              <a:tailEnd type="triangle"/>
+            </a:ln>
+          </p:spPr>
+          <p:style>
+            <a:lnRef idx="1">
+              <a:schemeClr val="dk1"/>
+            </a:lnRef>
+            <a:fillRef idx="0">
+              <a:schemeClr val="dk1"/>
+            </a:fillRef>
+            <a:effectRef idx="0">
+              <a:schemeClr val="dk1"/>
+            </a:effectRef>
+            <a:fontRef idx="minor">
+              <a:schemeClr val="tx1"/>
+            </a:fontRef>
+          </p:style>
+        </p:cxnSp>
+        <p:cxnSp>
+          <p:nvCxnSpPr>
+            <p:cNvPr id="25" name="Straight Arrow Connector 24"/>
+            <p:cNvCxnSpPr/>
+            <p:nvPr/>
+          </p:nvCxnSpPr>
+          <p:spPr>
+            <a:xfrm flipH="1">
+              <a:off x="6861407" y="2615012"/>
+              <a:ext cx="186491" cy="218159"/>
+            </a:xfrm>
+            <a:prstGeom prst="straightConnector1">
+              <a:avLst/>
+            </a:prstGeom>
+            <a:ln>
+              <a:tailEnd type="triangle"/>
+            </a:ln>
+          </p:spPr>
+          <p:style>
+            <a:lnRef idx="1">
+              <a:schemeClr val="dk1"/>
+            </a:lnRef>
+            <a:fillRef idx="0">
+              <a:schemeClr val="dk1"/>
+            </a:fillRef>
+            <a:effectRef idx="0">
+              <a:schemeClr val="dk1"/>
+            </a:effectRef>
+            <a:fontRef idx="minor">
+              <a:schemeClr val="tx1"/>
+            </a:fontRef>
+          </p:style>
+        </p:cxnSp>
+        <p:sp>
+          <p:nvSpPr>
+            <p:cNvPr id="26" name="TextBox 25"/>
+            <p:cNvSpPr txBox="1"/>
+            <p:nvPr/>
+          </p:nvSpPr>
+          <p:spPr>
+            <a:xfrm>
+              <a:off x="2647653" y="4224171"/>
+              <a:ext cx="6667500" cy="557177"/>
+            </a:xfrm>
+            <a:prstGeom prst="rect">
+              <a:avLst/>
+            </a:prstGeom>
+            <a:solidFill>
+              <a:schemeClr val="bg1">
+                <a:lumMod val="85000"/>
+              </a:schemeClr>
+            </a:solidFill>
+          </p:spPr>
+          <p:txBody>
+            <a:bodyPr wrap="square" rtlCol="0">
+              <a:spAutoFit/>
+            </a:bodyPr>
+            <a:lstStyle/>
+            <a:p>
+              <a:r>
+                <a:rPr lang="en-US" b="1" dirty="0"/>
+                <a:t>Palpebral F</a:t>
+              </a:r>
+              <a:r>
+                <a:rPr lang="en-US" b="1" dirty="0" smtClean="0"/>
+                <a:t>issure </a:t>
+              </a:r>
+              <a:r>
+                <a:rPr lang="en-US" b="1" dirty="0"/>
+                <a:t>H</a:t>
+              </a:r>
+              <a:r>
+                <a:rPr lang="en-US" b="1" dirty="0" smtClean="0"/>
+                <a:t>eight : </a:t>
+              </a:r>
+            </a:p>
+            <a:p>
+              <a:r>
+                <a:rPr lang="en-US" dirty="0" smtClean="0"/>
+                <a:t>Vertical distance between medial canthi </a:t>
+              </a:r>
+              <a:r>
+                <a:rPr lang="en-US" dirty="0"/>
+                <a:t>of the two open </a:t>
+              </a:r>
+              <a:r>
+                <a:rPr lang="en-US" dirty="0" smtClean="0"/>
+                <a:t>lids    </a:t>
+              </a:r>
+              <a:endParaRPr lang="en-US" dirty="0"/>
+            </a:p>
+          </p:txBody>
+        </p:sp>
+      </p:grpSp>
+    </p:spTree>
+    <p:extLst>
+      <p:ext uri="{BB962C8B-B14F-4D97-AF65-F5344CB8AC3E}">
+        <p14:creationId xmlns:p14="http://schemas.microsoft.com/office/powerpoint/2010/main" val="2826935233"/>
       </p:ext>
     </p:extLst>
   </p:cSld>
@@ -11519,7 +12793,7 @@
             <p:cNvPr id="12" name="Picture 11">
               <a:extLst>
                 <a:ext uri="{FF2B5EF4-FFF2-40B4-BE49-F238E27FC236}">
-                  <a16:creationId xmlns="" xmlns:a16="http://schemas.microsoft.com/office/drawing/2014/main" id="{7CAB2C9B-AE1C-4912-97CF-C20C3E33C55A}"/>
+                  <a16:creationId xmlns:a16="http://schemas.microsoft.com/office/drawing/2014/main" xmlns="" id="{7CAB2C9B-AE1C-4912-97CF-C20C3E33C55A}"/>
                 </a:ext>
               </a:extLst>
             </p:cNvPr>
@@ -11574,7 +12848,7 @@
             <p:cNvPr id="6" name="Oval 5">
               <a:extLst>
                 <a:ext uri="{FF2B5EF4-FFF2-40B4-BE49-F238E27FC236}">
-                  <a16:creationId xmlns="" xmlns:a16="http://schemas.microsoft.com/office/drawing/2014/main" id="{2F810603-F2BA-4678-835C-1CEE13D71312}"/>
+                  <a16:creationId xmlns:a16="http://schemas.microsoft.com/office/drawing/2014/main" xmlns="" id="{2F810603-F2BA-4678-835C-1CEE13D71312}"/>
                 </a:ext>
               </a:extLst>
             </p:cNvPr>
@@ -11626,7 +12900,7 @@
             <p:cNvPr id="7" name="Oval 6">
               <a:extLst>
                 <a:ext uri="{FF2B5EF4-FFF2-40B4-BE49-F238E27FC236}">
-                  <a16:creationId xmlns="" xmlns:a16="http://schemas.microsoft.com/office/drawing/2014/main" id="{858F4A02-171E-4043-8210-CC65AE0C4C0E}"/>
+                  <a16:creationId xmlns:a16="http://schemas.microsoft.com/office/drawing/2014/main" xmlns="" id="{858F4A02-171E-4043-8210-CC65AE0C4C0E}"/>
                 </a:ext>
               </a:extLst>
             </p:cNvPr>
@@ -11678,7 +12952,7 @@
             <p:cNvPr id="8" name="Oval 7">
               <a:extLst>
                 <a:ext uri="{FF2B5EF4-FFF2-40B4-BE49-F238E27FC236}">
-                  <a16:creationId xmlns="" xmlns:a16="http://schemas.microsoft.com/office/drawing/2014/main" id="{13548D78-DF90-4713-ADC1-EB50E3FDEB32}"/>
+                  <a16:creationId xmlns:a16="http://schemas.microsoft.com/office/drawing/2014/main" xmlns="" id="{13548D78-DF90-4713-ADC1-EB50E3FDEB32}"/>
                 </a:ext>
               </a:extLst>
             </p:cNvPr>
@@ -11732,7 +13006,7 @@
             <p:cNvPr id="9" name="Oval 8">
               <a:extLst>
                 <a:ext uri="{FF2B5EF4-FFF2-40B4-BE49-F238E27FC236}">
-                  <a16:creationId xmlns="" xmlns:a16="http://schemas.microsoft.com/office/drawing/2014/main" id="{BAAD5FAB-5347-4484-B55F-A813BF4CCD46}"/>
+                  <a16:creationId xmlns:a16="http://schemas.microsoft.com/office/drawing/2014/main" xmlns="" id="{BAAD5FAB-5347-4484-B55F-A813BF4CCD46}"/>
                 </a:ext>
               </a:extLst>
             </p:cNvPr>
@@ -11786,7 +13060,7 @@
             <p:cNvPr id="10" name="Straight Connector 9">
               <a:extLst>
                 <a:ext uri="{FF2B5EF4-FFF2-40B4-BE49-F238E27FC236}">
-                  <a16:creationId xmlns="" xmlns:a16="http://schemas.microsoft.com/office/drawing/2014/main" id="{52AE0F85-D404-4572-99DE-871203465D72}"/>
+                  <a16:creationId xmlns:a16="http://schemas.microsoft.com/office/drawing/2014/main" xmlns="" id="{52AE0F85-D404-4572-99DE-871203465D72}"/>
                 </a:ext>
               </a:extLst>
             </p:cNvPr>
@@ -11829,7 +13103,7 @@
             <p:cNvPr id="11" name="Straight Connector 10">
               <a:extLst>
                 <a:ext uri="{FF2B5EF4-FFF2-40B4-BE49-F238E27FC236}">
-                  <a16:creationId xmlns="" xmlns:a16="http://schemas.microsoft.com/office/drawing/2014/main" id="{5AC8A0DA-CD7C-40F0-9944-C4662120BB38}"/>
+                  <a16:creationId xmlns:a16="http://schemas.microsoft.com/office/drawing/2014/main" xmlns="" id="{5AC8A0DA-CD7C-40F0-9944-C4662120BB38}"/>
                 </a:ext>
               </a:extLst>
             </p:cNvPr>
@@ -12127,7 +13401,7 @@
             <p:cNvPr id="5" name="Picture 4">
               <a:extLst>
                 <a:ext uri="{FF2B5EF4-FFF2-40B4-BE49-F238E27FC236}">
-                  <a16:creationId xmlns="" xmlns:a16="http://schemas.microsoft.com/office/drawing/2014/main" id="{7CAB2C9B-AE1C-4912-97CF-C20C3E33C55A}"/>
+                  <a16:creationId xmlns:a16="http://schemas.microsoft.com/office/drawing/2014/main" xmlns="" id="{7CAB2C9B-AE1C-4912-97CF-C20C3E33C55A}"/>
                 </a:ext>
               </a:extLst>
             </p:cNvPr>
@@ -12182,7 +13456,7 @@
             <p:cNvPr id="6" name="Oval 5">
               <a:extLst>
                 <a:ext uri="{FF2B5EF4-FFF2-40B4-BE49-F238E27FC236}">
-                  <a16:creationId xmlns="" xmlns:a16="http://schemas.microsoft.com/office/drawing/2014/main" id="{2F810603-F2BA-4678-835C-1CEE13D71312}"/>
+                  <a16:creationId xmlns:a16="http://schemas.microsoft.com/office/drawing/2014/main" xmlns="" id="{2F810603-F2BA-4678-835C-1CEE13D71312}"/>
                 </a:ext>
               </a:extLst>
             </p:cNvPr>
@@ -12234,7 +13508,7 @@
             <p:cNvPr id="7" name="Oval 6">
               <a:extLst>
                 <a:ext uri="{FF2B5EF4-FFF2-40B4-BE49-F238E27FC236}">
-                  <a16:creationId xmlns="" xmlns:a16="http://schemas.microsoft.com/office/drawing/2014/main" id="{858F4A02-171E-4043-8210-CC65AE0C4C0E}"/>
+                  <a16:creationId xmlns:a16="http://schemas.microsoft.com/office/drawing/2014/main" xmlns="" id="{858F4A02-171E-4043-8210-CC65AE0C4C0E}"/>
                 </a:ext>
               </a:extLst>
             </p:cNvPr>
@@ -12286,7 +13560,7 @@
             <p:cNvPr id="8" name="Oval 7">
               <a:extLst>
                 <a:ext uri="{FF2B5EF4-FFF2-40B4-BE49-F238E27FC236}">
-                  <a16:creationId xmlns="" xmlns:a16="http://schemas.microsoft.com/office/drawing/2014/main" id="{13548D78-DF90-4713-ADC1-EB50E3FDEB32}"/>
+                  <a16:creationId xmlns:a16="http://schemas.microsoft.com/office/drawing/2014/main" xmlns="" id="{13548D78-DF90-4713-ADC1-EB50E3FDEB32}"/>
                 </a:ext>
               </a:extLst>
             </p:cNvPr>
@@ -12340,7 +13614,7 @@
             <p:cNvPr id="9" name="Oval 8">
               <a:extLst>
                 <a:ext uri="{FF2B5EF4-FFF2-40B4-BE49-F238E27FC236}">
-                  <a16:creationId xmlns="" xmlns:a16="http://schemas.microsoft.com/office/drawing/2014/main" id="{BAAD5FAB-5347-4484-B55F-A813BF4CCD46}"/>
+                  <a16:creationId xmlns:a16="http://schemas.microsoft.com/office/drawing/2014/main" xmlns="" id="{BAAD5FAB-5347-4484-B55F-A813BF4CCD46}"/>
                 </a:ext>
               </a:extLst>
             </p:cNvPr>
@@ -12394,7 +13668,7 @@
             <p:cNvPr id="10" name="Straight Connector 9">
               <a:extLst>
                 <a:ext uri="{FF2B5EF4-FFF2-40B4-BE49-F238E27FC236}">
-                  <a16:creationId xmlns="" xmlns:a16="http://schemas.microsoft.com/office/drawing/2014/main" id="{52AE0F85-D404-4572-99DE-871203465D72}"/>
+                  <a16:creationId xmlns:a16="http://schemas.microsoft.com/office/drawing/2014/main" xmlns="" id="{52AE0F85-D404-4572-99DE-871203465D72}"/>
                 </a:ext>
               </a:extLst>
             </p:cNvPr>
@@ -12437,7 +13711,7 @@
             <p:cNvPr id="11" name="Straight Connector 10">
               <a:extLst>
                 <a:ext uri="{FF2B5EF4-FFF2-40B4-BE49-F238E27FC236}">
-                  <a16:creationId xmlns="" xmlns:a16="http://schemas.microsoft.com/office/drawing/2014/main" id="{5AC8A0DA-CD7C-40F0-9944-C4662120BB38}"/>
+                  <a16:creationId xmlns:a16="http://schemas.microsoft.com/office/drawing/2014/main" xmlns="" id="{5AC8A0DA-CD7C-40F0-9944-C4662120BB38}"/>
                 </a:ext>
               </a:extLst>
             </p:cNvPr>
@@ -12770,7 +14044,7 @@
             <p:cNvPr id="5" name="Picture 4">
               <a:extLst>
                 <a:ext uri="{FF2B5EF4-FFF2-40B4-BE49-F238E27FC236}">
-                  <a16:creationId xmlns="" xmlns:a16="http://schemas.microsoft.com/office/drawing/2014/main" id="{7CAB2C9B-AE1C-4912-97CF-C20C3E33C55A}"/>
+                  <a16:creationId xmlns:a16="http://schemas.microsoft.com/office/drawing/2014/main" xmlns="" id="{7CAB2C9B-AE1C-4912-97CF-C20C3E33C55A}"/>
                 </a:ext>
               </a:extLst>
             </p:cNvPr>
@@ -12825,7 +14099,7 @@
             <p:cNvPr id="6" name="Oval 5">
               <a:extLst>
                 <a:ext uri="{FF2B5EF4-FFF2-40B4-BE49-F238E27FC236}">
-                  <a16:creationId xmlns="" xmlns:a16="http://schemas.microsoft.com/office/drawing/2014/main" id="{2F810603-F2BA-4678-835C-1CEE13D71312}"/>
+                  <a16:creationId xmlns:a16="http://schemas.microsoft.com/office/drawing/2014/main" xmlns="" id="{2F810603-F2BA-4678-835C-1CEE13D71312}"/>
                 </a:ext>
               </a:extLst>
             </p:cNvPr>
@@ -12877,7 +14151,7 @@
             <p:cNvPr id="7" name="Oval 6">
               <a:extLst>
                 <a:ext uri="{FF2B5EF4-FFF2-40B4-BE49-F238E27FC236}">
-                  <a16:creationId xmlns="" xmlns:a16="http://schemas.microsoft.com/office/drawing/2014/main" id="{858F4A02-171E-4043-8210-CC65AE0C4C0E}"/>
+                  <a16:creationId xmlns:a16="http://schemas.microsoft.com/office/drawing/2014/main" xmlns="" id="{858F4A02-171E-4043-8210-CC65AE0C4C0E}"/>
                 </a:ext>
               </a:extLst>
             </p:cNvPr>
@@ -12929,7 +14203,7 @@
             <p:cNvPr id="8" name="Oval 7">
               <a:extLst>
                 <a:ext uri="{FF2B5EF4-FFF2-40B4-BE49-F238E27FC236}">
-                  <a16:creationId xmlns="" xmlns:a16="http://schemas.microsoft.com/office/drawing/2014/main" id="{13548D78-DF90-4713-ADC1-EB50E3FDEB32}"/>
+                  <a16:creationId xmlns:a16="http://schemas.microsoft.com/office/drawing/2014/main" xmlns="" id="{13548D78-DF90-4713-ADC1-EB50E3FDEB32}"/>
                 </a:ext>
               </a:extLst>
             </p:cNvPr>
@@ -12983,7 +14257,7 @@
             <p:cNvPr id="9" name="Oval 8">
               <a:extLst>
                 <a:ext uri="{FF2B5EF4-FFF2-40B4-BE49-F238E27FC236}">
-                  <a16:creationId xmlns="" xmlns:a16="http://schemas.microsoft.com/office/drawing/2014/main" id="{BAAD5FAB-5347-4484-B55F-A813BF4CCD46}"/>
+                  <a16:creationId xmlns:a16="http://schemas.microsoft.com/office/drawing/2014/main" xmlns="" id="{BAAD5FAB-5347-4484-B55F-A813BF4CCD46}"/>
                 </a:ext>
               </a:extLst>
             </p:cNvPr>
@@ -13037,7 +14311,7 @@
             <p:cNvPr id="10" name="Straight Connector 9">
               <a:extLst>
                 <a:ext uri="{FF2B5EF4-FFF2-40B4-BE49-F238E27FC236}">
-                  <a16:creationId xmlns="" xmlns:a16="http://schemas.microsoft.com/office/drawing/2014/main" id="{52AE0F85-D404-4572-99DE-871203465D72}"/>
+                  <a16:creationId xmlns:a16="http://schemas.microsoft.com/office/drawing/2014/main" xmlns="" id="{52AE0F85-D404-4572-99DE-871203465D72}"/>
                 </a:ext>
               </a:extLst>
             </p:cNvPr>
@@ -13080,7 +14354,7 @@
             <p:cNvPr id="11" name="Straight Connector 10">
               <a:extLst>
                 <a:ext uri="{FF2B5EF4-FFF2-40B4-BE49-F238E27FC236}">
-                  <a16:creationId xmlns="" xmlns:a16="http://schemas.microsoft.com/office/drawing/2014/main" id="{5AC8A0DA-CD7C-40F0-9944-C4662120BB38}"/>
+                  <a16:creationId xmlns:a16="http://schemas.microsoft.com/office/drawing/2014/main" xmlns="" id="{5AC8A0DA-CD7C-40F0-9944-C4662120BB38}"/>
                 </a:ext>
               </a:extLst>
             </p:cNvPr>
@@ -13376,7 +14650,7 @@
             <p:cNvPr id="5" name="Picture 4">
               <a:extLst>
                 <a:ext uri="{FF2B5EF4-FFF2-40B4-BE49-F238E27FC236}">
-                  <a16:creationId xmlns="" xmlns:a16="http://schemas.microsoft.com/office/drawing/2014/main" id="{7CAB2C9B-AE1C-4912-97CF-C20C3E33C55A}"/>
+                  <a16:creationId xmlns:a16="http://schemas.microsoft.com/office/drawing/2014/main" xmlns="" id="{7CAB2C9B-AE1C-4912-97CF-C20C3E33C55A}"/>
                 </a:ext>
               </a:extLst>
             </p:cNvPr>
@@ -13431,7 +14705,7 @@
             <p:cNvPr id="6" name="Oval 5">
               <a:extLst>
                 <a:ext uri="{FF2B5EF4-FFF2-40B4-BE49-F238E27FC236}">
-                  <a16:creationId xmlns="" xmlns:a16="http://schemas.microsoft.com/office/drawing/2014/main" id="{2F810603-F2BA-4678-835C-1CEE13D71312}"/>
+                  <a16:creationId xmlns:a16="http://schemas.microsoft.com/office/drawing/2014/main" xmlns="" id="{2F810603-F2BA-4678-835C-1CEE13D71312}"/>
                 </a:ext>
               </a:extLst>
             </p:cNvPr>
@@ -13483,7 +14757,7 @@
             <p:cNvPr id="7" name="Oval 6">
               <a:extLst>
                 <a:ext uri="{FF2B5EF4-FFF2-40B4-BE49-F238E27FC236}">
-                  <a16:creationId xmlns="" xmlns:a16="http://schemas.microsoft.com/office/drawing/2014/main" id="{858F4A02-171E-4043-8210-CC65AE0C4C0E}"/>
+                  <a16:creationId xmlns:a16="http://schemas.microsoft.com/office/drawing/2014/main" xmlns="" id="{858F4A02-171E-4043-8210-CC65AE0C4C0E}"/>
                 </a:ext>
               </a:extLst>
             </p:cNvPr>
@@ -13535,7 +14809,7 @@
             <p:cNvPr id="8" name="Oval 7">
               <a:extLst>
                 <a:ext uri="{FF2B5EF4-FFF2-40B4-BE49-F238E27FC236}">
-                  <a16:creationId xmlns="" xmlns:a16="http://schemas.microsoft.com/office/drawing/2014/main" id="{13548D78-DF90-4713-ADC1-EB50E3FDEB32}"/>
+                  <a16:creationId xmlns:a16="http://schemas.microsoft.com/office/drawing/2014/main" xmlns="" id="{13548D78-DF90-4713-ADC1-EB50E3FDEB32}"/>
                 </a:ext>
               </a:extLst>
             </p:cNvPr>
@@ -13589,7 +14863,7 @@
             <p:cNvPr id="9" name="Oval 8">
               <a:extLst>
                 <a:ext uri="{FF2B5EF4-FFF2-40B4-BE49-F238E27FC236}">
-                  <a16:creationId xmlns="" xmlns:a16="http://schemas.microsoft.com/office/drawing/2014/main" id="{BAAD5FAB-5347-4484-B55F-A813BF4CCD46}"/>
+                  <a16:creationId xmlns:a16="http://schemas.microsoft.com/office/drawing/2014/main" xmlns="" id="{BAAD5FAB-5347-4484-B55F-A813BF4CCD46}"/>
                 </a:ext>
               </a:extLst>
             </p:cNvPr>
@@ -13643,7 +14917,7 @@
             <p:cNvPr id="10" name="Straight Connector 9">
               <a:extLst>
                 <a:ext uri="{FF2B5EF4-FFF2-40B4-BE49-F238E27FC236}">
-                  <a16:creationId xmlns="" xmlns:a16="http://schemas.microsoft.com/office/drawing/2014/main" id="{52AE0F85-D404-4572-99DE-871203465D72}"/>
+                  <a16:creationId xmlns:a16="http://schemas.microsoft.com/office/drawing/2014/main" xmlns="" id="{52AE0F85-D404-4572-99DE-871203465D72}"/>
                 </a:ext>
               </a:extLst>
             </p:cNvPr>
@@ -13686,7 +14960,7 @@
             <p:cNvPr id="11" name="Straight Connector 10">
               <a:extLst>
                 <a:ext uri="{FF2B5EF4-FFF2-40B4-BE49-F238E27FC236}">
-                  <a16:creationId xmlns="" xmlns:a16="http://schemas.microsoft.com/office/drawing/2014/main" id="{5AC8A0DA-CD7C-40F0-9944-C4662120BB38}"/>
+                  <a16:creationId xmlns:a16="http://schemas.microsoft.com/office/drawing/2014/main" xmlns="" id="{5AC8A0DA-CD7C-40F0-9944-C4662120BB38}"/>
                 </a:ext>
               </a:extLst>
             </p:cNvPr>
@@ -14024,7 +15298,7 @@
             <p:cNvPr id="5" name="Picture 4">
               <a:extLst>
                 <a:ext uri="{FF2B5EF4-FFF2-40B4-BE49-F238E27FC236}">
-                  <a16:creationId xmlns="" xmlns:a16="http://schemas.microsoft.com/office/drawing/2014/main" id="{7CAB2C9B-AE1C-4912-97CF-C20C3E33C55A}"/>
+                  <a16:creationId xmlns:a16="http://schemas.microsoft.com/office/drawing/2014/main" xmlns="" id="{7CAB2C9B-AE1C-4912-97CF-C20C3E33C55A}"/>
                 </a:ext>
               </a:extLst>
             </p:cNvPr>
@@ -14079,7 +15353,7 @@
             <p:cNvPr id="6" name="Oval 5">
               <a:extLst>
                 <a:ext uri="{FF2B5EF4-FFF2-40B4-BE49-F238E27FC236}">
-                  <a16:creationId xmlns="" xmlns:a16="http://schemas.microsoft.com/office/drawing/2014/main" id="{2F810603-F2BA-4678-835C-1CEE13D71312}"/>
+                  <a16:creationId xmlns:a16="http://schemas.microsoft.com/office/drawing/2014/main" xmlns="" id="{2F810603-F2BA-4678-835C-1CEE13D71312}"/>
                 </a:ext>
               </a:extLst>
             </p:cNvPr>
@@ -14131,7 +15405,7 @@
             <p:cNvPr id="7" name="Oval 6">
               <a:extLst>
                 <a:ext uri="{FF2B5EF4-FFF2-40B4-BE49-F238E27FC236}">
-                  <a16:creationId xmlns="" xmlns:a16="http://schemas.microsoft.com/office/drawing/2014/main" id="{858F4A02-171E-4043-8210-CC65AE0C4C0E}"/>
+                  <a16:creationId xmlns:a16="http://schemas.microsoft.com/office/drawing/2014/main" xmlns="" id="{858F4A02-171E-4043-8210-CC65AE0C4C0E}"/>
                 </a:ext>
               </a:extLst>
             </p:cNvPr>
@@ -14183,7 +15457,7 @@
             <p:cNvPr id="8" name="Oval 7">
               <a:extLst>
                 <a:ext uri="{FF2B5EF4-FFF2-40B4-BE49-F238E27FC236}">
-                  <a16:creationId xmlns="" xmlns:a16="http://schemas.microsoft.com/office/drawing/2014/main" id="{13548D78-DF90-4713-ADC1-EB50E3FDEB32}"/>
+                  <a16:creationId xmlns:a16="http://schemas.microsoft.com/office/drawing/2014/main" xmlns="" id="{13548D78-DF90-4713-ADC1-EB50E3FDEB32}"/>
                 </a:ext>
               </a:extLst>
             </p:cNvPr>
@@ -14237,7 +15511,7 @@
             <p:cNvPr id="9" name="Oval 8">
               <a:extLst>
                 <a:ext uri="{FF2B5EF4-FFF2-40B4-BE49-F238E27FC236}">
-                  <a16:creationId xmlns="" xmlns:a16="http://schemas.microsoft.com/office/drawing/2014/main" id="{BAAD5FAB-5347-4484-B55F-A813BF4CCD46}"/>
+                  <a16:creationId xmlns:a16="http://schemas.microsoft.com/office/drawing/2014/main" xmlns="" id="{BAAD5FAB-5347-4484-B55F-A813BF4CCD46}"/>
                 </a:ext>
               </a:extLst>
             </p:cNvPr>
@@ -14291,7 +15565,7 @@
             <p:cNvPr id="10" name="Straight Connector 9">
               <a:extLst>
                 <a:ext uri="{FF2B5EF4-FFF2-40B4-BE49-F238E27FC236}">
-                  <a16:creationId xmlns="" xmlns:a16="http://schemas.microsoft.com/office/drawing/2014/main" id="{52AE0F85-D404-4572-99DE-871203465D72}"/>
+                  <a16:creationId xmlns:a16="http://schemas.microsoft.com/office/drawing/2014/main" xmlns="" id="{52AE0F85-D404-4572-99DE-871203465D72}"/>
                 </a:ext>
               </a:extLst>
             </p:cNvPr>
@@ -14334,7 +15608,7 @@
             <p:cNvPr id="11" name="Straight Connector 10">
               <a:extLst>
                 <a:ext uri="{FF2B5EF4-FFF2-40B4-BE49-F238E27FC236}">
-                  <a16:creationId xmlns="" xmlns:a16="http://schemas.microsoft.com/office/drawing/2014/main" id="{5AC8A0DA-CD7C-40F0-9944-C4662120BB38}"/>
+                  <a16:creationId xmlns:a16="http://schemas.microsoft.com/office/drawing/2014/main" xmlns="" id="{5AC8A0DA-CD7C-40F0-9944-C4662120BB38}"/>
                 </a:ext>
               </a:extLst>
             </p:cNvPr>
@@ -14647,7 +15921,7 @@
               <p:cNvPr id="4" name="Group 3">
                 <a:extLst>
                   <a:ext uri="{FF2B5EF4-FFF2-40B4-BE49-F238E27FC236}">
-                    <a16:creationId xmlns="" xmlns:a16="http://schemas.microsoft.com/office/drawing/2014/main" id="{49DDB6D7-D67C-4795-BC2B-F36D181B40FD}"/>
+                    <a16:creationId xmlns:a16="http://schemas.microsoft.com/office/drawing/2014/main" xmlns="" id="{49DDB6D7-D67C-4795-BC2B-F36D181B40FD}"/>
                   </a:ext>
                 </a:extLst>
               </p:cNvPr>
@@ -14667,7 +15941,7 @@
                 <p:cNvPr id="5" name="Group 4">
                   <a:extLst>
                     <a:ext uri="{FF2B5EF4-FFF2-40B4-BE49-F238E27FC236}">
-                      <a16:creationId xmlns="" xmlns:a16="http://schemas.microsoft.com/office/drawing/2014/main" id="{9DCB9AA3-F151-4C06-BDF2-772192554CB8}"/>
+                      <a16:creationId xmlns:a16="http://schemas.microsoft.com/office/drawing/2014/main" xmlns="" id="{9DCB9AA3-F151-4C06-BDF2-772192554CB8}"/>
                     </a:ext>
                   </a:extLst>
                 </p:cNvPr>
@@ -14694,7 +15968,7 @@
                   <p:cNvPr id="12" name="Picture 11">
                     <a:extLst>
                       <a:ext uri="{FF2B5EF4-FFF2-40B4-BE49-F238E27FC236}">
-                        <a16:creationId xmlns="" xmlns:a16="http://schemas.microsoft.com/office/drawing/2014/main" id="{7CAB2C9B-AE1C-4912-97CF-C20C3E33C55A}"/>
+                        <a16:creationId xmlns:a16="http://schemas.microsoft.com/office/drawing/2014/main" xmlns="" id="{7CAB2C9B-AE1C-4912-97CF-C20C3E33C55A}"/>
                       </a:ext>
                     </a:extLst>
                   </p:cNvPr>
@@ -14747,7 +16021,7 @@
                       <p14:cNvPr id="13" name="Ink 12">
                         <a:extLst>
                           <a:ext uri="{FF2B5EF4-FFF2-40B4-BE49-F238E27FC236}">
-                            <a16:creationId xmlns="" xmlns:a16="http://schemas.microsoft.com/office/drawing/2014/main" id="{6205DD0C-C8AF-4BD3-AABD-F90EEFD7682B}"/>
+                            <a16:creationId xmlns:a16="http://schemas.microsoft.com/office/drawing/2014/main" xmlns="" id="{6205DD0C-C8AF-4BD3-AABD-F90EEFD7682B}"/>
                           </a:ext>
                         </a:extLst>
                       </p14:cNvPr>
@@ -14797,7 +16071,7 @@
                 <p:cNvPr id="6" name="Oval 5">
                   <a:extLst>
                     <a:ext uri="{FF2B5EF4-FFF2-40B4-BE49-F238E27FC236}">
-                      <a16:creationId xmlns="" xmlns:a16="http://schemas.microsoft.com/office/drawing/2014/main" id="{2F810603-F2BA-4678-835C-1CEE13D71312}"/>
+                      <a16:creationId xmlns:a16="http://schemas.microsoft.com/office/drawing/2014/main" xmlns="" id="{2F810603-F2BA-4678-835C-1CEE13D71312}"/>
                     </a:ext>
                   </a:extLst>
                 </p:cNvPr>
@@ -14849,7 +16123,7 @@
                 <p:cNvPr id="7" name="Oval 6">
                   <a:extLst>
                     <a:ext uri="{FF2B5EF4-FFF2-40B4-BE49-F238E27FC236}">
-                      <a16:creationId xmlns="" xmlns:a16="http://schemas.microsoft.com/office/drawing/2014/main" id="{858F4A02-171E-4043-8210-CC65AE0C4C0E}"/>
+                      <a16:creationId xmlns:a16="http://schemas.microsoft.com/office/drawing/2014/main" xmlns="" id="{858F4A02-171E-4043-8210-CC65AE0C4C0E}"/>
                     </a:ext>
                   </a:extLst>
                 </p:cNvPr>
@@ -14901,7 +16175,7 @@
                 <p:cNvPr id="8" name="Oval 7">
                   <a:extLst>
                     <a:ext uri="{FF2B5EF4-FFF2-40B4-BE49-F238E27FC236}">
-                      <a16:creationId xmlns="" xmlns:a16="http://schemas.microsoft.com/office/drawing/2014/main" id="{13548D78-DF90-4713-ADC1-EB50E3FDEB32}"/>
+                      <a16:creationId xmlns:a16="http://schemas.microsoft.com/office/drawing/2014/main" xmlns="" id="{13548D78-DF90-4713-ADC1-EB50E3FDEB32}"/>
                     </a:ext>
                   </a:extLst>
                 </p:cNvPr>
@@ -14955,7 +16229,7 @@
                 <p:cNvPr id="9" name="Oval 8">
                   <a:extLst>
                     <a:ext uri="{FF2B5EF4-FFF2-40B4-BE49-F238E27FC236}">
-                      <a16:creationId xmlns="" xmlns:a16="http://schemas.microsoft.com/office/drawing/2014/main" id="{BAAD5FAB-5347-4484-B55F-A813BF4CCD46}"/>
+                      <a16:creationId xmlns:a16="http://schemas.microsoft.com/office/drawing/2014/main" xmlns="" id="{BAAD5FAB-5347-4484-B55F-A813BF4CCD46}"/>
                     </a:ext>
                   </a:extLst>
                 </p:cNvPr>
@@ -15009,7 +16283,7 @@
                 <p:cNvPr id="10" name="Straight Connector 9">
                   <a:extLst>
                     <a:ext uri="{FF2B5EF4-FFF2-40B4-BE49-F238E27FC236}">
-                      <a16:creationId xmlns="" xmlns:a16="http://schemas.microsoft.com/office/drawing/2014/main" id="{52AE0F85-D404-4572-99DE-871203465D72}"/>
+                      <a16:creationId xmlns:a16="http://schemas.microsoft.com/office/drawing/2014/main" xmlns="" id="{52AE0F85-D404-4572-99DE-871203465D72}"/>
                     </a:ext>
                   </a:extLst>
                 </p:cNvPr>
@@ -15052,7 +16326,7 @@
                 <p:cNvPr id="11" name="Straight Connector 10">
                   <a:extLst>
                     <a:ext uri="{FF2B5EF4-FFF2-40B4-BE49-F238E27FC236}">
-                      <a16:creationId xmlns="" xmlns:a16="http://schemas.microsoft.com/office/drawing/2014/main" id="{5AC8A0DA-CD7C-40F0-9944-C4662120BB38}"/>
+                      <a16:creationId xmlns:a16="http://schemas.microsoft.com/office/drawing/2014/main" xmlns="" id="{5AC8A0DA-CD7C-40F0-9944-C4662120BB38}"/>
                     </a:ext>
                   </a:extLst>
                 </p:cNvPr>
@@ -15094,7 +16368,7 @@
               <p:cNvPr id="14" name="Straight Connector 13">
                 <a:extLst>
                   <a:ext uri="{FF2B5EF4-FFF2-40B4-BE49-F238E27FC236}">
-                    <a16:creationId xmlns="" xmlns:a16="http://schemas.microsoft.com/office/drawing/2014/main" id="{52AE0F85-D404-4572-99DE-871203465D72}"/>
+                    <a16:creationId xmlns:a16="http://schemas.microsoft.com/office/drawing/2014/main" xmlns="" id="{52AE0F85-D404-4572-99DE-871203465D72}"/>
                   </a:ext>
                 </a:extLst>
               </p:cNvPr>
@@ -15137,7 +16411,7 @@
               <p:cNvPr id="15" name="Straight Connector 14">
                 <a:extLst>
                   <a:ext uri="{FF2B5EF4-FFF2-40B4-BE49-F238E27FC236}">
-                    <a16:creationId xmlns="" xmlns:a16="http://schemas.microsoft.com/office/drawing/2014/main" id="{5AC8A0DA-CD7C-40F0-9944-C4662120BB38}"/>
+                    <a16:creationId xmlns:a16="http://schemas.microsoft.com/office/drawing/2014/main" xmlns="" id="{5AC8A0DA-CD7C-40F0-9944-C4662120BB38}"/>
                   </a:ext>
                 </a:extLst>
               </p:cNvPr>
@@ -15360,7 +16634,7 @@
             <p:cNvPr id="4" name="Group 3">
               <a:extLst>
                 <a:ext uri="{FF2B5EF4-FFF2-40B4-BE49-F238E27FC236}">
-                  <a16:creationId xmlns="" xmlns:a16="http://schemas.microsoft.com/office/drawing/2014/main" id="{49DDB6D7-D67C-4795-BC2B-F36D181B40FD}"/>
+                  <a16:creationId xmlns:a16="http://schemas.microsoft.com/office/drawing/2014/main" xmlns="" id="{49DDB6D7-D67C-4795-BC2B-F36D181B40FD}"/>
                 </a:ext>
               </a:extLst>
             </p:cNvPr>
@@ -15380,7 +16654,7 @@
               <p:cNvPr id="5" name="Group 4">
                 <a:extLst>
                   <a:ext uri="{FF2B5EF4-FFF2-40B4-BE49-F238E27FC236}">
-                    <a16:creationId xmlns="" xmlns:a16="http://schemas.microsoft.com/office/drawing/2014/main" id="{9DCB9AA3-F151-4C06-BDF2-772192554CB8}"/>
+                    <a16:creationId xmlns:a16="http://schemas.microsoft.com/office/drawing/2014/main" xmlns="" id="{9DCB9AA3-F151-4C06-BDF2-772192554CB8}"/>
                   </a:ext>
                 </a:extLst>
               </p:cNvPr>
@@ -15407,7 +16681,7 @@
                 <p:cNvPr id="12" name="Picture 11">
                   <a:extLst>
                     <a:ext uri="{FF2B5EF4-FFF2-40B4-BE49-F238E27FC236}">
-                      <a16:creationId xmlns="" xmlns:a16="http://schemas.microsoft.com/office/drawing/2014/main" id="{7CAB2C9B-AE1C-4912-97CF-C20C3E33C55A}"/>
+                      <a16:creationId xmlns:a16="http://schemas.microsoft.com/office/drawing/2014/main" xmlns="" id="{7CAB2C9B-AE1C-4912-97CF-C20C3E33C55A}"/>
                     </a:ext>
                   </a:extLst>
                 </p:cNvPr>
@@ -15460,7 +16734,7 @@
                     <p14:cNvPr id="13" name="Ink 12">
                       <a:extLst>
                         <a:ext uri="{FF2B5EF4-FFF2-40B4-BE49-F238E27FC236}">
-                          <a16:creationId xmlns="" xmlns:a16="http://schemas.microsoft.com/office/drawing/2014/main" id="{6205DD0C-C8AF-4BD3-AABD-F90EEFD7682B}"/>
+                          <a16:creationId xmlns:a16="http://schemas.microsoft.com/office/drawing/2014/main" xmlns="" id="{6205DD0C-C8AF-4BD3-AABD-F90EEFD7682B}"/>
                         </a:ext>
                       </a:extLst>
                     </p14:cNvPr>
@@ -15510,7 +16784,7 @@
               <p:cNvPr id="6" name="Oval 5">
                 <a:extLst>
                   <a:ext uri="{FF2B5EF4-FFF2-40B4-BE49-F238E27FC236}">
-                    <a16:creationId xmlns="" xmlns:a16="http://schemas.microsoft.com/office/drawing/2014/main" id="{2F810603-F2BA-4678-835C-1CEE13D71312}"/>
+                    <a16:creationId xmlns:a16="http://schemas.microsoft.com/office/drawing/2014/main" xmlns="" id="{2F810603-F2BA-4678-835C-1CEE13D71312}"/>
                   </a:ext>
                 </a:extLst>
               </p:cNvPr>
@@ -15562,7 +16836,7 @@
               <p:cNvPr id="7" name="Oval 6">
                 <a:extLst>
                   <a:ext uri="{FF2B5EF4-FFF2-40B4-BE49-F238E27FC236}">
-                    <a16:creationId xmlns="" xmlns:a16="http://schemas.microsoft.com/office/drawing/2014/main" id="{858F4A02-171E-4043-8210-CC65AE0C4C0E}"/>
+                    <a16:creationId xmlns:a16="http://schemas.microsoft.com/office/drawing/2014/main" xmlns="" id="{858F4A02-171E-4043-8210-CC65AE0C4C0E}"/>
                   </a:ext>
                 </a:extLst>
               </p:cNvPr>
@@ -15614,7 +16888,7 @@
               <p:cNvPr id="8" name="Oval 7">
                 <a:extLst>
                   <a:ext uri="{FF2B5EF4-FFF2-40B4-BE49-F238E27FC236}">
-                    <a16:creationId xmlns="" xmlns:a16="http://schemas.microsoft.com/office/drawing/2014/main" id="{13548D78-DF90-4713-ADC1-EB50E3FDEB32}"/>
+                    <a16:creationId xmlns:a16="http://schemas.microsoft.com/office/drawing/2014/main" xmlns="" id="{13548D78-DF90-4713-ADC1-EB50E3FDEB32}"/>
                   </a:ext>
                 </a:extLst>
               </p:cNvPr>
@@ -15668,7 +16942,7 @@
               <p:cNvPr id="9" name="Oval 8">
                 <a:extLst>
                   <a:ext uri="{FF2B5EF4-FFF2-40B4-BE49-F238E27FC236}">
-                    <a16:creationId xmlns="" xmlns:a16="http://schemas.microsoft.com/office/drawing/2014/main" id="{BAAD5FAB-5347-4484-B55F-A813BF4CCD46}"/>
+                    <a16:creationId xmlns:a16="http://schemas.microsoft.com/office/drawing/2014/main" xmlns="" id="{BAAD5FAB-5347-4484-B55F-A813BF4CCD46}"/>
                   </a:ext>
                 </a:extLst>
               </p:cNvPr>
@@ -15722,7 +16996,7 @@
               <p:cNvPr id="10" name="Straight Connector 9">
                 <a:extLst>
                   <a:ext uri="{FF2B5EF4-FFF2-40B4-BE49-F238E27FC236}">
-                    <a16:creationId xmlns="" xmlns:a16="http://schemas.microsoft.com/office/drawing/2014/main" id="{52AE0F85-D404-4572-99DE-871203465D72}"/>
+                    <a16:creationId xmlns:a16="http://schemas.microsoft.com/office/drawing/2014/main" xmlns="" id="{52AE0F85-D404-4572-99DE-871203465D72}"/>
                   </a:ext>
                 </a:extLst>
               </p:cNvPr>
@@ -15765,7 +17039,7 @@
               <p:cNvPr id="11" name="Straight Connector 10">
                 <a:extLst>
                   <a:ext uri="{FF2B5EF4-FFF2-40B4-BE49-F238E27FC236}">
-                    <a16:creationId xmlns="" xmlns:a16="http://schemas.microsoft.com/office/drawing/2014/main" id="{5AC8A0DA-CD7C-40F0-9944-C4662120BB38}"/>
+                    <a16:creationId xmlns:a16="http://schemas.microsoft.com/office/drawing/2014/main" xmlns="" id="{5AC8A0DA-CD7C-40F0-9944-C4662120BB38}"/>
                   </a:ext>
                 </a:extLst>
               </p:cNvPr>
@@ -15807,7 +17081,7 @@
             <p:cNvPr id="14" name="Straight Connector 13">
               <a:extLst>
                 <a:ext uri="{FF2B5EF4-FFF2-40B4-BE49-F238E27FC236}">
-                  <a16:creationId xmlns="" xmlns:a16="http://schemas.microsoft.com/office/drawing/2014/main" id="{52AE0F85-D404-4572-99DE-871203465D72}"/>
+                  <a16:creationId xmlns:a16="http://schemas.microsoft.com/office/drawing/2014/main" xmlns="" id="{52AE0F85-D404-4572-99DE-871203465D72}"/>
                 </a:ext>
               </a:extLst>
             </p:cNvPr>
@@ -15850,7 +17124,7 @@
             <p:cNvPr id="15" name="Straight Connector 14">
               <a:extLst>
                 <a:ext uri="{FF2B5EF4-FFF2-40B4-BE49-F238E27FC236}">
-                  <a16:creationId xmlns="" xmlns:a16="http://schemas.microsoft.com/office/drawing/2014/main" id="{5AC8A0DA-CD7C-40F0-9944-C4662120BB38}"/>
+                  <a16:creationId xmlns:a16="http://schemas.microsoft.com/office/drawing/2014/main" xmlns="" id="{5AC8A0DA-CD7C-40F0-9944-C4662120BB38}"/>
                 </a:ext>
               </a:extLst>
             </p:cNvPr>
@@ -15945,11 +17219,7 @@
             <a:p>
               <a:r>
                 <a:rPr lang="en-US" sz="1600" dirty="0" smtClean="0"/>
-                <a:t>Commissure </a:t>
-              </a:r>
-              <a:r>
-                <a:rPr lang="en-US" sz="1600" dirty="0" smtClean="0"/>
-                <a:t>excursion</a:t>
+                <a:t>Commissure excursion</a:t>
               </a:r>
             </a:p>
             <a:p>

</xml_diff>